<commit_message>
Comments for Thota to keep in mind when preparing the next version.   [see "notes" in PPT presentation]
git-svn-id: file://localhost/tmp/svn2git/svn@2965 defb5e50-622e-49ec-a68e-d72c7db87b45
</commit_message>
<xml_diff>
--- a/papers/async-re/data/RE.pptx
+++ b/papers/async-re/data/RE.pptx
@@ -577,6 +577,117 @@
 </p:notes>
 </file>
 
+<file path=ppt/notesSlides/notesSlide10.xml><?xml version="1.0" encoding="utf-8"?>
+<p:notes xmlns:a="http://schemas.openxmlformats.org/drawingml/2006/main" xmlns:r="http://schemas.openxmlformats.org/officeDocument/2006/relationships" xmlns:mc="http://schemas.openxmlformats.org/markup-compatibility/2006" xmlns:mv="urn:schemas-microsoft-com:mac:vml" xmlns:p="http://schemas.openxmlformats.org/presentationml/2006/main" mc:Ignorable="mv" mc:PreserveAttributes="mv:*">
+  <p:cSld>
+    <p:spTree>
+      <p:nvGrpSpPr>
+        <p:cNvPr id="1" name=""/>
+        <p:cNvGrpSpPr/>
+        <p:nvPr/>
+      </p:nvGrpSpPr>
+      <p:grpSpPr>
+        <a:xfrm>
+          <a:off x="0" y="0"/>
+          <a:ext cx="0" cy="0"/>
+          <a:chOff x="0" y="0"/>
+          <a:chExt cx="0" cy="0"/>
+        </a:xfrm>
+      </p:grpSpPr>
+      <p:sp>
+        <p:nvSpPr>
+          <p:cNvPr id="2" name="Slide Image Placeholder 1"/>
+          <p:cNvSpPr>
+            <a:spLocks noGrp="1" noRot="1" noChangeAspect="1"/>
+          </p:cNvSpPr>
+          <p:nvPr>
+            <p:ph type="sldImg"/>
+          </p:nvPr>
+        </p:nvSpPr>
+        <p:spPr/>
+      </p:sp>
+      <p:sp>
+        <p:nvSpPr>
+          <p:cNvPr id="3" name="Notes Placeholder 2"/>
+          <p:cNvSpPr>
+            <a:spLocks noGrp="1"/>
+          </p:cNvSpPr>
+          <p:nvPr>
+            <p:ph type="body" idx="1"/>
+          </p:nvPr>
+        </p:nvSpPr>
+        <p:spPr/>
+        <p:txBody>
+          <a:bodyPr>
+            <a:normAutofit/>
+          </a:bodyPr>
+          <a:lstStyle/>
+          <a:p>
+            <a:r>
+              <a:rPr lang="en-US" dirty="0" smtClean="0"/>
+              <a:t>It is possible to design a decentralized synchronous RE mechanism.</a:t>
+            </a:r>
+          </a:p>
+          <a:p>
+            <a:pPr lvl="1"/>
+            <a:r>
+              <a:rPr lang="en-US" dirty="0" smtClean="0"/>
+              <a:t>But then, with a heterogeneous infrastructure, each replica could have different run times.</a:t>
+            </a:r>
+          </a:p>
+          <a:p>
+            <a:endParaRPr lang="en-US" dirty="0" smtClean="0"/>
+          </a:p>
+          <a:p>
+            <a:r>
+              <a:rPr lang="en-US" dirty="0" smtClean="0"/>
+              <a:t>The asynchronous RE mechanism eliminates the synchronization delays caused due to a heterogeneous infrastructure.</a:t>
+            </a:r>
+          </a:p>
+          <a:p>
+            <a:pPr lvl="1"/>
+            <a:r>
+              <a:rPr lang="en-US" dirty="0" smtClean="0"/>
+              <a:t>A decentralized implementation adds to the efficiency of the asynchronous RE method.</a:t>
+            </a:r>
+          </a:p>
+          <a:p>
+            <a:endParaRPr lang="en-US" dirty="0"/>
+          </a:p>
+        </p:txBody>
+      </p:sp>
+      <p:sp>
+        <p:nvSpPr>
+          <p:cNvPr id="4" name="Slide Number Placeholder 3"/>
+          <p:cNvSpPr>
+            <a:spLocks noGrp="1"/>
+          </p:cNvSpPr>
+          <p:nvPr>
+            <p:ph type="sldNum" sz="quarter" idx="10"/>
+          </p:nvPr>
+        </p:nvSpPr>
+        <p:spPr/>
+        <p:txBody>
+          <a:bodyPr/>
+          <a:lstStyle/>
+          <a:p>
+            <a:fld id="{D770256F-FACB-CC4B-A3D9-71375CB20943}" type="slidenum">
+              <a:rPr lang="en-US" smtClean="0"/>
+              <a:pPr/>
+              <a:t>18</a:t>
+            </a:fld>
+            <a:endParaRPr lang="en-US"/>
+          </a:p>
+        </p:txBody>
+      </p:sp>
+    </p:spTree>
+  </p:cSld>
+  <p:clrMapOvr>
+    <a:masterClrMapping/>
+  </p:clrMapOvr>
+</p:notes>
+</file>
+
 <file path=ppt/notesSlides/notesSlide2.xml><?xml version="1.0" encoding="utf-8"?>
 <p:notes xmlns:a="http://schemas.openxmlformats.org/drawingml/2006/main" xmlns:r="http://schemas.openxmlformats.org/officeDocument/2006/relationships" xmlns:mc="http://schemas.openxmlformats.org/markup-compatibility/2006" xmlns:mv="urn:schemas-microsoft-com:mac:vml" xmlns:p="http://schemas.openxmlformats.org/presentationml/2006/main" mc:Ignorable="mv" mc:PreserveAttributes="mv:*">
   <p:cSld>
@@ -903,7 +1014,44 @@
           </a:bodyPr>
           <a:lstStyle/>
           <a:p>
-            <a:endParaRPr lang="en-US" dirty="0"/>
+            <a:r>
+              <a:rPr lang="en-US" sz="2000" b="1" dirty="0" smtClean="0">
+                <a:solidFill>
+                  <a:srgbClr val="800000"/>
+                </a:solidFill>
+              </a:rPr>
+              <a:t>What</a:t>
+            </a:r>
+            <a:r>
+              <a:rPr lang="en-US" sz="2000" b="1" baseline="0" dirty="0" smtClean="0">
+                <a:solidFill>
+                  <a:srgbClr val="800000"/>
+                </a:solidFill>
+              </a:rPr>
+              <a:t> do you mean asynchronously? Elaborate please? How does it eliminate the need to pair replicas? </a:t>
+            </a:r>
+          </a:p>
+          <a:p>
+            <a:endParaRPr lang="en-US" sz="2000" b="1" baseline="0" dirty="0" smtClean="0">
+              <a:solidFill>
+                <a:srgbClr val="800000"/>
+              </a:solidFill>
+            </a:endParaRPr>
+          </a:p>
+          <a:p>
+            <a:r>
+              <a:rPr lang="en-US" sz="2000" b="1" baseline="0" dirty="0" smtClean="0">
+                <a:solidFill>
+                  <a:srgbClr val="800000"/>
+                </a:solidFill>
+              </a:rPr>
+              <a:t>We do not propose it. It has been already been proposed/implemented. We are trying to implement it using SAGA, which gives us the ability to test/implement on large-scale production infrastructure</a:t>
+            </a:r>
+            <a:endParaRPr lang="en-US" sz="2000" b="1" dirty="0">
+              <a:solidFill>
+                <a:srgbClr val="800000"/>
+              </a:solidFill>
+            </a:endParaRPr>
           </a:p>
         </p:txBody>
       </p:sp>
@@ -925,7 +1073,7 @@
             <a:fld id="{D770256F-FACB-CC4B-A3D9-71375CB20943}" type="slidenum">
               <a:rPr lang="en-US" smtClean="0"/>
               <a:pPr/>
-              <a:t>9</a:t>
+              <a:t>8</a:t>
             </a:fld>
             <a:endParaRPr lang="en-US"/>
           </a:p>
@@ -1007,7 +1155,7 @@
             <a:fld id="{D770256F-FACB-CC4B-A3D9-71375CB20943}" type="slidenum">
               <a:rPr lang="en-US" smtClean="0"/>
               <a:pPr/>
-              <a:t>16</a:t>
+              <a:t>9</a:t>
             </a:fld>
             <a:endParaRPr lang="en-US"/>
           </a:p>
@@ -1068,31 +1216,12 @@
           <a:lstStyle/>
           <a:p>
             <a:r>
-              <a:rPr lang="en-US" dirty="0" smtClean="0"/>
-              <a:t>It is possible to design a decentralized synchronous RE mechanism.</a:t>
-            </a:r>
-          </a:p>
-          <a:p>
-            <a:pPr lvl="1"/>
-            <a:r>
-              <a:rPr lang="en-US" dirty="0" smtClean="0"/>
-              <a:t>But then, with a heterogeneous infrastructure, each replica could have different run times.</a:t>
-            </a:r>
-          </a:p>
-          <a:p>
-            <a:endParaRPr lang="en-US" dirty="0" smtClean="0"/>
-          </a:p>
-          <a:p>
-            <a:r>
-              <a:rPr lang="en-US" dirty="0" smtClean="0"/>
-              <a:t>The asynchronous RE mechanism eliminates the synchronization delays caused due to a heterogeneous infrastructure.</a:t>
-            </a:r>
-          </a:p>
-          <a:p>
-            <a:pPr lvl="1"/>
-            <a:r>
-              <a:rPr lang="en-US" dirty="0" smtClean="0"/>
-              <a:t>A decentralized implementation adds to the efficiency of the asynchronous RE method.</a:t>
+              <a:rPr lang="en-US" sz="2000" b="1" dirty="0" smtClean="0"/>
+              <a:t>Control</a:t>
+            </a:r>
+            <a:r>
+              <a:rPr lang="en-US" sz="2000" b="1" baseline="0" dirty="0" smtClean="0"/>
+              <a:t> flow of what?</a:t>
             </a:r>
           </a:p>
           <a:p>
@@ -1118,7 +1247,231 @@
             <a:fld id="{D770256F-FACB-CC4B-A3D9-71375CB20943}" type="slidenum">
               <a:rPr lang="en-US" smtClean="0"/>
               <a:pPr/>
-              <a:t>18</a:t>
+              <a:t>10</a:t>
+            </a:fld>
+            <a:endParaRPr lang="en-US"/>
+          </a:p>
+        </p:txBody>
+      </p:sp>
+    </p:spTree>
+  </p:cSld>
+  <p:clrMapOvr>
+    <a:masterClrMapping/>
+  </p:clrMapOvr>
+</p:notes>
+</file>
+
+<file path=ppt/notesSlides/notesSlide8.xml><?xml version="1.0" encoding="utf-8"?>
+<p:notes xmlns:a="http://schemas.openxmlformats.org/drawingml/2006/main" xmlns:r="http://schemas.openxmlformats.org/officeDocument/2006/relationships" xmlns:mc="http://schemas.openxmlformats.org/markup-compatibility/2006" xmlns:mv="urn:schemas-microsoft-com:mac:vml" xmlns:p="http://schemas.openxmlformats.org/presentationml/2006/main" mc:Ignorable="mv" mc:PreserveAttributes="mv:*">
+  <p:cSld>
+    <p:spTree>
+      <p:nvGrpSpPr>
+        <p:cNvPr id="1" name=""/>
+        <p:cNvGrpSpPr/>
+        <p:nvPr/>
+      </p:nvGrpSpPr>
+      <p:grpSpPr>
+        <a:xfrm>
+          <a:off x="0" y="0"/>
+          <a:ext cx="0" cy="0"/>
+          <a:chOff x="0" y="0"/>
+          <a:chExt cx="0" cy="0"/>
+        </a:xfrm>
+      </p:grpSpPr>
+      <p:sp>
+        <p:nvSpPr>
+          <p:cNvPr id="2" name="Slide Image Placeholder 1"/>
+          <p:cNvSpPr>
+            <a:spLocks noGrp="1" noRot="1" noChangeAspect="1"/>
+          </p:cNvSpPr>
+          <p:nvPr>
+            <p:ph type="sldImg"/>
+          </p:nvPr>
+        </p:nvSpPr>
+        <p:spPr/>
+      </p:sp>
+      <p:sp>
+        <p:nvSpPr>
+          <p:cNvPr id="3" name="Notes Placeholder 2"/>
+          <p:cNvSpPr>
+            <a:spLocks noGrp="1"/>
+          </p:cNvSpPr>
+          <p:nvPr>
+            <p:ph type="body" idx="1"/>
+          </p:nvPr>
+        </p:nvSpPr>
+        <p:spPr/>
+        <p:txBody>
+          <a:bodyPr>
+            <a:normAutofit/>
+          </a:bodyPr>
+          <a:lstStyle/>
+          <a:p>
+            <a:r>
+              <a:rPr lang="en-US" sz="2000" b="1" dirty="0" smtClean="0"/>
+              <a:t>Plots/Results are not </a:t>
+            </a:r>
+            <a:r>
+              <a:rPr lang="en-US" sz="2000" b="1" baseline="0" dirty="0" smtClean="0"/>
+              <a:t> readable. Maybe </a:t>
+            </a:r>
+            <a:r>
+              <a:rPr lang="en-US" sz="2000" b="1" baseline="0" dirty="0" err="1" smtClean="0"/>
+              <a:t>pairwise</a:t>
+            </a:r>
+            <a:r>
+              <a:rPr lang="en-US" sz="2000" b="1" baseline="0" dirty="0" smtClean="0"/>
+              <a:t> </a:t>
+            </a:r>
+            <a:r>
+              <a:rPr lang="en-US" sz="2000" b="1" baseline="0" dirty="0" err="1" smtClean="0"/>
+              <a:t>compairision</a:t>
+            </a:r>
+            <a:r>
+              <a:rPr lang="en-US" sz="2000" b="1" baseline="0" dirty="0" smtClean="0"/>
+              <a:t>? </a:t>
+            </a:r>
+            <a:r>
+              <a:rPr lang="en-US" sz="2000" b="1" baseline="0" dirty="0" err="1" smtClean="0"/>
+              <a:t>Eg</a:t>
+            </a:r>
+            <a:r>
+              <a:rPr lang="en-US" sz="2000" b="1" baseline="0" dirty="0" smtClean="0"/>
+              <a:t> Sync </a:t>
+            </a:r>
+            <a:r>
+              <a:rPr lang="en-US" sz="2000" b="1" baseline="0" dirty="0" err="1" smtClean="0"/>
+              <a:t>vs</a:t>
+            </a:r>
+            <a:r>
+              <a:rPr lang="en-US" sz="2000" b="1" baseline="0" dirty="0" smtClean="0"/>
+              <a:t> Centralized, then Centralized </a:t>
+            </a:r>
+            <a:r>
+              <a:rPr lang="en-US" sz="2000" b="1" baseline="0" dirty="0" err="1" smtClean="0"/>
+              <a:t>vs</a:t>
+            </a:r>
+            <a:r>
+              <a:rPr lang="en-US" sz="2000" b="1" baseline="0" dirty="0" smtClean="0"/>
+              <a:t> </a:t>
+            </a:r>
+            <a:r>
+              <a:rPr lang="en-US" sz="2000" b="1" baseline="0" dirty="0" err="1" smtClean="0"/>
+              <a:t>Decentralised</a:t>
+            </a:r>
+            <a:r>
+              <a:rPr lang="en-US" sz="2000" b="1" baseline="0" dirty="0" smtClean="0"/>
+              <a:t>?</a:t>
+            </a:r>
+            <a:endParaRPr lang="en-US" sz="2000" b="1" dirty="0"/>
+          </a:p>
+        </p:txBody>
+      </p:sp>
+      <p:sp>
+        <p:nvSpPr>
+          <p:cNvPr id="4" name="Slide Number Placeholder 3"/>
+          <p:cNvSpPr>
+            <a:spLocks noGrp="1"/>
+          </p:cNvSpPr>
+          <p:nvPr>
+            <p:ph type="sldNum" sz="quarter" idx="10"/>
+          </p:nvPr>
+        </p:nvSpPr>
+        <p:spPr/>
+        <p:txBody>
+          <a:bodyPr/>
+          <a:lstStyle/>
+          <a:p>
+            <a:fld id="{D770256F-FACB-CC4B-A3D9-71375CB20943}" type="slidenum">
+              <a:rPr lang="en-US" smtClean="0"/>
+              <a:pPr/>
+              <a:t>16</a:t>
+            </a:fld>
+            <a:endParaRPr lang="en-US"/>
+          </a:p>
+        </p:txBody>
+      </p:sp>
+    </p:spTree>
+  </p:cSld>
+  <p:clrMapOvr>
+    <a:masterClrMapping/>
+  </p:clrMapOvr>
+</p:notes>
+</file>
+
+<file path=ppt/notesSlides/notesSlide9.xml><?xml version="1.0" encoding="utf-8"?>
+<p:notes xmlns:a="http://schemas.openxmlformats.org/drawingml/2006/main" xmlns:r="http://schemas.openxmlformats.org/officeDocument/2006/relationships" xmlns:mc="http://schemas.openxmlformats.org/markup-compatibility/2006" xmlns:mv="urn:schemas-microsoft-com:mac:vml" xmlns:p="http://schemas.openxmlformats.org/presentationml/2006/main" mc:Ignorable="mv" mc:PreserveAttributes="mv:*">
+  <p:cSld>
+    <p:spTree>
+      <p:nvGrpSpPr>
+        <p:cNvPr id="1" name=""/>
+        <p:cNvGrpSpPr/>
+        <p:nvPr/>
+      </p:nvGrpSpPr>
+      <p:grpSpPr>
+        <a:xfrm>
+          <a:off x="0" y="0"/>
+          <a:ext cx="0" cy="0"/>
+          <a:chOff x="0" y="0"/>
+          <a:chExt cx="0" cy="0"/>
+        </a:xfrm>
+      </p:grpSpPr>
+      <p:sp>
+        <p:nvSpPr>
+          <p:cNvPr id="2" name="Slide Image Placeholder 1"/>
+          <p:cNvSpPr>
+            <a:spLocks noGrp="1" noRot="1" noChangeAspect="1"/>
+          </p:cNvSpPr>
+          <p:nvPr>
+            <p:ph type="sldImg"/>
+          </p:nvPr>
+        </p:nvSpPr>
+        <p:spPr/>
+      </p:sp>
+      <p:sp>
+        <p:nvSpPr>
+          <p:cNvPr id="3" name="Notes Placeholder 2"/>
+          <p:cNvSpPr>
+            <a:spLocks noGrp="1"/>
+          </p:cNvSpPr>
+          <p:nvPr>
+            <p:ph type="body" idx="1"/>
+          </p:nvPr>
+        </p:nvSpPr>
+        <p:spPr/>
+        <p:txBody>
+          <a:bodyPr>
+            <a:normAutofit/>
+          </a:bodyPr>
+          <a:lstStyle/>
+          <a:p>
+            <a:r>
+              <a:rPr lang="en-US" sz="2000" b="1" dirty="0" smtClean="0"/>
+              <a:t>This should be before the results!!</a:t>
+            </a:r>
+            <a:endParaRPr lang="en-US" sz="2000" b="1" dirty="0"/>
+          </a:p>
+        </p:txBody>
+      </p:sp>
+      <p:sp>
+        <p:nvSpPr>
+          <p:cNvPr id="4" name="Slide Number Placeholder 3"/>
+          <p:cNvSpPr>
+            <a:spLocks noGrp="1"/>
+          </p:cNvSpPr>
+          <p:nvPr>
+            <p:ph type="sldNum" sz="quarter" idx="10"/>
+          </p:nvPr>
+        </p:nvSpPr>
+        <p:spPr/>
+        <p:txBody>
+          <a:bodyPr/>
+          <a:lstStyle/>
+          <a:p>
+            <a:fld id="{D770256F-FACB-CC4B-A3D9-71375CB20943}" type="slidenum">
+              <a:rPr lang="en-US" smtClean="0"/>
+              <a:pPr/>
+              <a:t>17</a:t>
             </a:fld>
             <a:endParaRPr lang="en-US"/>
           </a:p>
@@ -4243,7 +4596,7 @@
         <mc:AlternateContent>
           <mc:Choice xmlns:ma="http://schemas.microsoft.com/office/mac/drawingml/2008/main" Requires="ma">
             <p:blipFill>
-              <a:blip r:embed="rId2"/>
+              <a:blip r:embed="rId3"/>
               <a:srcRect t="-1503" b="-1503"/>
               <a:stretch>
                 <a:fillRect/>
@@ -4252,7 +4605,7 @@
           </mc:Choice>
           <mc:Fallback>
             <p:blipFill>
-              <a:blip r:embed="rId3"/>
+              <a:blip r:embed="rId4"/>
               <a:srcRect t="-1503" b="-1503"/>
               <a:stretch>
                 <a:fillRect/>
@@ -4391,11 +4744,7 @@
           <a:p>
             <a:r>
               <a:rPr lang="en-US" dirty="0" smtClean="0"/>
-              <a:t>Asynchronous RE</a:t>
-            </a:r>
-            <a:r>
-              <a:rPr lang="en-US" dirty="0" smtClean="0"/>
-              <a:t> – Decentralized</a:t>
+              <a:t>Asynchronous RE – Decentralized</a:t>
             </a:r>
             <a:endParaRPr lang="en-US" dirty="0"/>
           </a:p>
@@ -4808,15 +5157,7 @@
             <a:pPr lvl="2"/>
             <a:r>
               <a:rPr lang="en-US" dirty="0" smtClean="0"/>
-              <a:t>Case I: </a:t>
-            </a:r>
-            <a:r>
-              <a:rPr lang="en-US" dirty="0" smtClean="0"/>
-              <a:t>Synchronous </a:t>
-            </a:r>
-            <a:r>
-              <a:rPr lang="en-US" dirty="0" smtClean="0"/>
-              <a:t>(traditional) RE</a:t>
+              <a:t>Case I: Synchronous (traditional) RE</a:t>
             </a:r>
           </a:p>
           <a:p>
@@ -5184,11 +5525,7 @@
             </a:r>
             <a:r>
               <a:rPr lang="en-US" sz="2400" dirty="0" smtClean="0"/>
-              <a:t>in </a:t>
-            </a:r>
-            <a:r>
-              <a:rPr lang="en-US" sz="2400" dirty="0" smtClean="0"/>
-              <a:t>each case a single </a:t>
+              <a:t>in each case a single </a:t>
             </a:r>
             <a:r>
               <a:rPr lang="en-US" sz="2400" dirty="0" err="1" smtClean="0"/>
@@ -5196,11 +5533,7 @@
             </a:r>
             <a:r>
               <a:rPr lang="en-US" sz="2400" dirty="0" smtClean="0"/>
-              <a:t> is launched with</a:t>
-            </a:r>
-            <a:r>
-              <a:rPr lang="en-US" sz="2400" dirty="0" smtClean="0"/>
-              <a:t> sufficient number of cores. </a:t>
+              <a:t> is launched with sufficient number of cores. </a:t>
             </a:r>
             <a:r>
               <a:rPr kumimoji="0" lang="en-US" sz="2400" b="0" i="0" u="none" strike="noStrike" kern="1200" cap="none" spc="0" normalizeH="0" baseline="0" noProof="0" dirty="0" smtClean="0">
@@ -5382,55 +5715,19 @@
           <a:p>
             <a:r>
               <a:rPr lang="en-US" dirty="0" smtClean="0"/>
-              <a:t>The Logic </a:t>
-            </a:r>
+              <a:t>The Logic behind synchronous and asynchronous RE inevitably influences the implementation and the consequent performance.</a:t>
+            </a:r>
+          </a:p>
+          <a:p>
             <a:r>
               <a:rPr lang="en-US" dirty="0" smtClean="0"/>
-              <a:t>behind synchronous and asynchronous RE inevitably influences the implementation and the consequent performance.</a:t>
+              <a:t>In synchronous RE, the overhead of managing a large group of replicas at each exchange step causes the degradation. </a:t>
             </a:r>
           </a:p>
           <a:p>
             <a:r>
               <a:rPr lang="en-US" dirty="0" smtClean="0"/>
-              <a:t>In</a:t>
-            </a:r>
-            <a:r>
-              <a:rPr lang="en-US" dirty="0" smtClean="0"/>
-              <a:t> </a:t>
-            </a:r>
-            <a:r>
-              <a:rPr lang="en-US" dirty="0" smtClean="0"/>
-              <a:t>synchronous RE</a:t>
-            </a:r>
-            <a:r>
-              <a:rPr lang="en-US" dirty="0" smtClean="0"/>
-              <a:t>, </a:t>
-            </a:r>
-            <a:r>
-              <a:rPr lang="en-US" dirty="0" smtClean="0"/>
-              <a:t>the overhead of managing a large group of replicas at each exchange step</a:t>
-            </a:r>
-            <a:r>
-              <a:rPr lang="en-US" dirty="0" smtClean="0"/>
-              <a:t> causes the degradation. </a:t>
-            </a:r>
-          </a:p>
-          <a:p>
-            <a:r>
-              <a:rPr lang="en-US" dirty="0" smtClean="0"/>
-              <a:t>Asynchronous RE scales better </a:t>
-            </a:r>
-            <a:r>
-              <a:rPr lang="en-US" dirty="0" smtClean="0"/>
-              <a:t>with a </a:t>
-            </a:r>
-            <a:r>
-              <a:rPr lang="en-US" dirty="0" smtClean="0"/>
-              <a:t>large number of replicas and resources</a:t>
-            </a:r>
-            <a:r>
-              <a:rPr lang="en-US" dirty="0" smtClean="0"/>
-              <a:t>.</a:t>
+              <a:t>Asynchronous RE scales better with a large number of replicas and resources.</a:t>
             </a:r>
           </a:p>
           <a:p>
@@ -5438,7 +5735,6 @@
               <a:rPr lang="en-US" dirty="0" smtClean="0"/>
               <a:t>And the decentralized asynchronous RE beats the centralized version.</a:t>
             </a:r>
-            <a:endParaRPr lang="en-US" dirty="0" smtClean="0"/>
           </a:p>
         </p:txBody>
       </p:sp>
@@ -5609,56 +5905,20 @@
           <a:p>
             <a:r>
               <a:rPr lang="en-US" dirty="0" smtClean="0"/>
-              <a:t>Replica-Exchange (RE) </a:t>
-            </a:r>
+              <a:t>Replica-Exchange (RE) methods:</a:t>
+            </a:r>
+          </a:p>
+          <a:p>
+            <a:pPr lvl="1"/>
             <a:r>
               <a:rPr lang="en-US" dirty="0" smtClean="0"/>
-              <a:t>methods:</a:t>
-            </a:r>
-          </a:p>
-          <a:p>
-            <a:pPr lvl="1"/>
+              <a:t>represent a class of algorithms that involve a large number of loosely coupled ensembles. </a:t>
+            </a:r>
+          </a:p>
+          <a:p>
             <a:r>
               <a:rPr lang="en-US" dirty="0" smtClean="0"/>
-              <a:t>represent </a:t>
-            </a:r>
-            <a:r>
-              <a:rPr lang="en-US" dirty="0" smtClean="0"/>
-              <a:t>a class of algorithms that involve a large number of loosely coupled ensembles.</a:t>
-            </a:r>
-            <a:r>
-              <a:rPr lang="en-US" dirty="0" smtClean="0"/>
-              <a:t> </a:t>
-            </a:r>
-          </a:p>
-          <a:p>
-            <a:r>
-              <a:rPr lang="en-US" dirty="0" smtClean="0"/>
-              <a:t>RE </a:t>
-            </a:r>
-            <a:r>
-              <a:rPr lang="en-US" dirty="0" smtClean="0"/>
-              <a:t>simulations are used to </a:t>
-            </a:r>
-            <a:r>
-              <a:rPr lang="en-US" dirty="0" smtClean="0"/>
-              <a:t>understand a range o</a:t>
-            </a:r>
-            <a:r>
-              <a:rPr lang="en-US" dirty="0" smtClean="0"/>
-              <a:t>f</a:t>
-            </a:r>
-            <a:r>
-              <a:rPr lang="en-US" dirty="0" smtClean="0"/>
-              <a:t> </a:t>
-            </a:r>
-            <a:r>
-              <a:rPr lang="en-US" dirty="0" smtClean="0"/>
-              <a:t>physical </a:t>
-            </a:r>
-            <a:r>
-              <a:rPr lang="en-US" dirty="0" smtClean="0"/>
-              <a:t>phenomena.</a:t>
+              <a:t>RE simulations are used to understand a range of physical phenomena.</a:t>
             </a:r>
           </a:p>
         </p:txBody>
@@ -5819,11 +6079,7 @@
           <a:p>
             <a:r>
               <a:rPr lang="en-US" dirty="0" smtClean="0"/>
-              <a:t>Developing applications that are able to orchestrate heterogeneous resources across distributed resources is a </a:t>
-            </a:r>
-            <a:r>
-              <a:rPr lang="en-US" dirty="0" smtClean="0"/>
-              <a:t>complex task.</a:t>
+              <a:t>Developing applications that are able to orchestrate heterogeneous resources across distributed resources is a complex task.</a:t>
             </a:r>
           </a:p>
           <a:p>
@@ -5835,15 +6091,7 @@
           <a:p>
             <a:r>
               <a:rPr lang="en-US" dirty="0" smtClean="0"/>
-              <a:t>RE simulations involve </a:t>
-            </a:r>
-            <a:r>
-              <a:rPr lang="en-US" dirty="0" smtClean="0"/>
-              <a:t>a large number of loosely coupled </a:t>
-            </a:r>
-            <a:r>
-              <a:rPr lang="en-US" dirty="0" smtClean="0"/>
-              <a:t>ensembles.</a:t>
+              <a:t>RE simulations involve a large number of loosely coupled ensembles.</a:t>
             </a:r>
           </a:p>
           <a:p>
@@ -5855,23 +6103,7 @@
           <a:p>
             <a:r>
               <a:rPr lang="en-US" dirty="0" smtClean="0"/>
-              <a:t>The challenge is to break the coupling </a:t>
-            </a:r>
-            <a:r>
-              <a:rPr lang="en-US" dirty="0" smtClean="0"/>
-              <a:t>between the development and the underlying infrastructure, to enable</a:t>
-            </a:r>
-            <a:r>
-              <a:rPr lang="en-US" dirty="0" smtClean="0"/>
-              <a:t> RE </a:t>
-            </a:r>
-            <a:r>
-              <a:rPr lang="en-US" dirty="0" smtClean="0"/>
-              <a:t>to be flexible (across infrastructure), extensible (to new methods of communication and coordination) and </a:t>
-            </a:r>
-            <a:r>
-              <a:rPr lang="en-US" dirty="0" smtClean="0"/>
-              <a:t>scalable.</a:t>
+              <a:t>The challenge is to break the coupling between the development and the underlying infrastructure, to enable RE to be flexible (across infrastructure), extensible (to new methods of communication and coordination) and scalable.</a:t>
             </a:r>
             <a:endParaRPr lang="en-US" dirty="0"/>
           </a:p>
@@ -5949,48 +6181,28 @@
           <a:p>
             <a:r>
               <a:rPr lang="en-US" dirty="0" smtClean="0"/>
-              <a:t>We propose a flexible, extensible and scalable implementation of an</a:t>
-            </a:r>
+              <a:t>We propose a flexible, extensible and scalable implementation of an efficient RE algorithm:</a:t>
+            </a:r>
+          </a:p>
+          <a:p>
+            <a:pPr lvl="1"/>
             <a:r>
               <a:rPr lang="en-US" dirty="0" smtClean="0"/>
-              <a:t> efficient </a:t>
-            </a:r>
+              <a:t>that can utilize a range of infrastructure concurrently</a:t>
+            </a:r>
+          </a:p>
+          <a:p>
+            <a:pPr lvl="1"/>
             <a:r>
               <a:rPr lang="en-US" dirty="0" smtClean="0"/>
-              <a:t>RE algorithm:</a:t>
+              <a:t>that supports different coordination mechanisms</a:t>
             </a:r>
           </a:p>
           <a:p>
             <a:pPr lvl="1"/>
             <a:r>
               <a:rPr lang="en-US" dirty="0" smtClean="0"/>
-              <a:t>that can utilize a range of infrastructure </a:t>
-            </a:r>
-            <a:r>
-              <a:rPr lang="en-US" dirty="0" smtClean="0"/>
-              <a:t>concurrently</a:t>
-            </a:r>
-          </a:p>
-          <a:p>
-            <a:pPr lvl="1"/>
-            <a:r>
-              <a:rPr lang="en-US" dirty="0" smtClean="0"/>
-              <a:t>that supports different coordination </a:t>
-            </a:r>
-            <a:r>
-              <a:rPr lang="en-US" dirty="0" smtClean="0"/>
-              <a:t>mechanisms</a:t>
-            </a:r>
-          </a:p>
-          <a:p>
-            <a:pPr lvl="1"/>
-            <a:r>
-              <a:rPr lang="en-US" dirty="0" smtClean="0"/>
-              <a:t>that supports different replica pairing mechanisms (synchronous versus asynchronous) and thereby different variants of the RE </a:t>
-            </a:r>
-            <a:r>
-              <a:rPr lang="en-US" dirty="0" smtClean="0"/>
-              <a:t>algorithm</a:t>
+              <a:t>that supports different replica pairing mechanisms (synchronous versus asynchronous) and thereby different variants of the RE algorithm</a:t>
             </a:r>
           </a:p>
           <a:p>
@@ -6145,15 +6357,7 @@
           <a:p>
             <a:r>
               <a:rPr lang="en-US" dirty="0" smtClean="0"/>
-              <a:t>For </a:t>
-            </a:r>
-            <a:r>
-              <a:rPr lang="en-US" dirty="0" smtClean="0"/>
-              <a:t>the traditional implementation of RE, depending on the number of replicas (N), the RE manager creates N/2 pairs of replicas</a:t>
-            </a:r>
-            <a:r>
-              <a:rPr lang="en-US" dirty="0" smtClean="0"/>
-              <a:t>.</a:t>
+              <a:t>For the traditional implementation of RE, depending on the number of replicas (N), the RE manager creates N/2 pairs of replicas.</a:t>
             </a:r>
           </a:p>
           <a:p>
@@ -6170,11 +6374,7 @@
             </a:r>
             <a:r>
               <a:rPr lang="en-US" dirty="0" smtClean="0"/>
-              <a:t> the replicas reach a pre-determined state, the exchanges are attempted (the exchange step).</a:t>
-            </a:r>
-            <a:r>
-              <a:rPr lang="en-US" dirty="0" smtClean="0"/>
-              <a:t> </a:t>
+              <a:t> the replicas reach a pre-determined state, the exchanges are attempted (the exchange step). </a:t>
             </a:r>
           </a:p>
           <a:p>
@@ -6269,11 +6469,7 @@
             <a:pPr lvl="1"/>
             <a:r>
               <a:rPr lang="en-US" dirty="0" smtClean="0"/>
-              <a:t>inhibits exchanges between replicas with non-nearest temperatures</a:t>
-            </a:r>
-            <a:r>
-              <a:rPr lang="en-US" dirty="0" smtClean="0"/>
-              <a:t>.</a:t>
+              <a:t>inhibits exchanges between replicas with non-nearest temperatures.</a:t>
             </a:r>
           </a:p>
           <a:p>
@@ -6283,28 +6479,16 @@
           <a:p>
             <a:r>
               <a:rPr lang="en-US" dirty="0" smtClean="0"/>
-              <a:t>Synchronized </a:t>
-            </a:r>
+              <a:t>Synchronized exchange steps – inefficient with a heterogeneous infrastructure (different running times for each replica).  </a:t>
+            </a:r>
+          </a:p>
+          <a:p>
+            <a:endParaRPr lang="en-US" dirty="0" smtClean="0"/>
+          </a:p>
+          <a:p>
             <a:r>
               <a:rPr lang="en-US" dirty="0" smtClean="0"/>
-              <a:t>exchange steps – inefficient with a heterogeneous infrastructure (different running times for each replica). </a:t>
-            </a:r>
-            <a:r>
-              <a:rPr lang="en-US" dirty="0" smtClean="0"/>
-              <a:t> </a:t>
-            </a:r>
-          </a:p>
-          <a:p>
-            <a:endParaRPr lang="en-US" dirty="0" smtClean="0"/>
-          </a:p>
-          <a:p>
-            <a:r>
-              <a:rPr lang="en-US" dirty="0" smtClean="0"/>
-              <a:t>Synchronized exchange step means large </a:t>
-            </a:r>
-            <a:r>
-              <a:rPr lang="en-US" dirty="0" smtClean="0"/>
-              <a:t>overhead with large number of replicas.</a:t>
+              <a:t>Synchronized exchange step means large overhead with large number of replicas.</a:t>
             </a:r>
             <a:endParaRPr lang="en-US" dirty="0"/>
           </a:p>
@@ -6384,11 +6568,7 @@
           <a:p>
             <a:r>
               <a:rPr lang="en-US" dirty="0" smtClean="0"/>
-              <a:t>We propose an asynchronous RE algorithm where replicas can perform exchanges asynchronously with any other available </a:t>
-            </a:r>
-            <a:r>
-              <a:rPr lang="en-US" dirty="0" smtClean="0"/>
-              <a:t>replica.</a:t>
+              <a:t>We propose an asynchronous RE algorithm where replicas can perform exchanges asynchronously with any other available replica.</a:t>
             </a:r>
           </a:p>
           <a:p>
@@ -6400,23 +6580,7 @@
           <a:p>
             <a:r>
               <a:rPr lang="en-US" dirty="0" smtClean="0"/>
-              <a:t>This </a:t>
-            </a:r>
-            <a:r>
-              <a:rPr lang="en-US" dirty="0" smtClean="0"/>
-              <a:t>eliminates the need to pair the replicas and limit </a:t>
-            </a:r>
-            <a:r>
-              <a:rPr lang="en-US" dirty="0" smtClean="0"/>
-              <a:t>exchanges to </a:t>
-            </a:r>
-            <a:r>
-              <a:rPr lang="en-US" dirty="0" smtClean="0"/>
-              <a:t>fixed pairs of replicas</a:t>
-            </a:r>
-            <a:r>
-              <a:rPr lang="en-US" dirty="0" smtClean="0"/>
-              <a:t>.</a:t>
+              <a:t>This eliminates the need to pair the replicas and limit exchanges to fixed pairs of replicas.</a:t>
             </a:r>
           </a:p>
           <a:p>
@@ -6489,11 +6653,7 @@
           <a:p>
             <a:r>
               <a:rPr lang="en-US" dirty="0" smtClean="0"/>
-              <a:t>Asynchronous </a:t>
-            </a:r>
-            <a:r>
-              <a:rPr lang="en-US" dirty="0" smtClean="0"/>
-              <a:t>RE - Centralized</a:t>
+              <a:t>Asynchronous RE - Centralized</a:t>
             </a:r>
             <a:endParaRPr lang="en-US" dirty="0"/>
           </a:p>
@@ -6556,29 +6716,8 @@
           <a:p>
             <a:r>
               <a:rPr lang="en-US" sz="2400" dirty="0" smtClean="0"/>
-              <a:t>The replica </a:t>
-            </a:r>
-            <a:r>
-              <a:rPr lang="en-US" sz="2400" dirty="0" smtClean="0"/>
-              <a:t>management </a:t>
-            </a:r>
-            <a:r>
-              <a:rPr lang="en-US" sz="2400" dirty="0" smtClean="0"/>
-              <a:t>is</a:t>
-            </a:r>
-            <a:r>
-              <a:rPr lang="en-US" sz="2400" dirty="0" smtClean="0"/>
-              <a:t> centralized </a:t>
-            </a:r>
-            <a:r>
-              <a:rPr lang="en-US" sz="2400" dirty="0" smtClean="0"/>
-              <a:t>- where</a:t>
-            </a:r>
-            <a:r>
-              <a:rPr lang="en-US" sz="2400" dirty="0" smtClean="0"/>
-              <a:t> a master manages all the replicas.</a:t>
-            </a:r>
-            <a:endParaRPr lang="en-US" sz="2400" dirty="0" smtClean="0"/>
+              <a:t>The replica management is centralized - where a master manages all the replicas.</a:t>
+            </a:r>
           </a:p>
         </p:txBody>
       </p:sp>

</xml_diff>

<commit_message>
refined graph 1 to 64 replicas added new version of slide 16 (please update to avoid conflicts)
git-svn-id: file://localhost/tmp/svn2git/svn@2969 defb5e50-622e-49ec-a68e-d72c7db87b45
</commit_message>
<xml_diff>
--- a/papers/async-re/data/RE.pptx
+++ b/papers/async-re/data/RE.pptx
@@ -5,7 +5,7 @@
     <p:sldMasterId id="2147483648" r:id="rId1"/>
   </p:sldMasterIdLst>
   <p:notesMasterIdLst>
-    <p:notesMasterId r:id="rId22"/>
+    <p:notesMasterId r:id="rId23"/>
   </p:notesMasterIdLst>
   <p:sldIdLst>
     <p:sldId id="256" r:id="rId2"/>
@@ -24,10 +24,11 @@
     <p:sldId id="259" r:id="rId15"/>
     <p:sldId id="269" r:id="rId16"/>
     <p:sldId id="263" r:id="rId17"/>
-    <p:sldId id="279" r:id="rId18"/>
-    <p:sldId id="267" r:id="rId19"/>
-    <p:sldId id="280" r:id="rId20"/>
-    <p:sldId id="268" r:id="rId21"/>
+    <p:sldId id="281" r:id="rId18"/>
+    <p:sldId id="279" r:id="rId19"/>
+    <p:sldId id="267" r:id="rId20"/>
+    <p:sldId id="280" r:id="rId21"/>
+    <p:sldId id="268" r:id="rId22"/>
   </p:sldIdLst>
   <p:sldSz cx="9144000" cy="6858000" type="screen4x3"/>
   <p:notesSz cx="6858000" cy="9144000"/>
@@ -129,6 +130,365 @@
 </p:presentation>
 </file>
 
+<file path=ppt/charts/chart1.xml><?xml version="1.0" encoding="utf-8"?>
+<c:chartSpace xmlns:c="http://schemas.openxmlformats.org/drawingml/2006/chart" xmlns:a="http://schemas.openxmlformats.org/drawingml/2006/main" xmlns:r="http://schemas.openxmlformats.org/officeDocument/2006/relationships">
+  <c:date1904 val="1"/>
+  <c:lang val="de-DE"/>
+  <c:style val="1"/>
+  <c:chart>
+    <c:plotArea>
+      <c:layout/>
+      <c:lineChart>
+        <c:grouping val="standard"/>
+        <c:ser>
+          <c:idx val="0"/>
+          <c:order val="0"/>
+          <c:tx>
+            <c:strRef>
+              <c:f>'Andre Rework'!$A$3</c:f>
+              <c:strCache>
+                <c:ptCount val="1"/>
+                <c:pt idx="0">
+                  <c:v>Synchronous</c:v>
+                </c:pt>
+              </c:strCache>
+            </c:strRef>
+          </c:tx>
+          <c:marker>
+            <c:symbol val="diamond"/>
+            <c:size val="7"/>
+          </c:marker>
+          <c:errBars>
+            <c:errDir val="y"/>
+            <c:errBarType val="both"/>
+            <c:errValType val="cust"/>
+            <c:noEndCap val="1"/>
+            <c:plus>
+              <c:numRef>
+                <c:f>'Andre Rework'!$B$10:$E$10</c:f>
+                <c:numCache>
+                  <c:formatCode>General</c:formatCode>
+                  <c:ptCount val="4"/>
+                  <c:pt idx="0">
+                    <c:v>8.81</c:v>
+                  </c:pt>
+                  <c:pt idx="1">
+                    <c:v>11.2</c:v>
+                  </c:pt>
+                  <c:pt idx="2">
+                    <c:v>17.0</c:v>
+                  </c:pt>
+                  <c:pt idx="3">
+                    <c:v>18.34</c:v>
+                  </c:pt>
+                </c:numCache>
+              </c:numRef>
+            </c:plus>
+            <c:minus>
+              <c:numRef>
+                <c:f>'Andre Rework'!$B$10:$E$10</c:f>
+                <c:numCache>
+                  <c:formatCode>General</c:formatCode>
+                  <c:ptCount val="4"/>
+                  <c:pt idx="0">
+                    <c:v>8.81</c:v>
+                  </c:pt>
+                  <c:pt idx="1">
+                    <c:v>11.2</c:v>
+                  </c:pt>
+                  <c:pt idx="2">
+                    <c:v>17.0</c:v>
+                  </c:pt>
+                  <c:pt idx="3">
+                    <c:v>18.34</c:v>
+                  </c:pt>
+                </c:numCache>
+              </c:numRef>
+            </c:minus>
+          </c:errBars>
+          <c:cat>
+            <c:numRef>
+              <c:f>'Andre Rework'!$B$2:$F$2</c:f>
+              <c:numCache>
+                <c:formatCode>0</c:formatCode>
+                <c:ptCount val="5"/>
+                <c:pt idx="0">
+                  <c:v>4.0</c:v>
+                </c:pt>
+                <c:pt idx="1">
+                  <c:v>8.0</c:v>
+                </c:pt>
+                <c:pt idx="2">
+                  <c:v>16.0</c:v>
+                </c:pt>
+                <c:pt idx="3">
+                  <c:v>32.0</c:v>
+                </c:pt>
+                <c:pt idx="4">
+                  <c:v>64.0</c:v>
+                </c:pt>
+              </c:numCache>
+            </c:numRef>
+          </c:cat>
+          <c:val>
+            <c:numRef>
+              <c:f>'Andre Rework'!$B$3:$F$3</c:f>
+              <c:numCache>
+                <c:formatCode>General</c:formatCode>
+                <c:ptCount val="5"/>
+                <c:pt idx="0">
+                  <c:v>624.0</c:v>
+                </c:pt>
+                <c:pt idx="1">
+                  <c:v>685.0</c:v>
+                </c:pt>
+                <c:pt idx="2">
+                  <c:v>802.0</c:v>
+                </c:pt>
+                <c:pt idx="3">
+                  <c:v>1023.0</c:v>
+                </c:pt>
+                <c:pt idx="4">
+                  <c:v>1432.0</c:v>
+                </c:pt>
+              </c:numCache>
+            </c:numRef>
+          </c:val>
+        </c:ser>
+        <c:ser>
+          <c:idx val="1"/>
+          <c:order val="1"/>
+          <c:tx>
+            <c:strRef>
+              <c:f>'Andre Rework'!$A$4</c:f>
+              <c:strCache>
+                <c:ptCount val="1"/>
+                <c:pt idx="0">
+                  <c:v>Asynchronous - Centralized</c:v>
+                </c:pt>
+              </c:strCache>
+            </c:strRef>
+          </c:tx>
+          <c:cat>
+            <c:numRef>
+              <c:f>'Andre Rework'!$B$2:$F$2</c:f>
+              <c:numCache>
+                <c:formatCode>0</c:formatCode>
+                <c:ptCount val="5"/>
+                <c:pt idx="0">
+                  <c:v>4.0</c:v>
+                </c:pt>
+                <c:pt idx="1">
+                  <c:v>8.0</c:v>
+                </c:pt>
+                <c:pt idx="2">
+                  <c:v>16.0</c:v>
+                </c:pt>
+                <c:pt idx="3">
+                  <c:v>32.0</c:v>
+                </c:pt>
+                <c:pt idx="4">
+                  <c:v>64.0</c:v>
+                </c:pt>
+              </c:numCache>
+            </c:numRef>
+          </c:cat>
+          <c:val>
+            <c:numRef>
+              <c:f>'Andre Rework'!$B$4:$F$4</c:f>
+              <c:numCache>
+                <c:formatCode>General</c:formatCode>
+                <c:ptCount val="5"/>
+                <c:pt idx="0">
+                  <c:v>628.6</c:v>
+                </c:pt>
+                <c:pt idx="1">
+                  <c:v>630.0</c:v>
+                </c:pt>
+                <c:pt idx="2">
+                  <c:v>701.83</c:v>
+                </c:pt>
+                <c:pt idx="3">
+                  <c:v>804.0</c:v>
+                </c:pt>
+                <c:pt idx="4">
+                  <c:v>1014.0</c:v>
+                </c:pt>
+              </c:numCache>
+            </c:numRef>
+          </c:val>
+        </c:ser>
+        <c:ser>
+          <c:idx val="2"/>
+          <c:order val="2"/>
+          <c:tx>
+            <c:strRef>
+              <c:f>'Andre Rework'!$A$5</c:f>
+              <c:strCache>
+                <c:ptCount val="1"/>
+                <c:pt idx="0">
+                  <c:v>Asynchronous - Decentralized</c:v>
+                </c:pt>
+              </c:strCache>
+            </c:strRef>
+          </c:tx>
+          <c:cat>
+            <c:numRef>
+              <c:f>'Andre Rework'!$B$2:$F$2</c:f>
+              <c:numCache>
+                <c:formatCode>0</c:formatCode>
+                <c:ptCount val="5"/>
+                <c:pt idx="0">
+                  <c:v>4.0</c:v>
+                </c:pt>
+                <c:pt idx="1">
+                  <c:v>8.0</c:v>
+                </c:pt>
+                <c:pt idx="2">
+                  <c:v>16.0</c:v>
+                </c:pt>
+                <c:pt idx="3">
+                  <c:v>32.0</c:v>
+                </c:pt>
+                <c:pt idx="4">
+                  <c:v>64.0</c:v>
+                </c:pt>
+              </c:numCache>
+            </c:numRef>
+          </c:cat>
+          <c:val>
+            <c:numRef>
+              <c:f>'Andre Rework'!$B$5:$F$5</c:f>
+              <c:numCache>
+                <c:formatCode>General</c:formatCode>
+                <c:ptCount val="5"/>
+                <c:pt idx="0">
+                  <c:v>588.9</c:v>
+                </c:pt>
+                <c:pt idx="1">
+                  <c:v>609.0</c:v>
+                </c:pt>
+                <c:pt idx="2">
+                  <c:v>583.33</c:v>
+                </c:pt>
+                <c:pt idx="3">
+                  <c:v>641.0</c:v>
+                </c:pt>
+                <c:pt idx="4">
+                  <c:v>650.0</c:v>
+                </c:pt>
+              </c:numCache>
+            </c:numRef>
+          </c:val>
+        </c:ser>
+        <c:marker val="1"/>
+        <c:axId val="447477592"/>
+        <c:axId val="447483512"/>
+      </c:lineChart>
+      <c:catAx>
+        <c:axId val="447477592"/>
+        <c:scaling>
+          <c:orientation val="minMax"/>
+        </c:scaling>
+        <c:axPos val="b"/>
+        <c:title>
+          <c:tx>
+            <c:rich>
+              <a:bodyPr/>
+              <a:lstStyle/>
+              <a:p>
+                <a:pPr>
+                  <a:defRPr sz="1400"/>
+                </a:pPr>
+                <a:r>
+                  <a:rPr lang="de-DE" sz="1400"/>
+                  <a:t>Number of Replicas</a:t>
+                </a:r>
+              </a:p>
+            </c:rich>
+          </c:tx>
+          <c:layout/>
+        </c:title>
+        <c:numFmt formatCode="0" sourceLinked="1"/>
+        <c:tickLblPos val="nextTo"/>
+        <c:txPr>
+          <a:bodyPr/>
+          <a:lstStyle/>
+          <a:p>
+            <a:pPr>
+              <a:defRPr sz="1300"/>
+            </a:pPr>
+            <a:endParaRPr lang="de-DE"/>
+          </a:p>
+        </c:txPr>
+        <c:crossAx val="447483512"/>
+        <c:crosses val="autoZero"/>
+        <c:auto val="1"/>
+        <c:lblAlgn val="ctr"/>
+        <c:lblOffset val="100"/>
+      </c:catAx>
+      <c:valAx>
+        <c:axId val="447483512"/>
+        <c:scaling>
+          <c:orientation val="minMax"/>
+        </c:scaling>
+        <c:axPos val="l"/>
+        <c:majorGridlines/>
+        <c:title>
+          <c:tx>
+            <c:rich>
+              <a:bodyPr/>
+              <a:lstStyle/>
+              <a:p>
+                <a:pPr>
+                  <a:defRPr sz="1300"/>
+                </a:pPr>
+                <a:r>
+                  <a:rPr lang="de-DE" sz="1300"/>
+                  <a:t>Runtime (in sec)</a:t>
+                </a:r>
+              </a:p>
+            </c:rich>
+          </c:tx>
+          <c:layout/>
+        </c:title>
+        <c:numFmt formatCode="General" sourceLinked="1"/>
+        <c:tickLblPos val="nextTo"/>
+        <c:txPr>
+          <a:bodyPr/>
+          <a:lstStyle/>
+          <a:p>
+            <a:pPr>
+              <a:defRPr sz="1300"/>
+            </a:pPr>
+            <a:endParaRPr lang="de-DE"/>
+          </a:p>
+        </c:txPr>
+        <c:crossAx val="447477592"/>
+        <c:crosses val="autoZero"/>
+        <c:crossBetween val="between"/>
+      </c:valAx>
+    </c:plotArea>
+    <c:legend>
+      <c:legendPos val="b"/>
+      <c:layout/>
+      <c:txPr>
+        <a:bodyPr/>
+        <a:lstStyle/>
+        <a:p>
+          <a:pPr>
+            <a:defRPr sz="1200"/>
+          </a:pPr>
+          <a:endParaRPr lang="de-DE"/>
+        </a:p>
+      </c:txPr>
+    </c:legend>
+    <c:plotVisOnly val="1"/>
+  </c:chart>
+  <c:externalData r:id="rId1"/>
+</c:chartSpace>
+</file>
+
 <file path=ppt/notesMasters/notesMaster1.xml><?xml version="1.0" encoding="utf-8"?>
 <p:notesMaster xmlns:a="http://schemas.openxmlformats.org/drawingml/2006/main" xmlns:r="http://schemas.openxmlformats.org/officeDocument/2006/relationships" xmlns:mc="http://schemas.openxmlformats.org/markup-compatibility/2006" xmlns:mv="urn:schemas-microsoft-com:mac:vml" xmlns:p="http://schemas.openxmlformats.org/presentationml/2006/main" mc:Ignorable="mv" mc:PreserveAttributes="mv:*">
   <p:cSld>
@@ -212,7 +572,7 @@
             <a:fld id="{15157DFE-7A66-3345-A799-BC7DAB5E1AC8}" type="datetimeFigureOut">
               <a:rPr lang="en-US" smtClean="0"/>
               <a:pPr/>
-              <a:t>9/12/10</a:t>
+              <a:t>13.09.2010</a:t>
             </a:fld>
             <a:endParaRPr lang="en-US"/>
           </a:p>
@@ -374,7 +734,7 @@
             <a:fld id="{D770256F-FACB-CC4B-A3D9-71375CB20943}" type="slidenum">
               <a:rPr lang="en-US" smtClean="0"/>
               <a:pPr/>
-              <a:t>‹#›</a:t>
+              <a:t>‹Nr.›</a:t>
             </a:fld>
             <a:endParaRPr lang="en-US"/>
           </a:p>
@@ -624,6 +984,92 @@
           <a:lstStyle/>
           <a:p>
             <a:r>
+              <a:rPr lang="en-US" sz="2000" b="1" dirty="0" smtClean="0"/>
+              <a:t>This should be before the results!!</a:t>
+            </a:r>
+            <a:endParaRPr lang="en-US" sz="2000" b="1" dirty="0"/>
+          </a:p>
+        </p:txBody>
+      </p:sp>
+      <p:sp>
+        <p:nvSpPr>
+          <p:cNvPr id="4" name="Slide Number Placeholder 3"/>
+          <p:cNvSpPr>
+            <a:spLocks noGrp="1"/>
+          </p:cNvSpPr>
+          <p:nvPr>
+            <p:ph type="sldNum" sz="quarter" idx="10"/>
+          </p:nvPr>
+        </p:nvSpPr>
+        <p:spPr/>
+        <p:txBody>
+          <a:bodyPr/>
+          <a:lstStyle/>
+          <a:p>
+            <a:fld id="{D770256F-FACB-CC4B-A3D9-71375CB20943}" type="slidenum">
+              <a:rPr lang="en-US" smtClean="0"/>
+              <a:pPr/>
+              <a:t>18</a:t>
+            </a:fld>
+            <a:endParaRPr lang="en-US"/>
+          </a:p>
+        </p:txBody>
+      </p:sp>
+    </p:spTree>
+  </p:cSld>
+  <p:clrMapOvr>
+    <a:masterClrMapping/>
+  </p:clrMapOvr>
+</p:notes>
+</file>
+
+<file path=ppt/notesSlides/notesSlide11.xml><?xml version="1.0" encoding="utf-8"?>
+<p:notes xmlns:a="http://schemas.openxmlformats.org/drawingml/2006/main" xmlns:r="http://schemas.openxmlformats.org/officeDocument/2006/relationships" xmlns:mc="http://schemas.openxmlformats.org/markup-compatibility/2006" xmlns:mv="urn:schemas-microsoft-com:mac:vml" xmlns:p="http://schemas.openxmlformats.org/presentationml/2006/main" mc:Ignorable="mv" mc:PreserveAttributes="mv:*">
+  <p:cSld>
+    <p:spTree>
+      <p:nvGrpSpPr>
+        <p:cNvPr id="1" name=""/>
+        <p:cNvGrpSpPr/>
+        <p:nvPr/>
+      </p:nvGrpSpPr>
+      <p:grpSpPr>
+        <a:xfrm>
+          <a:off x="0" y="0"/>
+          <a:ext cx="0" cy="0"/>
+          <a:chOff x="0" y="0"/>
+          <a:chExt cx="0" cy="0"/>
+        </a:xfrm>
+      </p:grpSpPr>
+      <p:sp>
+        <p:nvSpPr>
+          <p:cNvPr id="2" name="Slide Image Placeholder 1"/>
+          <p:cNvSpPr>
+            <a:spLocks noGrp="1" noRot="1" noChangeAspect="1"/>
+          </p:cNvSpPr>
+          <p:nvPr>
+            <p:ph type="sldImg"/>
+          </p:nvPr>
+        </p:nvSpPr>
+        <p:spPr/>
+      </p:sp>
+      <p:sp>
+        <p:nvSpPr>
+          <p:cNvPr id="3" name="Notes Placeholder 2"/>
+          <p:cNvSpPr>
+            <a:spLocks noGrp="1"/>
+          </p:cNvSpPr>
+          <p:nvPr>
+            <p:ph type="body" idx="1"/>
+          </p:nvPr>
+        </p:nvSpPr>
+        <p:spPr/>
+        <p:txBody>
+          <a:bodyPr>
+            <a:normAutofit/>
+          </a:bodyPr>
+          <a:lstStyle/>
+          <a:p>
+            <a:r>
               <a:rPr lang="en-US" dirty="0" smtClean="0"/>
               <a:t>It is possible to design a decentralized synchronous RE mechanism.</a:t>
             </a:r>
@@ -674,7 +1120,7 @@
             <a:fld id="{D770256F-FACB-CC4B-A3D9-71375CB20943}" type="slidenum">
               <a:rPr lang="en-US" smtClean="0"/>
               <a:pPr/>
-              <a:t>18</a:t>
+              <a:t>19</a:t>
             </a:fld>
             <a:endParaRPr lang="en-US"/>
           </a:p>
@@ -1447,7 +1893,59 @@
           <a:p>
             <a:r>
               <a:rPr lang="en-US" sz="2000" b="1" dirty="0" smtClean="0"/>
-              <a:t>This should be before the results!!</a:t>
+              <a:t>Plots/Results are not </a:t>
+            </a:r>
+            <a:r>
+              <a:rPr lang="en-US" sz="2000" b="1" baseline="0" dirty="0" smtClean="0"/>
+              <a:t> readable. Maybe </a:t>
+            </a:r>
+            <a:r>
+              <a:rPr lang="en-US" sz="2000" b="1" baseline="0" dirty="0" err="1" smtClean="0"/>
+              <a:t>pairwise</a:t>
+            </a:r>
+            <a:r>
+              <a:rPr lang="en-US" sz="2000" b="1" baseline="0" dirty="0" smtClean="0"/>
+              <a:t> </a:t>
+            </a:r>
+            <a:r>
+              <a:rPr lang="en-US" sz="2000" b="1" baseline="0" dirty="0" err="1" smtClean="0"/>
+              <a:t>compairision</a:t>
+            </a:r>
+            <a:r>
+              <a:rPr lang="en-US" sz="2000" b="1" baseline="0" dirty="0" smtClean="0"/>
+              <a:t>? </a:t>
+            </a:r>
+            <a:r>
+              <a:rPr lang="en-US" sz="2000" b="1" baseline="0" dirty="0" err="1" smtClean="0"/>
+              <a:t>Eg</a:t>
+            </a:r>
+            <a:r>
+              <a:rPr lang="en-US" sz="2000" b="1" baseline="0" dirty="0" smtClean="0"/>
+              <a:t> Sync </a:t>
+            </a:r>
+            <a:r>
+              <a:rPr lang="en-US" sz="2000" b="1" baseline="0" dirty="0" err="1" smtClean="0"/>
+              <a:t>vs</a:t>
+            </a:r>
+            <a:r>
+              <a:rPr lang="en-US" sz="2000" b="1" baseline="0" dirty="0" smtClean="0"/>
+              <a:t> Centralized, then Centralized </a:t>
+            </a:r>
+            <a:r>
+              <a:rPr lang="en-US" sz="2000" b="1" baseline="0" dirty="0" err="1" smtClean="0"/>
+              <a:t>vs</a:t>
+            </a:r>
+            <a:r>
+              <a:rPr lang="en-US" sz="2000" b="1" baseline="0" dirty="0" smtClean="0"/>
+              <a:t> </a:t>
+            </a:r>
+            <a:r>
+              <a:rPr lang="en-US" sz="2000" b="1" baseline="0" dirty="0" err="1" smtClean="0"/>
+              <a:t>Decentralised</a:t>
+            </a:r>
+            <a:r>
+              <a:rPr lang="en-US" sz="2000" b="1" baseline="0" dirty="0" smtClean="0"/>
+              <a:t>?</a:t>
             </a:r>
             <a:endParaRPr lang="en-US" sz="2000" b="1" dirty="0"/>
           </a:p>
@@ -1667,7 +2165,7 @@
             <a:fld id="{C9816CD7-3C1A-3B4B-AA1C-84A17814F932}" type="datetimeFigureOut">
               <a:rPr lang="en-US" smtClean="0"/>
               <a:pPr/>
-              <a:t>9/12/10</a:t>
+              <a:t>13.09.2010</a:t>
             </a:fld>
             <a:endParaRPr lang="en-US"/>
           </a:p>
@@ -1710,7 +2208,7 @@
             <a:fld id="{DCE817BA-87F0-1148-8301-2245C8C0B52A}" type="slidenum">
               <a:rPr lang="en-US" smtClean="0"/>
               <a:pPr/>
-              <a:t>‹#›</a:t>
+              <a:t>‹Nr.›</a:t>
             </a:fld>
             <a:endParaRPr lang="en-US"/>
           </a:p>
@@ -1834,7 +2332,7 @@
             <a:fld id="{C9816CD7-3C1A-3B4B-AA1C-84A17814F932}" type="datetimeFigureOut">
               <a:rPr lang="en-US" smtClean="0"/>
               <a:pPr/>
-              <a:t>9/12/10</a:t>
+              <a:t>13.09.2010</a:t>
             </a:fld>
             <a:endParaRPr lang="en-US"/>
           </a:p>
@@ -1877,7 +2375,7 @@
             <a:fld id="{DCE817BA-87F0-1148-8301-2245C8C0B52A}" type="slidenum">
               <a:rPr lang="en-US" smtClean="0"/>
               <a:pPr/>
-              <a:t>‹#›</a:t>
+              <a:t>‹Nr.›</a:t>
             </a:fld>
             <a:endParaRPr lang="en-US"/>
           </a:p>
@@ -2011,7 +2509,7 @@
             <a:fld id="{C9816CD7-3C1A-3B4B-AA1C-84A17814F932}" type="datetimeFigureOut">
               <a:rPr lang="en-US" smtClean="0"/>
               <a:pPr/>
-              <a:t>9/12/10</a:t>
+              <a:t>13.09.2010</a:t>
             </a:fld>
             <a:endParaRPr lang="en-US"/>
           </a:p>
@@ -2054,7 +2552,7 @@
             <a:fld id="{DCE817BA-87F0-1148-8301-2245C8C0B52A}" type="slidenum">
               <a:rPr lang="en-US" smtClean="0"/>
               <a:pPr/>
-              <a:t>‹#›</a:t>
+              <a:t>‹Nr.›</a:t>
             </a:fld>
             <a:endParaRPr lang="en-US"/>
           </a:p>
@@ -2178,7 +2676,7 @@
             <a:fld id="{C9816CD7-3C1A-3B4B-AA1C-84A17814F932}" type="datetimeFigureOut">
               <a:rPr lang="en-US" smtClean="0"/>
               <a:pPr/>
-              <a:t>9/12/10</a:t>
+              <a:t>13.09.2010</a:t>
             </a:fld>
             <a:endParaRPr lang="en-US"/>
           </a:p>
@@ -2221,7 +2719,7 @@
             <a:fld id="{DCE817BA-87F0-1148-8301-2245C8C0B52A}" type="slidenum">
               <a:rPr lang="en-US" smtClean="0"/>
               <a:pPr/>
-              <a:t>‹#›</a:t>
+              <a:t>‹Nr.›</a:t>
             </a:fld>
             <a:endParaRPr lang="en-US"/>
           </a:p>
@@ -2421,7 +2919,7 @@
             <a:fld id="{C9816CD7-3C1A-3B4B-AA1C-84A17814F932}" type="datetimeFigureOut">
               <a:rPr lang="en-US" smtClean="0"/>
               <a:pPr/>
-              <a:t>9/12/10</a:t>
+              <a:t>13.09.2010</a:t>
             </a:fld>
             <a:endParaRPr lang="en-US"/>
           </a:p>
@@ -2464,7 +2962,7 @@
             <a:fld id="{DCE817BA-87F0-1148-8301-2245C8C0B52A}" type="slidenum">
               <a:rPr lang="en-US" smtClean="0"/>
               <a:pPr/>
-              <a:t>‹#›</a:t>
+              <a:t>‹Nr.›</a:t>
             </a:fld>
             <a:endParaRPr lang="en-US"/>
           </a:p>
@@ -2706,7 +3204,7 @@
             <a:fld id="{C9816CD7-3C1A-3B4B-AA1C-84A17814F932}" type="datetimeFigureOut">
               <a:rPr lang="en-US" smtClean="0"/>
               <a:pPr/>
-              <a:t>9/12/10</a:t>
+              <a:t>13.09.2010</a:t>
             </a:fld>
             <a:endParaRPr lang="en-US"/>
           </a:p>
@@ -2749,7 +3247,7 @@
             <a:fld id="{DCE817BA-87F0-1148-8301-2245C8C0B52A}" type="slidenum">
               <a:rPr lang="en-US" smtClean="0"/>
               <a:pPr/>
-              <a:t>‹#›</a:t>
+              <a:t>‹Nr.›</a:t>
             </a:fld>
             <a:endParaRPr lang="en-US"/>
           </a:p>
@@ -3125,7 +3623,7 @@
             <a:fld id="{C9816CD7-3C1A-3B4B-AA1C-84A17814F932}" type="datetimeFigureOut">
               <a:rPr lang="en-US" smtClean="0"/>
               <a:pPr/>
-              <a:t>9/12/10</a:t>
+              <a:t>13.09.2010</a:t>
             </a:fld>
             <a:endParaRPr lang="en-US"/>
           </a:p>
@@ -3168,7 +3666,7 @@
             <a:fld id="{DCE817BA-87F0-1148-8301-2245C8C0B52A}" type="slidenum">
               <a:rPr lang="en-US" smtClean="0"/>
               <a:pPr/>
-              <a:t>‹#›</a:t>
+              <a:t>‹Nr.›</a:t>
             </a:fld>
             <a:endParaRPr lang="en-US"/>
           </a:p>
@@ -3240,7 +3738,7 @@
             <a:fld id="{C9816CD7-3C1A-3B4B-AA1C-84A17814F932}" type="datetimeFigureOut">
               <a:rPr lang="en-US" smtClean="0"/>
               <a:pPr/>
-              <a:t>9/12/10</a:t>
+              <a:t>13.09.2010</a:t>
             </a:fld>
             <a:endParaRPr lang="en-US"/>
           </a:p>
@@ -3283,7 +3781,7 @@
             <a:fld id="{DCE817BA-87F0-1148-8301-2245C8C0B52A}" type="slidenum">
               <a:rPr lang="en-US" smtClean="0"/>
               <a:pPr/>
-              <a:t>‹#›</a:t>
+              <a:t>‹Nr.›</a:t>
             </a:fld>
             <a:endParaRPr lang="en-US"/>
           </a:p>
@@ -3332,7 +3830,7 @@
             <a:fld id="{C9816CD7-3C1A-3B4B-AA1C-84A17814F932}" type="datetimeFigureOut">
               <a:rPr lang="en-US" smtClean="0"/>
               <a:pPr/>
-              <a:t>9/12/10</a:t>
+              <a:t>13.09.2010</a:t>
             </a:fld>
             <a:endParaRPr lang="en-US"/>
           </a:p>
@@ -3375,7 +3873,7 @@
             <a:fld id="{DCE817BA-87F0-1148-8301-2245C8C0B52A}" type="slidenum">
               <a:rPr lang="en-US" smtClean="0"/>
               <a:pPr/>
-              <a:t>‹#›</a:t>
+              <a:t>‹Nr.›</a:t>
             </a:fld>
             <a:endParaRPr lang="en-US"/>
           </a:p>
@@ -3606,7 +4104,7 @@
             <a:fld id="{C9816CD7-3C1A-3B4B-AA1C-84A17814F932}" type="datetimeFigureOut">
               <a:rPr lang="en-US" smtClean="0"/>
               <a:pPr/>
-              <a:t>9/12/10</a:t>
+              <a:t>13.09.2010</a:t>
             </a:fld>
             <a:endParaRPr lang="en-US"/>
           </a:p>
@@ -3649,7 +4147,7 @@
             <a:fld id="{DCE817BA-87F0-1148-8301-2245C8C0B52A}" type="slidenum">
               <a:rPr lang="en-US" smtClean="0"/>
               <a:pPr/>
-              <a:t>‹#›</a:t>
+              <a:t>‹Nr.›</a:t>
             </a:fld>
             <a:endParaRPr lang="en-US"/>
           </a:p>
@@ -3856,7 +4354,7 @@
             <a:fld id="{C9816CD7-3C1A-3B4B-AA1C-84A17814F932}" type="datetimeFigureOut">
               <a:rPr lang="en-US" smtClean="0"/>
               <a:pPr/>
-              <a:t>9/12/10</a:t>
+              <a:t>13.09.2010</a:t>
             </a:fld>
             <a:endParaRPr lang="en-US"/>
           </a:p>
@@ -3899,7 +4397,7 @@
             <a:fld id="{DCE817BA-87F0-1148-8301-2245C8C0B52A}" type="slidenum">
               <a:rPr lang="en-US" smtClean="0"/>
               <a:pPr/>
-              <a:t>‹#›</a:t>
+              <a:t>‹Nr.›</a:t>
             </a:fld>
             <a:endParaRPr lang="en-US"/>
           </a:p>
@@ -4066,7 +4564,7 @@
             <a:fld id="{C9816CD7-3C1A-3B4B-AA1C-84A17814F932}" type="datetimeFigureOut">
               <a:rPr lang="en-US" smtClean="0"/>
               <a:pPr/>
-              <a:t>9/12/10</a:t>
+              <a:t>13.09.2010</a:t>
             </a:fld>
             <a:endParaRPr lang="en-US"/>
           </a:p>
@@ -4145,7 +4643,7 @@
             <a:fld id="{DCE817BA-87F0-1148-8301-2245C8C0B52A}" type="slidenum">
               <a:rPr lang="en-US" smtClean="0"/>
               <a:pPr/>
-              <a:t>‹#›</a:t>
+              <a:t>‹Nr.›</a:t>
             </a:fld>
             <a:endParaRPr lang="en-US"/>
           </a:p>
@@ -4593,8 +5091,8 @@
             <p:ph idx="1"/>
           </p:nvPr>
         </p:nvPicPr>
-        <mc:AlternateContent>
-          <mc:Choice xmlns:ma="http://schemas.microsoft.com/office/mac/drawingml/2008/main" Requires="ma">
+        <mc:AlternateContent xmlns:ma="http://schemas.microsoft.com/office/mac/drawingml/2008/main">
+          <mc:Choice Requires="ma">
             <p:blipFill>
               <a:blip r:embed="rId3"/>
               <a:srcRect t="-1503" b="-1503"/>
@@ -4603,7 +5101,7 @@
               </a:stretch>
             </p:blipFill>
           </mc:Choice>
-          <mc:Fallback>
+          <mc:Fallback xmlns:p="http://schemas.openxmlformats.org/presentationml/2006/main" xmlns:mv="urn:schemas-microsoft-com:mac:vml" xmlns:mc="http://schemas.openxmlformats.org/markup-compatibility/2006" xmlns:r="http://schemas.openxmlformats.org/officeDocument/2006/relationships" xmlns:a="http://schemas.openxmlformats.org/drawingml/2006/main" xmlns="">
             <p:blipFill>
               <a:blip r:embed="rId4"/>
               <a:srcRect t="-1503" b="-1503"/>
@@ -4620,6 +5118,13 @@
   <p:clrMapOvr>
     <a:masterClrMapping/>
   </p:clrMapOvr>
+  <p:timing>
+    <p:tnLst>
+      <p:par>
+        <p:cTn id="1" dur="indefinite" restart="never" nodeType="tmRoot"/>
+      </p:par>
+    </p:tnLst>
+  </p:timing>
 </p:sld>
 </file>
 
@@ -4707,6 +5212,13 @@
   <p:clrMapOvr>
     <a:masterClrMapping/>
   </p:clrMapOvr>
+  <p:timing>
+    <p:tnLst>
+      <p:par>
+        <p:cTn id="1" dur="indefinite" restart="never" nodeType="tmRoot"/>
+      </p:par>
+    </p:tnLst>
+  </p:timing>
 </p:sld>
 </file>
 
@@ -4791,6 +5303,13 @@
   <p:clrMapOvr>
     <a:masterClrMapping/>
   </p:clrMapOvr>
+  <p:timing>
+    <p:tnLst>
+      <p:par>
+        <p:cTn id="1" dur="indefinite" restart="never" nodeType="tmRoot"/>
+      </p:par>
+    </p:tnLst>
+  </p:timing>
 </p:sld>
 </file>
 
@@ -4842,8 +5361,8 @@
           </p:cNvPicPr>
           <p:nvPr/>
         </p:nvPicPr>
-        <mc:AlternateContent>
-          <mc:Choice xmlns:ma="http://schemas.microsoft.com/office/mac/drawingml/2008/main" Requires="ma">
+        <mc:AlternateContent xmlns:ma="http://schemas.microsoft.com/office/mac/drawingml/2008/main">
+          <mc:Choice Requires="ma">
             <p:blipFill>
               <a:blip r:embed="rId2"/>
               <a:stretch>
@@ -4851,7 +5370,7 @@
               </a:stretch>
             </p:blipFill>
           </mc:Choice>
-          <mc:Fallback>
+          <mc:Fallback xmlns:p="http://schemas.openxmlformats.org/presentationml/2006/main" xmlns:mv="urn:schemas-microsoft-com:mac:vml" xmlns:mc="http://schemas.openxmlformats.org/markup-compatibility/2006" xmlns:r="http://schemas.openxmlformats.org/officeDocument/2006/relationships" xmlns:a="http://schemas.openxmlformats.org/drawingml/2006/main" xmlns="">
             <p:blipFill>
               <a:blip r:embed="rId3"/>
               <a:stretch>
@@ -4875,6 +5394,13 @@
   <p:clrMapOvr>
     <a:masterClrMapping/>
   </p:clrMapOvr>
+  <p:timing>
+    <p:tnLst>
+      <p:par>
+        <p:cTn id="1" dur="indefinite" restart="never" nodeType="tmRoot"/>
+      </p:par>
+    </p:tnLst>
+  </p:timing>
 </p:sld>
 </file>
 
@@ -5005,8 +5531,8 @@
           </p:cNvPicPr>
           <p:nvPr/>
         </p:nvPicPr>
-        <mc:AlternateContent>
-          <mc:Choice xmlns:ma="http://schemas.microsoft.com/office/mac/drawingml/2008/main" Requires="ma">
+        <mc:AlternateContent xmlns:ma="http://schemas.microsoft.com/office/mac/drawingml/2008/main">
+          <mc:Choice Requires="ma">
             <p:blipFill>
               <a:blip r:embed="rId2"/>
               <a:stretch>
@@ -5014,7 +5540,7 @@
               </a:stretch>
             </p:blipFill>
           </mc:Choice>
-          <mc:Fallback>
+          <mc:Fallback xmlns:p="http://schemas.openxmlformats.org/presentationml/2006/main" xmlns:mv="urn:schemas-microsoft-com:mac:vml" xmlns:mc="http://schemas.openxmlformats.org/markup-compatibility/2006" xmlns:r="http://schemas.openxmlformats.org/officeDocument/2006/relationships" xmlns:a="http://schemas.openxmlformats.org/drawingml/2006/main" xmlns="">
             <p:blipFill>
               <a:blip r:embed="rId3"/>
               <a:stretch>
@@ -5200,7 +5726,7 @@
 </file>
 
 <file path=ppt/slides/slide16.xml><?xml version="1.0" encoding="utf-8"?>
-<p:sld xmlns:a="http://schemas.openxmlformats.org/drawingml/2006/main" xmlns:r="http://schemas.openxmlformats.org/officeDocument/2006/relationships" xmlns:mc="http://schemas.openxmlformats.org/markup-compatibility/2006" xmlns:mv="urn:schemas-microsoft-com:mac:vml" xmlns:p="http://schemas.openxmlformats.org/presentationml/2006/main" mc:Ignorable="mv" mc:PreserveAttributes="mv:*">
+<p:sld xmlns:a="http://schemas.openxmlformats.org/drawingml/2006/main" xmlns:r="http://schemas.openxmlformats.org/officeDocument/2006/relationships" xmlns:mc="http://schemas.openxmlformats.org/markup-compatibility/2006" xmlns:mv="urn:schemas-microsoft-com:mac:vml" xmlns:p="http://schemas.openxmlformats.org/presentationml/2006/main" mc:Ignorable="mv" mc:PreserveAttributes="mv:*" show="0">
   <p:cSld>
     <p:spTree>
       <p:nvGrpSpPr>
@@ -5284,11 +5810,36 @@
           </a:prstGeom>
         </p:spPr>
       </p:pic>
+      <p:pic>
+        <p:nvPicPr>
+          <p:cNvPr id="4" name="Picture 16" descr="final_comparision.tiff"/>
+          <p:cNvPicPr>
+            <a:picLocks noChangeAspect="1"/>
+          </p:cNvPicPr>
+          <p:nvPr/>
+        </p:nvPicPr>
+        <p:blipFill>
+          <a:blip r:embed="rId3"/>
+          <a:stretch>
+            <a:fillRect/>
+          </a:stretch>
+        </p:blipFill>
+        <p:spPr>
+          <a:xfrm>
+            <a:off x="1082831" y="1693630"/>
+            <a:ext cx="6929872" cy="4584933"/>
+          </a:xfrm>
+          <a:prstGeom prst="rect">
+            <a:avLst/>
+          </a:prstGeom>
+        </p:spPr>
+      </p:pic>
     </p:spTree>
   </p:cSld>
   <p:clrMapOvr>
     <a:masterClrMapping/>
   </p:clrMapOvr>
+  <p:transition/>
   <p:timing>
     <p:tnLst>
       <p:par>
@@ -5328,307 +5879,54 @@
         </p:nvSpPr>
         <p:spPr/>
         <p:txBody>
-          <a:bodyPr/>
+          <a:bodyPr>
+            <a:normAutofit fontScale="90000"/>
+          </a:bodyPr>
           <a:lstStyle/>
           <a:p>
             <a:r>
               <a:rPr lang="en-US" dirty="0" smtClean="0"/>
-              <a:t>Configuration</a:t>
+              <a:t>Results</a:t>
+            </a:r>
+            <a:br>
+              <a:rPr lang="en-US" dirty="0" smtClean="0"/>
+            </a:br>
+            <a:r>
+              <a:rPr lang="en-US" sz="2400" dirty="0" smtClean="0"/>
+              <a:t>(on LONI/Teragrid resource </a:t>
+            </a:r>
+            <a:r>
+              <a:rPr lang="en-US" sz="2400" dirty="0" err="1" smtClean="0"/>
+              <a:t>QueenBee</a:t>
+            </a:r>
+            <a:r>
+              <a:rPr lang="en-US" sz="2400" dirty="0" smtClean="0"/>
+              <a:t>)</a:t>
+            </a:r>
+            <a:r>
+              <a:rPr lang="en-US" dirty="0" smtClean="0"/>
+              <a:t> </a:t>
             </a:r>
             <a:endParaRPr lang="en-US" dirty="0"/>
           </a:p>
         </p:txBody>
       </p:sp>
-      <p:sp>
-        <p:nvSpPr>
-          <p:cNvPr id="4" name="Content Placeholder 2"/>
-          <p:cNvSpPr txBox="1">
-            <a:spLocks/>
-          </p:cNvSpPr>
+      <p:graphicFrame>
+        <p:nvGraphicFramePr>
+          <p:cNvPr id="5" name="Diagramm 4"/>
+          <p:cNvGraphicFramePr/>
           <p:nvPr/>
-        </p:nvSpPr>
-        <p:spPr>
-          <a:xfrm>
-            <a:off x="457199" y="1600200"/>
-            <a:ext cx="8054987" cy="4525963"/>
-          </a:xfrm>
-          <a:prstGeom prst="rect">
-            <a:avLst/>
-          </a:prstGeom>
-        </p:spPr>
-        <p:txBody>
-          <a:bodyPr vert="horz" lIns="91440" tIns="45720" rIns="91440" bIns="45720" rtlCol="0">
-            <a:normAutofit fontScale="92500"/>
-          </a:bodyPr>
-          <a:lstStyle/>
-          <a:p>
-            <a:pPr marL="342900" marR="0" lvl="0" indent="-342900" algn="l" defTabSz="457200" rtl="0" eaLnBrk="1" fontAlgn="auto" latinLnBrk="0" hangingPunct="1">
-              <a:lnSpc>
-                <a:spcPct val="100000"/>
-              </a:lnSpc>
-              <a:spcBef>
-                <a:spcPct val="20000"/>
-              </a:spcBef>
-              <a:spcAft>
-                <a:spcPts val="0"/>
-              </a:spcAft>
-              <a:buClrTx/>
-              <a:buSzTx/>
-              <a:buFont typeface="Arial"/>
-              <a:buChar char="•"/>
-              <a:tabLst/>
-              <a:defRPr/>
-            </a:pPr>
-            <a:r>
-              <a:rPr kumimoji="0" lang="en-US" sz="2400" b="0" i="0" u="none" strike="noStrike" kern="1200" cap="none" spc="0" normalizeH="0" baseline="0" noProof="0" dirty="0" smtClean="0">
-                <a:ln>
-                  <a:noFill/>
-                </a:ln>
-                <a:solidFill>
-                  <a:schemeClr val="tx1"/>
-                </a:solidFill>
-                <a:effectLst/>
-                <a:uLnTx/>
-                <a:uFillTx/>
-                <a:latin typeface="+mn-lt"/>
-                <a:ea typeface="+mn-ea"/>
-                <a:cs typeface="+mn-cs"/>
-              </a:rPr>
-              <a:t>We configured the traditional and asynchronous RE (both centralized and decentralized) to run a parallel NAMD simulation with 4, 8, 16,</a:t>
-            </a:r>
-            <a:r>
-              <a:rPr kumimoji="0" lang="en-US" sz="2400" b="0" i="0" u="none" strike="noStrike" kern="1200" cap="none" spc="0" normalizeH="0" noProof="0" dirty="0" smtClean="0">
-                <a:ln>
-                  <a:noFill/>
-                </a:ln>
-                <a:solidFill>
-                  <a:schemeClr val="tx1"/>
-                </a:solidFill>
-                <a:effectLst/>
-                <a:uLnTx/>
-                <a:uFillTx/>
-                <a:latin typeface="+mn-lt"/>
-                <a:ea typeface="+mn-ea"/>
-                <a:cs typeface="+mn-cs"/>
-              </a:rPr>
-              <a:t> 32 and 64</a:t>
-            </a:r>
-            <a:r>
-              <a:rPr kumimoji="0" lang="en-US" sz="2400" b="0" i="0" u="none" strike="noStrike" kern="1200" cap="none" spc="0" normalizeH="0" baseline="0" noProof="0" dirty="0" smtClean="0">
-                <a:ln>
-                  <a:noFill/>
-                </a:ln>
-                <a:solidFill>
-                  <a:schemeClr val="tx1"/>
-                </a:solidFill>
-                <a:effectLst/>
-                <a:uLnTx/>
-                <a:uFillTx/>
-                <a:latin typeface="+mn-lt"/>
-                <a:ea typeface="+mn-ea"/>
-                <a:cs typeface="+mn-cs"/>
-              </a:rPr>
-              <a:t> replicas sampling a temperature between 300 K and 1000 K on </a:t>
-            </a:r>
-            <a:r>
-              <a:rPr kumimoji="0" lang="en-US" sz="2400" b="0" i="0" u="none" strike="noStrike" kern="1200" cap="none" spc="0" normalizeH="0" baseline="0" noProof="0" dirty="0" err="1" smtClean="0">
-                <a:ln>
-                  <a:noFill/>
-                </a:ln>
-                <a:solidFill>
-                  <a:schemeClr val="tx1"/>
-                </a:solidFill>
-                <a:effectLst/>
-                <a:uLnTx/>
-                <a:uFillTx/>
-                <a:latin typeface="+mn-lt"/>
-                <a:ea typeface="+mn-ea"/>
-                <a:cs typeface="+mn-cs"/>
-              </a:rPr>
-              <a:t>QueenBee</a:t>
-            </a:r>
-            <a:r>
-              <a:rPr kumimoji="0" lang="en-US" sz="2400" b="0" i="0" u="none" strike="noStrike" kern="1200" cap="none" spc="0" normalizeH="0" baseline="0" noProof="0" dirty="0" smtClean="0">
-                <a:ln>
-                  <a:noFill/>
-                </a:ln>
-                <a:solidFill>
-                  <a:schemeClr val="tx1"/>
-                </a:solidFill>
-                <a:effectLst/>
-                <a:uLnTx/>
-                <a:uFillTx/>
-                <a:latin typeface="+mn-lt"/>
-                <a:ea typeface="+mn-ea"/>
-                <a:cs typeface="+mn-cs"/>
-              </a:rPr>
-              <a:t>.</a:t>
-            </a:r>
-          </a:p>
-          <a:p>
-            <a:pPr marL="342900" marR="0" lvl="0" indent="-342900" algn="l" defTabSz="457200" rtl="0" eaLnBrk="1" fontAlgn="auto" latinLnBrk="0" hangingPunct="1">
-              <a:lnSpc>
-                <a:spcPct val="100000"/>
-              </a:lnSpc>
-              <a:spcBef>
-                <a:spcPct val="20000"/>
-              </a:spcBef>
-              <a:spcAft>
-                <a:spcPts val="0"/>
-              </a:spcAft>
-              <a:buClrTx/>
-              <a:buSzTx/>
-              <a:buFont typeface="Arial"/>
-              <a:buChar char="•"/>
-              <a:tabLst/>
-              <a:defRPr/>
-            </a:pPr>
-            <a:endParaRPr kumimoji="0" lang="en-US" sz="2400" b="0" i="0" u="none" strike="noStrike" kern="1200" cap="none" spc="0" normalizeH="0" baseline="0" noProof="0" dirty="0" smtClean="0">
-              <a:ln>
-                <a:noFill/>
-              </a:ln>
-              <a:solidFill>
-                <a:schemeClr val="tx1"/>
-              </a:solidFill>
-              <a:effectLst/>
-              <a:uLnTx/>
-              <a:uFillTx/>
-              <a:latin typeface="+mn-lt"/>
-              <a:ea typeface="+mn-ea"/>
-              <a:cs typeface="+mn-cs"/>
-            </a:endParaRPr>
-          </a:p>
-          <a:p>
-            <a:pPr marL="342900" lvl="0" indent="-342900">
-              <a:spcBef>
-                <a:spcPct val="20000"/>
-              </a:spcBef>
-              <a:buFont typeface="Arial"/>
-              <a:buChar char="•"/>
-            </a:pPr>
-            <a:r>
-              <a:rPr kumimoji="0" lang="en-US" sz="2400" b="0" i="0" u="none" strike="noStrike" kern="1200" cap="none" spc="0" normalizeH="0" baseline="0" noProof="0" dirty="0" smtClean="0">
-                <a:ln>
-                  <a:noFill/>
-                </a:ln>
-                <a:solidFill>
-                  <a:schemeClr val="tx1"/>
-                </a:solidFill>
-                <a:effectLst/>
-                <a:uLnTx/>
-                <a:uFillTx/>
-                <a:latin typeface="+mn-lt"/>
-                <a:ea typeface="+mn-ea"/>
-                <a:cs typeface="+mn-cs"/>
-              </a:rPr>
-              <a:t>Each replica uses 16 MPI processes and runs 500 time steps between exchange attempts. Therefore </a:t>
-            </a:r>
-            <a:r>
-              <a:rPr lang="en-US" sz="2400" dirty="0" smtClean="0"/>
-              <a:t>in each case a single </a:t>
-            </a:r>
-            <a:r>
-              <a:rPr lang="en-US" sz="2400" dirty="0" err="1" smtClean="0"/>
-              <a:t>BigJob</a:t>
-            </a:r>
-            <a:r>
-              <a:rPr lang="en-US" sz="2400" dirty="0" smtClean="0"/>
-              <a:t> is launched with sufficient number of cores. </a:t>
-            </a:r>
-            <a:r>
-              <a:rPr kumimoji="0" lang="en-US" sz="2400" b="0" i="0" u="none" strike="noStrike" kern="1200" cap="none" spc="0" normalizeH="0" baseline="0" noProof="0" dirty="0" smtClean="0">
-                <a:ln>
-                  <a:noFill/>
-                </a:ln>
-                <a:solidFill>
-                  <a:schemeClr val="tx1"/>
-                </a:solidFill>
-                <a:effectLst/>
-                <a:uLnTx/>
-                <a:uFillTx/>
-                <a:latin typeface="+mn-lt"/>
-                <a:ea typeface="+mn-ea"/>
-                <a:cs typeface="+mn-cs"/>
-              </a:rPr>
-              <a:t>The metric used is the time to complete a </a:t>
-            </a:r>
-            <a:r>
-              <a:rPr lang="en-US" sz="2400" dirty="0" smtClean="0"/>
-              <a:t>particular number of exchanges.</a:t>
-            </a:r>
-          </a:p>
-          <a:p>
-            <a:pPr marL="342900" lvl="0" indent="-342900">
-              <a:spcBef>
-                <a:spcPct val="20000"/>
-              </a:spcBef>
-              <a:buFont typeface="Arial"/>
-              <a:buChar char="•"/>
-            </a:pPr>
-            <a:endParaRPr lang="en-US" sz="2400" dirty="0" smtClean="0"/>
-          </a:p>
-          <a:p>
-            <a:pPr marL="342900" lvl="0" indent="-342900">
-              <a:spcBef>
-                <a:spcPct val="20000"/>
-              </a:spcBef>
-              <a:buFont typeface="Arial"/>
-              <a:buChar char="•"/>
-            </a:pPr>
-            <a:r>
-              <a:rPr kumimoji="0" lang="en-US" sz="2400" b="0" i="0" u="none" strike="noStrike" kern="1200" cap="none" spc="0" normalizeH="0" baseline="0" noProof="0" dirty="0" smtClean="0">
-                <a:ln>
-                  <a:noFill/>
-                </a:ln>
-                <a:solidFill>
-                  <a:schemeClr val="tx1"/>
-                </a:solidFill>
-                <a:effectLst/>
-                <a:uLnTx/>
-                <a:uFillTx/>
-                <a:latin typeface="+mn-lt"/>
-                <a:ea typeface="+mn-ea"/>
-                <a:cs typeface="+mn-cs"/>
-              </a:rPr>
-              <a:t>The ratio between the number of replicas and the number of exchanges is kept constant, for the purpose of</a:t>
-            </a:r>
-            <a:r>
-              <a:rPr kumimoji="0" lang="en-US" sz="2400" b="0" i="0" u="none" strike="noStrike" kern="1200" cap="none" spc="0" normalizeH="0" noProof="0" dirty="0" smtClean="0">
-                <a:ln>
-                  <a:noFill/>
-                </a:ln>
-                <a:solidFill>
-                  <a:schemeClr val="tx1"/>
-                </a:solidFill>
-                <a:effectLst/>
-                <a:uLnTx/>
-                <a:uFillTx/>
-                <a:latin typeface="+mn-lt"/>
-                <a:ea typeface="+mn-ea"/>
-                <a:cs typeface="+mn-cs"/>
-              </a:rPr>
-              <a:t> comparison</a:t>
-            </a:r>
-            <a:r>
-              <a:rPr kumimoji="0" lang="en-US" sz="2400" b="0" i="0" u="none" strike="noStrike" kern="1200" cap="none" spc="0" normalizeH="0" baseline="0" noProof="0" dirty="0" smtClean="0">
-                <a:ln>
-                  <a:noFill/>
-                </a:ln>
-                <a:solidFill>
-                  <a:schemeClr val="tx1"/>
-                </a:solidFill>
-                <a:effectLst/>
-                <a:uLnTx/>
-                <a:uFillTx/>
-                <a:latin typeface="+mn-lt"/>
-                <a:ea typeface="+mn-ea"/>
-                <a:cs typeface="+mn-cs"/>
-              </a:rPr>
-              <a:t>.</a:t>
-            </a:r>
-          </a:p>
-        </p:txBody>
-      </p:sp>
+        </p:nvGraphicFramePr>
+        <p:xfrm>
+          <a:off x="457199" y="1679761"/>
+          <a:ext cx="8417859" cy="4759885"/>
+        </p:xfrm>
+        <a:graphic>
+          <a:graphicData uri="http://schemas.openxmlformats.org/drawingml/2006/chart">
+            <c:chart xmlns:c="http://schemas.openxmlformats.org/drawingml/2006/chart" xmlns:r="http://schemas.openxmlformats.org/officeDocument/2006/relationships" r:id="rId3"/>
+          </a:graphicData>
+        </a:graphic>
+      </p:graphicFrame>
     </p:spTree>
   </p:cSld>
   <p:clrMapOvr>
@@ -5678,7 +5976,7 @@
           <a:p>
             <a:r>
               <a:rPr lang="en-US" dirty="0" smtClean="0"/>
-              <a:t>Analysis</a:t>
+              <a:t>Configuration</a:t>
             </a:r>
             <a:endParaRPr lang="en-US" dirty="0"/>
           </a:p>
@@ -5686,54 +5984,290 @@
       </p:sp>
       <p:sp>
         <p:nvSpPr>
-          <p:cNvPr id="3" name="Content Placeholder 2"/>
-          <p:cNvSpPr>
-            <a:spLocks noGrp="1"/>
-          </p:cNvSpPr>
-          <p:nvPr>
-            <p:ph idx="1"/>
-          </p:nvPr>
-        </p:nvSpPr>
-        <p:spPr/>
-        <p:txBody>
-          <a:bodyPr>
-            <a:normAutofit fontScale="70000" lnSpcReduction="20000"/>
+          <p:cNvPr id="4" name="Content Placeholder 2"/>
+          <p:cNvSpPr txBox="1">
+            <a:spLocks/>
+          </p:cNvSpPr>
+          <p:nvPr/>
+        </p:nvSpPr>
+        <p:spPr>
+          <a:xfrm>
+            <a:off x="457199" y="1600200"/>
+            <a:ext cx="8054987" cy="4525963"/>
+          </a:xfrm>
+          <a:prstGeom prst="rect">
+            <a:avLst/>
+          </a:prstGeom>
+        </p:spPr>
+        <p:txBody>
+          <a:bodyPr vert="horz" lIns="91440" tIns="45720" rIns="91440" bIns="45720" rtlCol="0">
+            <a:normAutofit fontScale="92500"/>
           </a:bodyPr>
           <a:lstStyle/>
           <a:p>
-            <a:r>
-              <a:rPr lang="en-US" dirty="0" smtClean="0"/>
-              <a:t>As the ratio between the number of replicas and the number of exchanges is kept constant, ideally, the runtime must be constant too. </a:t>
-            </a:r>
-          </a:p>
-          <a:p>
-            <a:r>
-              <a:rPr lang="en-US" dirty="0" smtClean="0"/>
-              <a:t>But with an increase in the number of replicas, the performance deteriorates.</a:t>
-            </a:r>
-          </a:p>
-          <a:p>
-            <a:r>
-              <a:rPr lang="en-US" dirty="0" smtClean="0"/>
-              <a:t>The Logic behind synchronous and asynchronous RE inevitably influences the implementation and the consequent performance.</a:t>
-            </a:r>
-          </a:p>
-          <a:p>
-            <a:r>
-              <a:rPr lang="en-US" dirty="0" smtClean="0"/>
-              <a:t>In synchronous RE, the overhead of managing a large group of replicas at each exchange step causes the degradation. </a:t>
-            </a:r>
-          </a:p>
-          <a:p>
-            <a:r>
-              <a:rPr lang="en-US" dirty="0" smtClean="0"/>
-              <a:t>Asynchronous RE scales better with a large number of replicas and resources.</a:t>
-            </a:r>
-          </a:p>
-          <a:p>
-            <a:r>
-              <a:rPr lang="en-US" dirty="0" smtClean="0"/>
-              <a:t>And the decentralized asynchronous RE beats the centralized version.</a:t>
+            <a:pPr marL="342900" marR="0" lvl="0" indent="-342900" algn="l" defTabSz="457200" rtl="0" eaLnBrk="1" fontAlgn="auto" latinLnBrk="0" hangingPunct="1">
+              <a:lnSpc>
+                <a:spcPct val="100000"/>
+              </a:lnSpc>
+              <a:spcBef>
+                <a:spcPct val="20000"/>
+              </a:spcBef>
+              <a:spcAft>
+                <a:spcPts val="0"/>
+              </a:spcAft>
+              <a:buClrTx/>
+              <a:buSzTx/>
+              <a:buFont typeface="Arial"/>
+              <a:buChar char="•"/>
+              <a:tabLst/>
+              <a:defRPr/>
+            </a:pPr>
+            <a:r>
+              <a:rPr kumimoji="0" lang="en-US" sz="2400" b="0" i="0" u="none" strike="noStrike" kern="1200" cap="none" spc="0" normalizeH="0" baseline="0" noProof="0" dirty="0" smtClean="0">
+                <a:ln>
+                  <a:noFill/>
+                </a:ln>
+                <a:solidFill>
+                  <a:schemeClr val="tx1"/>
+                </a:solidFill>
+                <a:effectLst/>
+                <a:uLnTx/>
+                <a:uFillTx/>
+                <a:latin typeface="+mn-lt"/>
+                <a:ea typeface="+mn-ea"/>
+                <a:cs typeface="+mn-cs"/>
+              </a:rPr>
+              <a:t>We configured the traditional and asynchronous RE (both centralized and decentralized) to run a parallel NAMD simulation with 4, 8, 16,</a:t>
+            </a:r>
+            <a:r>
+              <a:rPr kumimoji="0" lang="en-US" sz="2400" b="0" i="0" u="none" strike="noStrike" kern="1200" cap="none" spc="0" normalizeH="0" noProof="0" dirty="0" smtClean="0">
+                <a:ln>
+                  <a:noFill/>
+                </a:ln>
+                <a:solidFill>
+                  <a:schemeClr val="tx1"/>
+                </a:solidFill>
+                <a:effectLst/>
+                <a:uLnTx/>
+                <a:uFillTx/>
+                <a:latin typeface="+mn-lt"/>
+                <a:ea typeface="+mn-ea"/>
+                <a:cs typeface="+mn-cs"/>
+              </a:rPr>
+              <a:t> 32 and 64</a:t>
+            </a:r>
+            <a:r>
+              <a:rPr kumimoji="0" lang="en-US" sz="2400" b="0" i="0" u="none" strike="noStrike" kern="1200" cap="none" spc="0" normalizeH="0" baseline="0" noProof="0" dirty="0" smtClean="0">
+                <a:ln>
+                  <a:noFill/>
+                </a:ln>
+                <a:solidFill>
+                  <a:schemeClr val="tx1"/>
+                </a:solidFill>
+                <a:effectLst/>
+                <a:uLnTx/>
+                <a:uFillTx/>
+                <a:latin typeface="+mn-lt"/>
+                <a:ea typeface="+mn-ea"/>
+                <a:cs typeface="+mn-cs"/>
+              </a:rPr>
+              <a:t> replicas sampling a temperature between 300 K and 1000 K on </a:t>
+            </a:r>
+            <a:r>
+              <a:rPr kumimoji="0" lang="en-US" sz="2400" b="0" i="0" u="none" strike="noStrike" kern="1200" cap="none" spc="0" normalizeH="0" baseline="0" noProof="0" dirty="0" err="1" smtClean="0">
+                <a:ln>
+                  <a:noFill/>
+                </a:ln>
+                <a:solidFill>
+                  <a:schemeClr val="tx1"/>
+                </a:solidFill>
+                <a:effectLst/>
+                <a:uLnTx/>
+                <a:uFillTx/>
+                <a:latin typeface="+mn-lt"/>
+                <a:ea typeface="+mn-ea"/>
+                <a:cs typeface="+mn-cs"/>
+              </a:rPr>
+              <a:t>QueenBee</a:t>
+            </a:r>
+            <a:r>
+              <a:rPr kumimoji="0" lang="en-US" sz="2400" b="0" i="0" u="none" strike="noStrike" kern="1200" cap="none" spc="0" normalizeH="0" baseline="0" noProof="0" dirty="0" smtClean="0">
+                <a:ln>
+                  <a:noFill/>
+                </a:ln>
+                <a:solidFill>
+                  <a:schemeClr val="tx1"/>
+                </a:solidFill>
+                <a:effectLst/>
+                <a:uLnTx/>
+                <a:uFillTx/>
+                <a:latin typeface="+mn-lt"/>
+                <a:ea typeface="+mn-ea"/>
+                <a:cs typeface="+mn-cs"/>
+              </a:rPr>
+              <a:t>.</a:t>
+            </a:r>
+          </a:p>
+          <a:p>
+            <a:pPr marL="342900" marR="0" lvl="0" indent="-342900" algn="l" defTabSz="457200" rtl="0" eaLnBrk="1" fontAlgn="auto" latinLnBrk="0" hangingPunct="1">
+              <a:lnSpc>
+                <a:spcPct val="100000"/>
+              </a:lnSpc>
+              <a:spcBef>
+                <a:spcPct val="20000"/>
+              </a:spcBef>
+              <a:spcAft>
+                <a:spcPts val="0"/>
+              </a:spcAft>
+              <a:buClrTx/>
+              <a:buSzTx/>
+              <a:buFont typeface="Arial"/>
+              <a:buChar char="•"/>
+              <a:tabLst/>
+              <a:defRPr/>
+            </a:pPr>
+            <a:endParaRPr kumimoji="0" lang="en-US" sz="2400" b="0" i="0" u="none" strike="noStrike" kern="1200" cap="none" spc="0" normalizeH="0" baseline="0" noProof="0" dirty="0" smtClean="0">
+              <a:ln>
+                <a:noFill/>
+              </a:ln>
+              <a:solidFill>
+                <a:schemeClr val="tx1"/>
+              </a:solidFill>
+              <a:effectLst/>
+              <a:uLnTx/>
+              <a:uFillTx/>
+              <a:latin typeface="+mn-lt"/>
+              <a:ea typeface="+mn-ea"/>
+              <a:cs typeface="+mn-cs"/>
+            </a:endParaRPr>
+          </a:p>
+          <a:p>
+            <a:pPr marL="342900" lvl="0" indent="-342900">
+              <a:spcBef>
+                <a:spcPct val="20000"/>
+              </a:spcBef>
+              <a:buFont typeface="Arial"/>
+              <a:buChar char="•"/>
+            </a:pPr>
+            <a:r>
+              <a:rPr kumimoji="0" lang="en-US" sz="2400" b="0" i="0" u="none" strike="noStrike" kern="1200" cap="none" spc="0" normalizeH="0" baseline="0" noProof="0" dirty="0" smtClean="0">
+                <a:ln>
+                  <a:noFill/>
+                </a:ln>
+                <a:solidFill>
+                  <a:schemeClr val="tx1"/>
+                </a:solidFill>
+                <a:effectLst/>
+                <a:uLnTx/>
+                <a:uFillTx/>
+                <a:latin typeface="+mn-lt"/>
+                <a:ea typeface="+mn-ea"/>
+                <a:cs typeface="+mn-cs"/>
+              </a:rPr>
+              <a:t>Each replica uses 16 MPI processes and runs 500 time steps between exchange attempts. Therefore </a:t>
+            </a:r>
+            <a:r>
+              <a:rPr lang="en-US" sz="2400" dirty="0" smtClean="0"/>
+              <a:t>in each case a single </a:t>
+            </a:r>
+            <a:r>
+              <a:rPr lang="en-US" sz="2400" dirty="0" err="1" smtClean="0"/>
+              <a:t>BigJob</a:t>
+            </a:r>
+            <a:r>
+              <a:rPr lang="en-US" sz="2400" dirty="0" smtClean="0"/>
+              <a:t> is launched with sufficient number of cores. </a:t>
+            </a:r>
+            <a:r>
+              <a:rPr kumimoji="0" lang="en-US" sz="2400" b="0" i="0" u="none" strike="noStrike" kern="1200" cap="none" spc="0" normalizeH="0" baseline="0" noProof="0" dirty="0" smtClean="0">
+                <a:ln>
+                  <a:noFill/>
+                </a:ln>
+                <a:solidFill>
+                  <a:schemeClr val="tx1"/>
+                </a:solidFill>
+                <a:effectLst/>
+                <a:uLnTx/>
+                <a:uFillTx/>
+                <a:latin typeface="+mn-lt"/>
+                <a:ea typeface="+mn-ea"/>
+                <a:cs typeface="+mn-cs"/>
+              </a:rPr>
+              <a:t>The metric used is the time to complete a </a:t>
+            </a:r>
+            <a:r>
+              <a:rPr lang="en-US" sz="2400" dirty="0" smtClean="0"/>
+              <a:t>particular number of exchanges.</a:t>
+            </a:r>
+          </a:p>
+          <a:p>
+            <a:pPr marL="342900" lvl="0" indent="-342900">
+              <a:spcBef>
+                <a:spcPct val="20000"/>
+              </a:spcBef>
+              <a:buFont typeface="Arial"/>
+              <a:buChar char="•"/>
+            </a:pPr>
+            <a:endParaRPr lang="en-US" sz="2400" dirty="0" smtClean="0"/>
+          </a:p>
+          <a:p>
+            <a:pPr marL="342900" lvl="0" indent="-342900">
+              <a:spcBef>
+                <a:spcPct val="20000"/>
+              </a:spcBef>
+              <a:buFont typeface="Arial"/>
+              <a:buChar char="•"/>
+            </a:pPr>
+            <a:r>
+              <a:rPr kumimoji="0" lang="en-US" sz="2400" b="0" i="0" u="none" strike="noStrike" kern="1200" cap="none" spc="0" normalizeH="0" baseline="0" noProof="0" dirty="0" smtClean="0">
+                <a:ln>
+                  <a:noFill/>
+                </a:ln>
+                <a:solidFill>
+                  <a:schemeClr val="tx1"/>
+                </a:solidFill>
+                <a:effectLst/>
+                <a:uLnTx/>
+                <a:uFillTx/>
+                <a:latin typeface="+mn-lt"/>
+                <a:ea typeface="+mn-ea"/>
+                <a:cs typeface="+mn-cs"/>
+              </a:rPr>
+              <a:t>The ratio between the number of replicas and the number of exchanges is kept constant, for the purpose of</a:t>
+            </a:r>
+            <a:r>
+              <a:rPr kumimoji="0" lang="en-US" sz="2400" b="0" i="0" u="none" strike="noStrike" kern="1200" cap="none" spc="0" normalizeH="0" noProof="0" dirty="0" smtClean="0">
+                <a:ln>
+                  <a:noFill/>
+                </a:ln>
+                <a:solidFill>
+                  <a:schemeClr val="tx1"/>
+                </a:solidFill>
+                <a:effectLst/>
+                <a:uLnTx/>
+                <a:uFillTx/>
+                <a:latin typeface="+mn-lt"/>
+                <a:ea typeface="+mn-ea"/>
+                <a:cs typeface="+mn-cs"/>
+              </a:rPr>
+              <a:t> comparison</a:t>
+            </a:r>
+            <a:r>
+              <a:rPr kumimoji="0" lang="en-US" sz="2400" b="0" i="0" u="none" strike="noStrike" kern="1200" cap="none" spc="0" normalizeH="0" baseline="0" noProof="0" dirty="0" smtClean="0">
+                <a:ln>
+                  <a:noFill/>
+                </a:ln>
+                <a:solidFill>
+                  <a:schemeClr val="tx1"/>
+                </a:solidFill>
+                <a:effectLst/>
+                <a:uLnTx/>
+                <a:uFillTx/>
+                <a:latin typeface="+mn-lt"/>
+                <a:ea typeface="+mn-ea"/>
+                <a:cs typeface="+mn-cs"/>
+              </a:rPr>
+              <a:t>.</a:t>
             </a:r>
           </a:p>
         </p:txBody>
@@ -5782,54 +6316,68 @@
         </p:nvSpPr>
         <p:spPr/>
         <p:txBody>
+          <a:bodyPr/>
+          <a:lstStyle/>
+          <a:p>
+            <a:r>
+              <a:rPr lang="en-US" dirty="0" smtClean="0"/>
+              <a:t>Analysis</a:t>
+            </a:r>
+            <a:endParaRPr lang="en-US" dirty="0"/>
+          </a:p>
+        </p:txBody>
+      </p:sp>
+      <p:sp>
+        <p:nvSpPr>
+          <p:cNvPr id="3" name="Content Placeholder 2"/>
+          <p:cNvSpPr>
+            <a:spLocks noGrp="1"/>
+          </p:cNvSpPr>
+          <p:nvPr>
+            <p:ph idx="1"/>
+          </p:nvPr>
+        </p:nvSpPr>
+        <p:spPr/>
+        <p:txBody>
           <a:bodyPr>
-            <a:normAutofit fontScale="90000"/>
+            <a:normAutofit fontScale="70000" lnSpcReduction="20000"/>
           </a:bodyPr>
           <a:lstStyle/>
           <a:p>
             <a:r>
               <a:rPr lang="en-US" dirty="0" smtClean="0"/>
-              <a:t>Results</a:t>
-            </a:r>
-            <a:br>
+              <a:t>As the ratio between the number of replicas and the number of exchanges is kept constant, ideally, the runtime must be constant too. </a:t>
+            </a:r>
+          </a:p>
+          <a:p>
+            <a:r>
               <a:rPr lang="en-US" dirty="0" smtClean="0"/>
-            </a:br>
-            <a:r>
-              <a:rPr lang="en-US" sz="2200" dirty="0" smtClean="0"/>
-              <a:t>(distributed over Teragrid resources Ranger and </a:t>
-            </a:r>
-            <a:r>
-              <a:rPr lang="en-US" sz="2200" dirty="0" err="1" smtClean="0"/>
-              <a:t>QueenBee</a:t>
-            </a:r>
-            <a:r>
-              <a:rPr lang="en-US" sz="2200" dirty="0" smtClean="0"/>
-              <a:t>)</a:t>
-            </a:r>
+              <a:t>But with an increase in the number of replicas, the performance deteriorates.</a:t>
+            </a:r>
+          </a:p>
+          <a:p>
             <a:r>
               <a:rPr lang="en-US" dirty="0" smtClean="0"/>
-              <a:t> </a:t>
-            </a:r>
-            <a:endParaRPr lang="en-US" dirty="0"/>
-          </a:p>
-        </p:txBody>
-      </p:sp>
-      <p:sp>
-        <p:nvSpPr>
-          <p:cNvPr id="3" name="Content Placeholder 2"/>
-          <p:cNvSpPr>
-            <a:spLocks noGrp="1"/>
-          </p:cNvSpPr>
-          <p:nvPr>
-            <p:ph idx="1"/>
-          </p:nvPr>
-        </p:nvSpPr>
-        <p:spPr/>
-        <p:txBody>
-          <a:bodyPr/>
-          <a:lstStyle/>
-          <a:p>
-            <a:endParaRPr lang="en-US"/>
+              <a:t>The Logic behind synchronous and asynchronous RE inevitably influences the implementation and the consequent performance.</a:t>
+            </a:r>
+          </a:p>
+          <a:p>
+            <a:r>
+              <a:rPr lang="en-US" dirty="0" smtClean="0"/>
+              <a:t>In synchronous RE, the overhead of managing a large group of replicas at each exchange step causes the degradation. </a:t>
+            </a:r>
+          </a:p>
+          <a:p>
+            <a:r>
+              <a:rPr lang="en-US" dirty="0" smtClean="0"/>
+              <a:t>Asynchronous RE scales better with a large number of replicas and resources.</a:t>
+            </a:r>
+          </a:p>
+          <a:p>
+            <a:r>
+              <a:rPr lang="en-US" dirty="0" smtClean="0"/>
+              <a:t>And the decentralized asynchronous RE beats the centralized version.</a:t>
+            </a:r>
           </a:p>
         </p:txBody>
       </p:sp>
@@ -5838,6 +6386,13 @@
   <p:clrMapOvr>
     <a:masterClrMapping/>
   </p:clrMapOvr>
+  <p:timing>
+    <p:tnLst>
+      <p:par>
+        <p:cTn id="1" dur="indefinite" restart="never" nodeType="tmRoot"/>
+      </p:par>
+    </p:tnLst>
+  </p:timing>
 </p:sld>
 </file>
 
@@ -5981,6 +6536,94 @@
       </p:grpSpPr>
       <p:sp>
         <p:nvSpPr>
+          <p:cNvPr id="2" name="Title 1"/>
+          <p:cNvSpPr>
+            <a:spLocks noGrp="1"/>
+          </p:cNvSpPr>
+          <p:nvPr>
+            <p:ph type="title"/>
+          </p:nvPr>
+        </p:nvSpPr>
+        <p:spPr/>
+        <p:txBody>
+          <a:bodyPr>
+            <a:normAutofit fontScale="90000"/>
+          </a:bodyPr>
+          <a:lstStyle/>
+          <a:p>
+            <a:r>
+              <a:rPr lang="en-US" dirty="0" smtClean="0"/>
+              <a:t>Results</a:t>
+            </a:r>
+            <a:br>
+              <a:rPr lang="en-US" dirty="0" smtClean="0"/>
+            </a:br>
+            <a:r>
+              <a:rPr lang="en-US" sz="2200" dirty="0" smtClean="0"/>
+              <a:t>(distributed over Teragrid resources Ranger and </a:t>
+            </a:r>
+            <a:r>
+              <a:rPr lang="en-US" sz="2200" dirty="0" err="1" smtClean="0"/>
+              <a:t>QueenBee</a:t>
+            </a:r>
+            <a:r>
+              <a:rPr lang="en-US" sz="2200" dirty="0" smtClean="0"/>
+              <a:t>)</a:t>
+            </a:r>
+            <a:r>
+              <a:rPr lang="en-US" dirty="0" smtClean="0"/>
+              <a:t> </a:t>
+            </a:r>
+            <a:endParaRPr lang="en-US" dirty="0"/>
+          </a:p>
+        </p:txBody>
+      </p:sp>
+      <p:sp>
+        <p:nvSpPr>
+          <p:cNvPr id="3" name="Content Placeholder 2"/>
+          <p:cNvSpPr>
+            <a:spLocks noGrp="1"/>
+          </p:cNvSpPr>
+          <p:nvPr>
+            <p:ph idx="1"/>
+          </p:nvPr>
+        </p:nvSpPr>
+        <p:spPr/>
+        <p:txBody>
+          <a:bodyPr/>
+          <a:lstStyle/>
+          <a:p>
+            <a:endParaRPr lang="en-US"/>
+          </a:p>
+        </p:txBody>
+      </p:sp>
+    </p:spTree>
+  </p:cSld>
+  <p:clrMapOvr>
+    <a:masterClrMapping/>
+  </p:clrMapOvr>
+</p:sld>
+</file>
+
+<file path=ppt/slides/slide21.xml><?xml version="1.0" encoding="utf-8"?>
+<p:sld xmlns:a="http://schemas.openxmlformats.org/drawingml/2006/main" xmlns:r="http://schemas.openxmlformats.org/officeDocument/2006/relationships" xmlns:mc="http://schemas.openxmlformats.org/markup-compatibility/2006" xmlns:mv="urn:schemas-microsoft-com:mac:vml" xmlns:p="http://schemas.openxmlformats.org/presentationml/2006/main" mc:Ignorable="mv" mc:PreserveAttributes="mv:*">
+  <p:cSld>
+    <p:spTree>
+      <p:nvGrpSpPr>
+        <p:cNvPr id="1" name=""/>
+        <p:cNvGrpSpPr/>
+        <p:nvPr/>
+      </p:nvGrpSpPr>
+      <p:grpSpPr>
+        <a:xfrm>
+          <a:off x="0" y="0"/>
+          <a:ext cx="0" cy="0"/>
+          <a:chOff x="0" y="0"/>
+          <a:chExt cx="0" cy="0"/>
+        </a:xfrm>
+      </p:grpSpPr>
+      <p:sp>
+        <p:nvSpPr>
           <p:cNvPr id="3" name="Content Placeholder 2"/>
           <p:cNvSpPr>
             <a:spLocks noGrp="1"/>
@@ -6215,6 +6858,13 @@
   <p:clrMapOvr>
     <a:masterClrMapping/>
   </p:clrMapOvr>
+  <p:timing>
+    <p:tnLst>
+      <p:par>
+        <p:cTn id="1" dur="indefinite" restart="never" nodeType="tmRoot"/>
+      </p:par>
+    </p:tnLst>
+  </p:timing>
 </p:sld>
 </file>
 
@@ -6295,6 +6945,13 @@
   <p:clrMapOvr>
     <a:masterClrMapping/>
   </p:clrMapOvr>
+  <p:timing>
+    <p:tnLst>
+      <p:par>
+        <p:cTn id="1" dur="indefinite" restart="never" nodeType="tmRoot"/>
+      </p:par>
+    </p:tnLst>
+  </p:timing>
 </p:sld>
 </file>
 
@@ -6614,6 +7271,13 @@
   <p:clrMapOvr>
     <a:masterClrMapping/>
   </p:clrMapOvr>
+  <p:timing>
+    <p:tnLst>
+      <p:par>
+        <p:cTn id="1" dur="indefinite" restart="never" nodeType="tmRoot"/>
+      </p:par>
+    </p:tnLst>
+  </p:timing>
 </p:sld>
 </file>
 

</xml_diff>

<commit_message>
Fixing template. Please use this version for further enhancements/refinements.
git-svn-id: file://localhost/tmp/svn2git/svn@2975 defb5e50-622e-49ec-a68e-d72c7db87b45
</commit_message>
<xml_diff>
--- a/papers/async-re/data/RE.pptx
+++ b/papers/async-re/data/RE.pptx
@@ -3,37 +3,38 @@
 <p:presentation xmlns:a="http://schemas.openxmlformats.org/drawingml/2006/main" xmlns:r="http://schemas.openxmlformats.org/officeDocument/2006/relationships" xmlns:mc="http://schemas.openxmlformats.org/markup-compatibility/2006" xmlns:mv="urn:schemas-microsoft-com:mac:vml" xmlns:p="http://schemas.openxmlformats.org/presentationml/2006/main" mc:Ignorable="mv" mc:PreserveAttributes="mv:*" saveSubsetFonts="1" autoCompressPictures="0">
   <p:sldMasterIdLst>
     <p:sldMasterId id="2147483660" r:id="rId1"/>
+    <p:sldMasterId id="2147483677" r:id="rId2"/>
   </p:sldMasterIdLst>
   <p:notesMasterIdLst>
-    <p:notesMasterId r:id="rId25"/>
+    <p:notesMasterId r:id="rId26"/>
   </p:notesMasterIdLst>
   <p:handoutMasterIdLst>
-    <p:handoutMasterId r:id="rId26"/>
+    <p:handoutMasterId r:id="rId27"/>
   </p:handoutMasterIdLst>
   <p:sldIdLst>
-    <p:sldId id="256" r:id="rId2"/>
-    <p:sldId id="261" r:id="rId3"/>
-    <p:sldId id="262" r:id="rId4"/>
-    <p:sldId id="263" r:id="rId5"/>
-    <p:sldId id="264" r:id="rId6"/>
-    <p:sldId id="265" r:id="rId7"/>
-    <p:sldId id="266" r:id="rId8"/>
-    <p:sldId id="267" r:id="rId9"/>
-    <p:sldId id="268" r:id="rId10"/>
-    <p:sldId id="269" r:id="rId11"/>
-    <p:sldId id="270" r:id="rId12"/>
-    <p:sldId id="271" r:id="rId13"/>
-    <p:sldId id="272" r:id="rId14"/>
-    <p:sldId id="273" r:id="rId15"/>
-    <p:sldId id="284" r:id="rId16"/>
-    <p:sldId id="275" r:id="rId17"/>
-    <p:sldId id="276" r:id="rId18"/>
-    <p:sldId id="277" r:id="rId19"/>
-    <p:sldId id="285" r:id="rId20"/>
-    <p:sldId id="279" r:id="rId21"/>
-    <p:sldId id="280" r:id="rId22"/>
-    <p:sldId id="281" r:id="rId23"/>
-    <p:sldId id="282" r:id="rId24"/>
+    <p:sldId id="256" r:id="rId3"/>
+    <p:sldId id="261" r:id="rId4"/>
+    <p:sldId id="262" r:id="rId5"/>
+    <p:sldId id="263" r:id="rId6"/>
+    <p:sldId id="264" r:id="rId7"/>
+    <p:sldId id="265" r:id="rId8"/>
+    <p:sldId id="266" r:id="rId9"/>
+    <p:sldId id="267" r:id="rId10"/>
+    <p:sldId id="268" r:id="rId11"/>
+    <p:sldId id="269" r:id="rId12"/>
+    <p:sldId id="270" r:id="rId13"/>
+    <p:sldId id="271" r:id="rId14"/>
+    <p:sldId id="272" r:id="rId15"/>
+    <p:sldId id="273" r:id="rId16"/>
+    <p:sldId id="284" r:id="rId17"/>
+    <p:sldId id="275" r:id="rId18"/>
+    <p:sldId id="276" r:id="rId19"/>
+    <p:sldId id="277" r:id="rId20"/>
+    <p:sldId id="285" r:id="rId21"/>
+    <p:sldId id="279" r:id="rId22"/>
+    <p:sldId id="280" r:id="rId23"/>
+    <p:sldId id="281" r:id="rId24"/>
+    <p:sldId id="282" r:id="rId25"/>
   </p:sldIdLst>
   <p:sldSz cx="9144000" cy="6858000" type="screen4x3"/>
   <p:notesSz cx="6858000" cy="9144000"/>
@@ -375,7 +376,7 @@
                   <c:v>630.0</c:v>
                 </c:pt>
                 <c:pt idx="2">
-                  <c:v>701.8299999999996</c:v>
+                  <c:v>701.8299999999995</c:v>
                 </c:pt>
                 <c:pt idx="3">
                   <c:v>804.0</c:v>
@@ -485,7 +486,7 @@
                   <c:v>609.0</c:v>
                 </c:pt>
                 <c:pt idx="2">
-                  <c:v>583.3299999999996</c:v>
+                  <c:v>583.3299999999995</c:v>
                 </c:pt>
                 <c:pt idx="3">
                   <c:v>641.0</c:v>
@@ -498,11 +499,11 @@
           </c:val>
         </c:ser>
         <c:marker val="1"/>
-        <c:axId val="524788360"/>
-        <c:axId val="524795800"/>
+        <c:axId val="552184392"/>
+        <c:axId val="685375528"/>
       </c:lineChart>
       <c:catAx>
-        <c:axId val="524788360"/>
+        <c:axId val="552184392"/>
         <c:scaling>
           <c:orientation val="minMax"/>
         </c:scaling>
@@ -537,14 +538,14 @@
             <a:endParaRPr lang="en-US"/>
           </a:p>
         </c:txPr>
-        <c:crossAx val="524795800"/>
+        <c:crossAx val="685375528"/>
         <c:crosses val="autoZero"/>
         <c:auto val="1"/>
         <c:lblAlgn val="ctr"/>
         <c:lblOffset val="100"/>
       </c:catAx>
       <c:valAx>
-        <c:axId val="524795800"/>
+        <c:axId val="685375528"/>
         <c:scaling>
           <c:orientation val="minMax"/>
           <c:min val="400.0"/>
@@ -581,7 +582,7 @@
             <a:endParaRPr lang="en-US"/>
           </a:p>
         </c:txPr>
-        <c:crossAx val="524788360"/>
+        <c:crossAx val="552184392"/>
         <c:crosses val="autoZero"/>
         <c:crossBetween val="between"/>
         <c:majorUnit val="100.0"/>
@@ -942,11 +943,11 @@
             </c:numRef>
           </c:val>
         </c:ser>
-        <c:axId val="524916072"/>
-        <c:axId val="524923528"/>
+        <c:axId val="671736600"/>
+        <c:axId val="67663848"/>
       </c:barChart>
       <c:catAx>
-        <c:axId val="524916072"/>
+        <c:axId val="671736600"/>
         <c:scaling>
           <c:orientation val="minMax"/>
         </c:scaling>
@@ -970,14 +971,14 @@
           <c:layout/>
         </c:title>
         <c:tickLblPos val="nextTo"/>
-        <c:crossAx val="524923528"/>
+        <c:crossAx val="67663848"/>
         <c:crosses val="autoZero"/>
         <c:auto val="1"/>
         <c:lblAlgn val="ctr"/>
         <c:lblOffset val="100"/>
       </c:catAx>
       <c:valAx>
-        <c:axId val="524923528"/>
+        <c:axId val="67663848"/>
         <c:scaling>
           <c:orientation val="minMax"/>
         </c:scaling>
@@ -1003,7 +1004,7 @@
         </c:title>
         <c:numFmt formatCode="General" sourceLinked="1"/>
         <c:tickLblPos val="nextTo"/>
-        <c:crossAx val="524916072"/>
+        <c:crossAx val="671736600"/>
         <c:crosses val="autoZero"/>
         <c:crossBetween val="between"/>
       </c:valAx>
@@ -2799,8 +2800,8 @@
 </file>
 
 <file path=ppt/slideLayouts/slideLayout1.xml><?xml version="1.0" encoding="utf-8"?>
-<p:sldLayout xmlns:a="http://schemas.openxmlformats.org/drawingml/2006/main" xmlns:r="http://schemas.openxmlformats.org/officeDocument/2006/relationships" xmlns:mc="http://schemas.openxmlformats.org/markup-compatibility/2006" xmlns:mv="urn:schemas-microsoft-com:mac:vml" xmlns:p="http://schemas.openxmlformats.org/presentationml/2006/main" mc:Ignorable="mv" mc:PreserveAttributes="mv:*" preserve="1" userDrawn="1">
-  <p:cSld name="Title Slide">
+<p:sldLayout xmlns:a="http://schemas.openxmlformats.org/drawingml/2006/main" xmlns:r="http://schemas.openxmlformats.org/officeDocument/2006/relationships" xmlns:mc="http://schemas.openxmlformats.org/markup-compatibility/2006" xmlns:mv="urn:schemas-microsoft-com:mac:vml" xmlns:p="http://schemas.openxmlformats.org/presentationml/2006/main" mc:Ignorable="mv" mc:PreserveAttributes="mv:*" type="title" preserve="1">
+  <p:cSld name="1_Title Slide">
     <p:spTree>
       <p:nvGrpSpPr>
         <p:cNvPr id="1" name=""/>
@@ -2815,73 +2816,41 @@
           <a:chExt cx="0" cy="0"/>
         </a:xfrm>
       </p:grpSpPr>
-      <p:pic>
-        <p:nvPicPr>
-          <p:cNvPr id="11" name="Picture 1"/>
-          <p:cNvPicPr>
-            <a:picLocks noChangeArrowheads="1"/>
-          </p:cNvPicPr>
-          <p:nvPr userDrawn="1"/>
-        </p:nvPicPr>
-        <p:blipFill>
-          <a:blip r:embed="rId2"/>
-          <a:srcRect/>
-          <a:stretch>
-            <a:fillRect/>
-          </a:stretch>
-        </p:blipFill>
-        <p:spPr bwMode="auto">
-          <a:xfrm>
-            <a:off x="7130616" y="570391"/>
-            <a:ext cx="1644429" cy="1289027"/>
-          </a:xfrm>
-          <a:prstGeom prst="rect">
-            <a:avLst/>
-          </a:prstGeom>
-          <a:noFill/>
-          <a:ln w="12700">
-            <a:noFill/>
-            <a:miter lim="800000"/>
-            <a:headEnd/>
-            <a:tailEnd/>
-          </a:ln>
-        </p:spPr>
-      </p:pic>
-      <p:sp>
-        <p:nvSpPr>
-          <p:cNvPr id="8" name="Rectangle 7"/>
-          <p:cNvSpPr/>
-          <p:nvPr userDrawn="1"/>
+      <p:sp>
+        <p:nvSpPr>
+          <p:cNvPr id="3" name="Subtitle 2"/>
+          <p:cNvSpPr>
+            <a:spLocks noGrp="1"/>
+          </p:cNvSpPr>
+          <p:nvPr>
+            <p:ph type="subTitle" idx="1"/>
+          </p:nvPr>
         </p:nvSpPr>
         <p:spPr>
           <a:xfrm>
-            <a:off x="0" y="2157319"/>
-            <a:ext cx="8923005" cy="877234"/>
+            <a:off x="914400" y="3034553"/>
+            <a:ext cx="8001000" cy="3823447"/>
           </a:xfrm>
-          <a:prstGeom prst="rect">
-            <a:avLst/>
-          </a:prstGeom>
           <a:solidFill>
-            <a:srgbClr val="424242"/>
+            <a:schemeClr val="bg2">
+              <a:lumMod val="40000"/>
+              <a:lumOff val="60000"/>
+            </a:schemeClr>
           </a:solidFill>
           <a:ln>
             <a:noFill/>
           </a:ln>
-          <a:effectLst/>
-          <a:scene3d>
-            <a:camera prst="obliqueTopRight"/>
-            <a:lightRig rig="threePt" dir="tl"/>
-          </a:scene3d>
-          <a:sp3d/>
         </p:spPr>
         <p:style>
-          <a:lnRef idx="1">
-            <a:schemeClr val="accent1"/>
+          <a:lnRef idx="2">
+            <a:schemeClr val="accent1">
+              <a:shade val="50000"/>
+            </a:schemeClr>
           </a:lnRef>
-          <a:fillRef idx="3">
+          <a:fillRef idx="1">
             <a:schemeClr val="accent1"/>
           </a:fillRef>
-          <a:effectRef idx="2">
+          <a:effectRef idx="0">
             <a:schemeClr val="accent1"/>
           </a:effectRef>
           <a:fontRef idx="minor">
@@ -2889,68 +2858,144 @@
           </a:fontRef>
         </p:style>
         <p:txBody>
-          <a:bodyPr rtlCol="0" anchor="ctr"/>
-          <a:lstStyle/>
-          <a:p>
-            <a:pPr algn="ctr"/>
-            <a:endParaRPr lang="en-US"/>
-          </a:p>
-        </p:txBody>
-      </p:sp>
-      <p:pic>
-        <p:nvPicPr>
-          <p:cNvPr id="9" name="Picture 8" descr="SAGA Helvetica Logo.png"/>
-          <p:cNvPicPr>
-            <a:picLocks noChangeAspect="1"/>
-          </p:cNvPicPr>
-          <p:nvPr userDrawn="1"/>
-        </p:nvPicPr>
-        <p:blipFill>
-          <a:blip r:embed="rId3"/>
-          <a:stretch>
-            <a:fillRect/>
-          </a:stretch>
-        </p:blipFill>
+          <a:bodyPr vert="horz" lIns="292608" tIns="91440" rIns="274320" bIns="91440" rtlCol="0" anchor="t" anchorCtr="0">
+            <a:normAutofit/>
+          </a:bodyPr>
+          <a:lstStyle>
+            <a:lvl1pPr marL="0" indent="0" algn="l" defTabSz="914400" rtl="0" eaLnBrk="1" latinLnBrk="0" hangingPunct="1">
+              <a:spcBef>
+                <a:spcPts val="2000"/>
+              </a:spcBef>
+              <a:buClr>
+                <a:schemeClr val="accent1"/>
+              </a:buClr>
+              <a:buFont typeface="Wingdings 2" pitchFamily="18" charset="2"/>
+              <a:buNone/>
+              <a:defRPr sz="2000" kern="1200">
+                <a:solidFill>
+                  <a:schemeClr val="tx1">
+                    <a:lumMod val="65000"/>
+                    <a:lumOff val="35000"/>
+                  </a:schemeClr>
+                </a:solidFill>
+                <a:latin typeface="+mn-lt"/>
+                <a:ea typeface="+mn-ea"/>
+                <a:cs typeface="+mn-cs"/>
+              </a:defRPr>
+            </a:lvl1pPr>
+            <a:lvl2pPr marL="457200" indent="0" algn="ctr">
+              <a:buNone/>
+              <a:defRPr>
+                <a:solidFill>
+                  <a:schemeClr val="tx1">
+                    <a:tint val="75000"/>
+                  </a:schemeClr>
+                </a:solidFill>
+              </a:defRPr>
+            </a:lvl2pPr>
+            <a:lvl3pPr marL="914400" indent="0" algn="ctr">
+              <a:buNone/>
+              <a:defRPr>
+                <a:solidFill>
+                  <a:schemeClr val="tx1">
+                    <a:tint val="75000"/>
+                  </a:schemeClr>
+                </a:solidFill>
+              </a:defRPr>
+            </a:lvl3pPr>
+            <a:lvl4pPr marL="1371600" indent="0" algn="ctr">
+              <a:buNone/>
+              <a:defRPr>
+                <a:solidFill>
+                  <a:schemeClr val="tx1">
+                    <a:tint val="75000"/>
+                  </a:schemeClr>
+                </a:solidFill>
+              </a:defRPr>
+            </a:lvl4pPr>
+            <a:lvl5pPr marL="1828800" indent="0" algn="ctr">
+              <a:buNone/>
+              <a:defRPr>
+                <a:solidFill>
+                  <a:schemeClr val="tx1">
+                    <a:tint val="75000"/>
+                  </a:schemeClr>
+                </a:solidFill>
+              </a:defRPr>
+            </a:lvl5pPr>
+            <a:lvl6pPr marL="2286000" indent="0" algn="ctr">
+              <a:buNone/>
+              <a:defRPr>
+                <a:solidFill>
+                  <a:schemeClr val="tx1">
+                    <a:tint val="75000"/>
+                  </a:schemeClr>
+                </a:solidFill>
+              </a:defRPr>
+            </a:lvl6pPr>
+            <a:lvl7pPr marL="2743200" indent="0" algn="ctr">
+              <a:buNone/>
+              <a:defRPr>
+                <a:solidFill>
+                  <a:schemeClr val="tx1">
+                    <a:tint val="75000"/>
+                  </a:schemeClr>
+                </a:solidFill>
+              </a:defRPr>
+            </a:lvl7pPr>
+            <a:lvl8pPr marL="3200400" indent="0" algn="ctr">
+              <a:buNone/>
+              <a:defRPr>
+                <a:solidFill>
+                  <a:schemeClr val="tx1">
+                    <a:tint val="75000"/>
+                  </a:schemeClr>
+                </a:solidFill>
+              </a:defRPr>
+            </a:lvl8pPr>
+            <a:lvl9pPr marL="3657600" indent="0" algn="ctr">
+              <a:buNone/>
+              <a:defRPr>
+                <a:solidFill>
+                  <a:schemeClr val="tx1">
+                    <a:tint val="75000"/>
+                  </a:schemeClr>
+                </a:solidFill>
+              </a:defRPr>
+            </a:lvl9pPr>
+          </a:lstStyle>
+          <a:p>
+            <a:r>
+              <a:rPr lang="en-US" dirty="0" smtClean="0"/>
+              <a:t>Click to edit Master subtitle style</a:t>
+            </a:r>
+            <a:endParaRPr dirty="0"/>
+          </a:p>
+        </p:txBody>
+      </p:sp>
+      <p:sp>
+        <p:nvSpPr>
+          <p:cNvPr id="2" name="Title 1"/>
+          <p:cNvSpPr>
+            <a:spLocks noGrp="1"/>
+          </p:cNvSpPr>
+          <p:nvPr>
+            <p:ph type="ctrTitle"/>
+          </p:nvPr>
+        </p:nvSpPr>
         <p:spPr>
           <a:xfrm>
-            <a:off x="1226205" y="2251145"/>
-            <a:ext cx="2892308" cy="707358"/>
+            <a:off x="0" y="2157319"/>
+            <a:ext cx="8915400" cy="877824"/>
           </a:xfrm>
-          <a:prstGeom prst="rect">
-            <a:avLst/>
-          </a:prstGeom>
         </p:spPr>
-      </p:pic>
-      <p:sp>
-        <p:nvSpPr>
-          <p:cNvPr id="14" name="Title 13"/>
-          <p:cNvSpPr>
-            <a:spLocks noGrp="1"/>
-          </p:cNvSpPr>
-          <p:nvPr>
-            <p:ph type="title"/>
-          </p:nvPr>
-        </p:nvSpPr>
-        <p:spPr>
-          <a:xfrm>
-            <a:off x="914400" y="3043020"/>
-            <a:ext cx="8001000" cy="3814980"/>
-          </a:xfrm>
-          <a:solidFill>
-            <a:srgbClr val="E4E6DE"/>
-          </a:solidFill>
-        </p:spPr>
-        <p:txBody>
-          <a:bodyPr lIns="274320" tIns="91440" bIns="91440" anchor="t" anchorCtr="0">
-            <a:noAutofit/>
+        <p:txBody>
+          <a:bodyPr>
+            <a:normAutofit/>
           </a:bodyPr>
           <a:lstStyle>
             <a:lvl1pPr>
-              <a:defRPr sz="2000">
-                <a:solidFill>
-                  <a:srgbClr val="595959"/>
-                </a:solidFill>
-              </a:defRPr>
+              <a:defRPr sz="3800"/>
             </a:lvl1pPr>
           </a:lstStyle>
           <a:p>
@@ -2958,60 +3003,74 @@
               <a:rPr lang="en-US" dirty="0" smtClean="0"/>
               <a:t>Click to edit Master title style</a:t>
             </a:r>
+            <a:endParaRPr dirty="0"/>
+          </a:p>
+        </p:txBody>
+      </p:sp>
+      <p:sp>
+        <p:nvSpPr>
+          <p:cNvPr id="4" name="Date Placeholder 3"/>
+          <p:cNvSpPr>
+            <a:spLocks noGrp="1"/>
+          </p:cNvSpPr>
+          <p:nvPr>
+            <p:ph type="dt" sz="half" idx="10"/>
+          </p:nvPr>
+        </p:nvSpPr>
+        <p:spPr/>
+        <p:txBody>
+          <a:bodyPr/>
+          <a:lstStyle/>
+          <a:p>
+            <a:fld id="{4C4AD4EB-88D0-C141-9474-CCD86A78CB94}" type="datetimeFigureOut">
+              <a:rPr lang="en-US" smtClean="0"/>
+              <a:pPr/>
+              <a:t>9/14/10</a:t>
+            </a:fld>
             <a:endParaRPr lang="en-US" dirty="0"/>
           </a:p>
         </p:txBody>
       </p:sp>
       <p:sp>
         <p:nvSpPr>
-          <p:cNvPr id="6" name="Date Placeholder 5"/>
-          <p:cNvSpPr>
-            <a:spLocks noGrp="1"/>
-          </p:cNvSpPr>
-          <p:nvPr>
-            <p:ph type="dt" sz="half" idx="10"/>
-          </p:nvPr>
-        </p:nvSpPr>
-        <p:spPr>
-          <a:xfrm>
-            <a:off x="6580094" y="6492875"/>
-            <a:ext cx="2133600" cy="365125"/>
-          </a:xfrm>
-        </p:spPr>
+          <p:cNvPr id="5" name="Footer Placeholder 4"/>
+          <p:cNvSpPr>
+            <a:spLocks noGrp="1"/>
+          </p:cNvSpPr>
+          <p:nvPr>
+            <p:ph type="ftr" sz="quarter" idx="11"/>
+          </p:nvPr>
+        </p:nvSpPr>
+        <p:spPr/>
         <p:txBody>
           <a:bodyPr/>
           <a:lstStyle/>
           <a:p>
-            <a:fld id="{ADB8239A-D789-5443-937F-338E3AE3D41C}" type="datetime1">
+            <a:endParaRPr lang="en-US" dirty="0"/>
+          </a:p>
+        </p:txBody>
+      </p:sp>
+      <p:sp>
+        <p:nvSpPr>
+          <p:cNvPr id="6" name="Slide Number Placeholder 5"/>
+          <p:cNvSpPr>
+            <a:spLocks noGrp="1"/>
+          </p:cNvSpPr>
+          <p:nvPr>
+            <p:ph type="sldNum" sz="quarter" idx="12"/>
+          </p:nvPr>
+        </p:nvSpPr>
+        <p:spPr/>
+        <p:txBody>
+          <a:bodyPr/>
+          <a:lstStyle/>
+          <a:p>
+            <a:fld id="{DF7665AF-92BA-E649-941D-268879B3EA81}" type="slidenum">
               <a:rPr lang="en-US" smtClean="0"/>
               <a:pPr/>
-              <a:t>9/15/10</a:t>
+              <a:t>‹#›</a:t>
             </a:fld>
             <a:endParaRPr lang="en-US"/>
-          </a:p>
-        </p:txBody>
-      </p:sp>
-      <p:sp>
-        <p:nvSpPr>
-          <p:cNvPr id="10" name="Footer Placeholder 9"/>
-          <p:cNvSpPr>
-            <a:spLocks noGrp="1"/>
-          </p:cNvSpPr>
-          <p:nvPr>
-            <p:ph type="ftr" sz="quarter" idx="12"/>
-          </p:nvPr>
-        </p:nvSpPr>
-        <p:spPr>
-          <a:xfrm>
-            <a:off x="1120588" y="6492875"/>
-            <a:ext cx="2895600" cy="365125"/>
-          </a:xfrm>
-        </p:spPr>
-        <p:txBody>
-          <a:bodyPr/>
-          <a:lstStyle/>
-          <a:p>
-            <a:endParaRPr lang="en-US" dirty="0"/>
           </a:p>
         </p:txBody>
       </p:sp>
@@ -3024,6 +3083,345 @@
 </file>
 
 <file path=ppt/slideLayouts/slideLayout10.xml><?xml version="1.0" encoding="utf-8"?>
+<p:sldLayout xmlns:a="http://schemas.openxmlformats.org/drawingml/2006/main" xmlns:r="http://schemas.openxmlformats.org/officeDocument/2006/relationships" xmlns:mc="http://schemas.openxmlformats.org/markup-compatibility/2006" xmlns:mv="urn:schemas-microsoft-com:mac:vml" xmlns:p="http://schemas.openxmlformats.org/presentationml/2006/main" mc:Ignorable="mv" mc:PreserveAttributes="mv:*" type="objTx" preserve="1">
+  <p:cSld name="Content with Caption">
+    <p:spTree>
+      <p:nvGrpSpPr>
+        <p:cNvPr id="1" name=""/>
+        <p:cNvGrpSpPr/>
+        <p:nvPr/>
+      </p:nvGrpSpPr>
+      <p:grpSpPr>
+        <a:xfrm>
+          <a:off x="0" y="0"/>
+          <a:ext cx="0" cy="0"/>
+          <a:chOff x="0" y="0"/>
+          <a:chExt cx="0" cy="0"/>
+        </a:xfrm>
+      </p:grpSpPr>
+      <p:sp>
+        <p:nvSpPr>
+          <p:cNvPr id="2" name="Title 1"/>
+          <p:cNvSpPr>
+            <a:spLocks noGrp="1"/>
+          </p:cNvSpPr>
+          <p:nvPr>
+            <p:ph type="title"/>
+          </p:nvPr>
+        </p:nvSpPr>
+        <p:spPr>
+          <a:xfrm>
+            <a:off x="0" y="1124712"/>
+            <a:ext cx="8915400" cy="914400"/>
+          </a:xfrm>
+          <a:solidFill>
+            <a:schemeClr val="tx2"/>
+          </a:solidFill>
+        </p:spPr>
+        <p:txBody>
+          <a:bodyPr vert="horz" lIns="1188720" tIns="45720" rIns="274320" bIns="45720" rtlCol="0" anchor="ctr">
+            <a:normAutofit/>
+          </a:bodyPr>
+          <a:lstStyle>
+            <a:lvl1pPr marL="0" indent="0" algn="l" defTabSz="914400" rtl="0" eaLnBrk="1" latinLnBrk="0" hangingPunct="1">
+              <a:spcBef>
+                <a:spcPct val="0"/>
+              </a:spcBef>
+              <a:buNone/>
+              <a:defRPr sz="3600" kern="1200">
+                <a:solidFill>
+                  <a:schemeClr val="bg1"/>
+                </a:solidFill>
+                <a:latin typeface="+mj-lt"/>
+                <a:ea typeface="+mj-ea"/>
+                <a:cs typeface="+mj-cs"/>
+              </a:defRPr>
+            </a:lvl1pPr>
+          </a:lstStyle>
+          <a:p>
+            <a:r>
+              <a:rPr lang="en-US" smtClean="0"/>
+              <a:t>Click to edit Master title style</a:t>
+            </a:r>
+            <a:endParaRPr/>
+          </a:p>
+        </p:txBody>
+      </p:sp>
+      <p:sp>
+        <p:nvSpPr>
+          <p:cNvPr id="3" name="Content Placeholder 2"/>
+          <p:cNvSpPr>
+            <a:spLocks noGrp="1"/>
+          </p:cNvSpPr>
+          <p:nvPr>
+            <p:ph idx="1"/>
+          </p:nvPr>
+        </p:nvSpPr>
+        <p:spPr>
+          <a:xfrm>
+            <a:off x="5147534" y="2590800"/>
+            <a:ext cx="3566160" cy="3686175"/>
+          </a:xfrm>
+        </p:spPr>
+        <p:txBody>
+          <a:bodyPr/>
+          <a:lstStyle>
+            <a:lvl1pPr>
+              <a:defRPr sz="1800"/>
+            </a:lvl1pPr>
+            <a:lvl2pPr>
+              <a:defRPr sz="1800"/>
+            </a:lvl2pPr>
+            <a:lvl3pPr>
+              <a:defRPr sz="1800"/>
+            </a:lvl3pPr>
+            <a:lvl4pPr>
+              <a:defRPr sz="1800"/>
+            </a:lvl4pPr>
+            <a:lvl5pPr>
+              <a:defRPr sz="1800"/>
+            </a:lvl5pPr>
+            <a:lvl6pPr>
+              <a:defRPr sz="2000"/>
+            </a:lvl6pPr>
+            <a:lvl7pPr>
+              <a:defRPr sz="2000"/>
+            </a:lvl7pPr>
+            <a:lvl8pPr>
+              <a:defRPr sz="2000"/>
+            </a:lvl8pPr>
+            <a:lvl9pPr>
+              <a:defRPr sz="2000"/>
+            </a:lvl9pPr>
+          </a:lstStyle>
+          <a:p>
+            <a:pPr lvl="0"/>
+            <a:r>
+              <a:rPr lang="en-US" smtClean="0"/>
+              <a:t>Click to edit Master text styles</a:t>
+            </a:r>
+          </a:p>
+          <a:p>
+            <a:pPr lvl="1"/>
+            <a:r>
+              <a:rPr lang="en-US" smtClean="0"/>
+              <a:t>Second level</a:t>
+            </a:r>
+          </a:p>
+          <a:p>
+            <a:pPr lvl="2"/>
+            <a:r>
+              <a:rPr lang="en-US" smtClean="0"/>
+              <a:t>Third level</a:t>
+            </a:r>
+          </a:p>
+          <a:p>
+            <a:pPr lvl="3"/>
+            <a:r>
+              <a:rPr lang="en-US" smtClean="0"/>
+              <a:t>Fourth level</a:t>
+            </a:r>
+          </a:p>
+          <a:p>
+            <a:pPr lvl="4"/>
+            <a:r>
+              <a:rPr lang="en-US" smtClean="0"/>
+              <a:t>Fifth level</a:t>
+            </a:r>
+            <a:endParaRPr/>
+          </a:p>
+        </p:txBody>
+      </p:sp>
+      <p:sp>
+        <p:nvSpPr>
+          <p:cNvPr id="4" name="Text Placeholder 3"/>
+          <p:cNvSpPr>
+            <a:spLocks noGrp="1"/>
+          </p:cNvSpPr>
+          <p:nvPr>
+            <p:ph type="body" sz="half" idx="2"/>
+          </p:nvPr>
+        </p:nvSpPr>
+        <p:spPr>
+          <a:xfrm>
+            <a:off x="900952" y="2039111"/>
+            <a:ext cx="3566160" cy="4224528"/>
+          </a:xfrm>
+          <a:solidFill>
+            <a:schemeClr val="bg2">
+              <a:lumMod val="40000"/>
+              <a:lumOff val="60000"/>
+            </a:schemeClr>
+          </a:solidFill>
+          <a:ln>
+            <a:noFill/>
+          </a:ln>
+        </p:spPr>
+        <p:style>
+          <a:lnRef idx="2">
+            <a:schemeClr val="accent1">
+              <a:shade val="50000"/>
+            </a:schemeClr>
+          </a:lnRef>
+          <a:fillRef idx="1">
+            <a:schemeClr val="accent1"/>
+          </a:fillRef>
+          <a:effectRef idx="0">
+            <a:schemeClr val="accent1"/>
+          </a:effectRef>
+          <a:fontRef idx="minor">
+            <a:schemeClr val="lt1"/>
+          </a:fontRef>
+        </p:style>
+        <p:txBody>
+          <a:bodyPr vert="horz" lIns="292608" tIns="274320" rIns="274320" bIns="274320" rtlCol="0" anchor="t" anchorCtr="0">
+            <a:normAutofit/>
+          </a:bodyPr>
+          <a:lstStyle>
+            <a:lvl1pPr marL="0" indent="0" algn="l" defTabSz="914400" rtl="0" eaLnBrk="1" latinLnBrk="0" hangingPunct="1">
+              <a:spcBef>
+                <a:spcPts val="2000"/>
+              </a:spcBef>
+              <a:buClr>
+                <a:schemeClr val="accent1"/>
+              </a:buClr>
+              <a:buFont typeface="Wingdings 2" pitchFamily="18" charset="2"/>
+              <a:buNone/>
+              <a:defRPr sz="1800" kern="1200">
+                <a:solidFill>
+                  <a:schemeClr val="tx1">
+                    <a:lumMod val="65000"/>
+                    <a:lumOff val="35000"/>
+                  </a:schemeClr>
+                </a:solidFill>
+                <a:latin typeface="+mn-lt"/>
+                <a:ea typeface="+mn-ea"/>
+                <a:cs typeface="+mn-cs"/>
+              </a:defRPr>
+            </a:lvl1pPr>
+            <a:lvl2pPr marL="457200" indent="0">
+              <a:buNone/>
+              <a:defRPr sz="1200"/>
+            </a:lvl2pPr>
+            <a:lvl3pPr marL="914400" indent="0">
+              <a:buNone/>
+              <a:defRPr sz="1000"/>
+            </a:lvl3pPr>
+            <a:lvl4pPr marL="1371600" indent="0">
+              <a:buNone/>
+              <a:defRPr sz="900"/>
+            </a:lvl4pPr>
+            <a:lvl5pPr marL="1828800" indent="0">
+              <a:buNone/>
+              <a:defRPr sz="900"/>
+            </a:lvl5pPr>
+            <a:lvl6pPr marL="2286000" indent="0">
+              <a:buNone/>
+              <a:defRPr sz="900"/>
+            </a:lvl6pPr>
+            <a:lvl7pPr marL="2743200" indent="0">
+              <a:buNone/>
+              <a:defRPr sz="900"/>
+            </a:lvl7pPr>
+            <a:lvl8pPr marL="3200400" indent="0">
+              <a:buNone/>
+              <a:defRPr sz="900"/>
+            </a:lvl8pPr>
+            <a:lvl9pPr marL="3657600" indent="0">
+              <a:buNone/>
+              <a:defRPr sz="900"/>
+            </a:lvl9pPr>
+          </a:lstStyle>
+          <a:p>
+            <a:pPr lvl="0"/>
+            <a:r>
+              <a:rPr lang="en-US" smtClean="0"/>
+              <a:t>Click to edit Master text styles</a:t>
+            </a:r>
+          </a:p>
+        </p:txBody>
+      </p:sp>
+      <p:sp>
+        <p:nvSpPr>
+          <p:cNvPr id="5" name="Date Placeholder 4"/>
+          <p:cNvSpPr>
+            <a:spLocks noGrp="1"/>
+          </p:cNvSpPr>
+          <p:nvPr>
+            <p:ph type="dt" sz="half" idx="10"/>
+          </p:nvPr>
+        </p:nvSpPr>
+        <p:spPr>
+          <a:xfrm>
+            <a:off x="6580094" y="188259"/>
+            <a:ext cx="2133600" cy="365125"/>
+          </a:xfrm>
+        </p:spPr>
+        <p:txBody>
+          <a:bodyPr/>
+          <a:lstStyle/>
+          <a:p>
+            <a:fld id="{F19CAA94-9393-BB4A-8CB6-008B1351A132}" type="datetime1">
+              <a:rPr lang="en-US" smtClean="0"/>
+              <a:pPr/>
+              <a:t>9/15/10</a:t>
+            </a:fld>
+            <a:endParaRPr lang="en-US"/>
+          </a:p>
+        </p:txBody>
+      </p:sp>
+      <p:sp>
+        <p:nvSpPr>
+          <p:cNvPr id="6" name="Footer Placeholder 5"/>
+          <p:cNvSpPr>
+            <a:spLocks noGrp="1"/>
+          </p:cNvSpPr>
+          <p:nvPr>
+            <p:ph type="ftr" sz="quarter" idx="11"/>
+          </p:nvPr>
+        </p:nvSpPr>
+        <p:spPr/>
+        <p:txBody>
+          <a:bodyPr/>
+          <a:lstStyle/>
+          <a:p>
+            <a:endParaRPr lang="en-US"/>
+          </a:p>
+        </p:txBody>
+      </p:sp>
+      <p:sp>
+        <p:nvSpPr>
+          <p:cNvPr id="7" name="Slide Number Placeholder 6"/>
+          <p:cNvSpPr>
+            <a:spLocks noGrp="1"/>
+          </p:cNvSpPr>
+          <p:nvPr>
+            <p:ph type="sldNum" sz="quarter" idx="12"/>
+          </p:nvPr>
+        </p:nvSpPr>
+        <p:spPr/>
+        <p:txBody>
+          <a:bodyPr/>
+          <a:lstStyle/>
+          <a:p>
+            <a:fld id="{DF7665AF-92BA-E649-941D-268879B3EA81}" type="slidenum">
+              <a:rPr lang="en-US" smtClean="0"/>
+              <a:pPr/>
+              <a:t>‹#›</a:t>
+            </a:fld>
+            <a:endParaRPr lang="en-US"/>
+          </a:p>
+        </p:txBody>
+      </p:sp>
+    </p:spTree>
+  </p:cSld>
+  <p:clrMapOvr>
+    <a:masterClrMapping/>
+  </p:clrMapOvr>
+</p:sldLayout>
+</file>
+
+<file path=ppt/slideLayouts/slideLayout11.xml><?xml version="1.0" encoding="utf-8"?>
 <p:sldLayout xmlns:a="http://schemas.openxmlformats.org/drawingml/2006/main" xmlns:r="http://schemas.openxmlformats.org/officeDocument/2006/relationships" xmlns:mc="http://schemas.openxmlformats.org/markup-compatibility/2006" xmlns:mv="urn:schemas-microsoft-com:mac:vml" xmlns:p="http://schemas.openxmlformats.org/presentationml/2006/main" mc:Ignorable="mv" mc:PreserveAttributes="mv:*" type="picTx" preserve="1">
   <p:cSld name="Picture with Caption">
     <p:spTree>
@@ -3346,7 +3744,7 @@
 </p:sldLayout>
 </file>
 
-<file path=ppt/slideLayouts/slideLayout11.xml><?xml version="1.0" encoding="utf-8"?>
+<file path=ppt/slideLayouts/slideLayout12.xml><?xml version="1.0" encoding="utf-8"?>
 <p:sldLayout xmlns:a="http://schemas.openxmlformats.org/drawingml/2006/main" xmlns:r="http://schemas.openxmlformats.org/officeDocument/2006/relationships" xmlns:mc="http://schemas.openxmlformats.org/markup-compatibility/2006" xmlns:mv="urn:schemas-microsoft-com:mac:vml" xmlns:p="http://schemas.openxmlformats.org/presentationml/2006/main" mc:Ignorable="mv" mc:PreserveAttributes="mv:*" preserve="1">
   <p:cSld name="Picture above Caption">
     <p:spTree>
@@ -3633,7 +4031,7 @@
 </p:sldLayout>
 </file>
 
-<file path=ppt/slideLayouts/slideLayout12.xml><?xml version="1.0" encoding="utf-8"?>
+<file path=ppt/slideLayouts/slideLayout13.xml><?xml version="1.0" encoding="utf-8"?>
 <p:sldLayout xmlns:a="http://schemas.openxmlformats.org/drawingml/2006/main" xmlns:r="http://schemas.openxmlformats.org/officeDocument/2006/relationships" xmlns:mc="http://schemas.openxmlformats.org/markup-compatibility/2006" xmlns:mv="urn:schemas-microsoft-com:mac:vml" xmlns:p="http://schemas.openxmlformats.org/presentationml/2006/main" mc:Ignorable="mv" mc:PreserveAttributes="mv:*" preserve="1">
   <p:cSld name="2 Pictures with Caption">
     <p:spTree>
@@ -3960,7 +4358,7 @@
 </p:sldLayout>
 </file>
 
-<file path=ppt/slideLayouts/slideLayout13.xml><?xml version="1.0" encoding="utf-8"?>
+<file path=ppt/slideLayouts/slideLayout14.xml><?xml version="1.0" encoding="utf-8"?>
 <p:sldLayout xmlns:a="http://schemas.openxmlformats.org/drawingml/2006/main" xmlns:r="http://schemas.openxmlformats.org/officeDocument/2006/relationships" xmlns:mc="http://schemas.openxmlformats.org/markup-compatibility/2006" xmlns:mv="urn:schemas-microsoft-com:mac:vml" xmlns:p="http://schemas.openxmlformats.org/presentationml/2006/main" mc:Ignorable="mv" mc:PreserveAttributes="mv:*" preserve="1">
   <p:cSld name="3 Pictures with Caption">
     <p:spTree>
@@ -4322,7 +4720,7 @@
 </p:sldLayout>
 </file>
 
-<file path=ppt/slideLayouts/slideLayout14.xml><?xml version="1.0" encoding="utf-8"?>
+<file path=ppt/slideLayouts/slideLayout15.xml><?xml version="1.0" encoding="utf-8"?>
 <p:sldLayout xmlns:a="http://schemas.openxmlformats.org/drawingml/2006/main" xmlns:r="http://schemas.openxmlformats.org/officeDocument/2006/relationships" xmlns:mc="http://schemas.openxmlformats.org/markup-compatibility/2006" xmlns:mv="urn:schemas-microsoft-com:mac:vml" xmlns:p="http://schemas.openxmlformats.org/presentationml/2006/main" mc:Ignorable="mv" mc:PreserveAttributes="mv:*" type="vertTx" preserve="1">
   <p:cSld name="Title and Vertical Text">
     <p:spTree>
@@ -4489,7 +4887,7 @@
 </p:sldLayout>
 </file>
 
-<file path=ppt/slideLayouts/slideLayout15.xml><?xml version="1.0" encoding="utf-8"?>
+<file path=ppt/slideLayouts/slideLayout16.xml><?xml version="1.0" encoding="utf-8"?>
 <p:sldLayout xmlns:a="http://schemas.openxmlformats.org/drawingml/2006/main" xmlns:r="http://schemas.openxmlformats.org/officeDocument/2006/relationships" xmlns:mc="http://schemas.openxmlformats.org/markup-compatibility/2006" xmlns:mv="urn:schemas-microsoft-com:mac:vml" xmlns:p="http://schemas.openxmlformats.org/presentationml/2006/main" mc:Ignorable="mv" mc:PreserveAttributes="mv:*" type="vertTitleAndTx" preserve="1">
   <p:cSld name="Vertical Title and Text">
     <p:spTree>
@@ -4666,7 +5064,970 @@
 </p:sldLayout>
 </file>
 
+<file path=ppt/slideLayouts/slideLayout17.xml><?xml version="1.0" encoding="utf-8"?>
+<p:sldLayout xmlns:a="http://schemas.openxmlformats.org/drawingml/2006/main" xmlns:r="http://schemas.openxmlformats.org/officeDocument/2006/relationships" xmlns:mc="http://schemas.openxmlformats.org/markup-compatibility/2006" xmlns:mv="urn:schemas-microsoft-com:mac:vml" xmlns:p="http://schemas.openxmlformats.org/presentationml/2006/main" mc:Ignorable="mv" mc:PreserveAttributes="mv:*" type="titleOnly" preserve="1">
+  <p:cSld name="Title Only">
+    <p:spTree>
+      <p:nvGrpSpPr>
+        <p:cNvPr id="1" name=""/>
+        <p:cNvGrpSpPr/>
+        <p:nvPr/>
+      </p:nvGrpSpPr>
+      <p:grpSpPr>
+        <a:xfrm>
+          <a:off x="0" y="0"/>
+          <a:ext cx="0" cy="0"/>
+          <a:chOff x="0" y="0"/>
+          <a:chExt cx="0" cy="0"/>
+        </a:xfrm>
+      </p:grpSpPr>
+      <p:sp>
+        <p:nvSpPr>
+          <p:cNvPr id="2" name="Title 1"/>
+          <p:cNvSpPr>
+            <a:spLocks noGrp="1"/>
+          </p:cNvSpPr>
+          <p:nvPr>
+            <p:ph type="title"/>
+          </p:nvPr>
+        </p:nvSpPr>
+        <p:spPr/>
+        <p:txBody>
+          <a:bodyPr/>
+          <a:lstStyle/>
+          <a:p>
+            <a:r>
+              <a:rPr lang="en-US" smtClean="0"/>
+              <a:t>Click to edit Master title style</a:t>
+            </a:r>
+            <a:endParaRPr/>
+          </a:p>
+        </p:txBody>
+      </p:sp>
+      <p:sp>
+        <p:nvSpPr>
+          <p:cNvPr id="3" name="Date Placeholder 2"/>
+          <p:cNvSpPr>
+            <a:spLocks noGrp="1"/>
+          </p:cNvSpPr>
+          <p:nvPr>
+            <p:ph type="dt" sz="half" idx="10"/>
+          </p:nvPr>
+        </p:nvSpPr>
+        <p:spPr/>
+        <p:txBody>
+          <a:bodyPr/>
+          <a:lstStyle/>
+          <a:p>
+            <a:fld id="{4C4AD4EB-88D0-C141-9474-CCD86A78CB94}" type="datetimeFigureOut">
+              <a:rPr lang="en-US" smtClean="0"/>
+              <a:pPr/>
+              <a:t>9/14/10</a:t>
+            </a:fld>
+            <a:endParaRPr lang="en-US"/>
+          </a:p>
+        </p:txBody>
+      </p:sp>
+      <p:sp>
+        <p:nvSpPr>
+          <p:cNvPr id="4" name="Footer Placeholder 3"/>
+          <p:cNvSpPr>
+            <a:spLocks noGrp="1"/>
+          </p:cNvSpPr>
+          <p:nvPr>
+            <p:ph type="ftr" sz="quarter" idx="11"/>
+          </p:nvPr>
+        </p:nvSpPr>
+        <p:spPr/>
+        <p:txBody>
+          <a:bodyPr/>
+          <a:lstStyle/>
+          <a:p>
+            <a:endParaRPr lang="en-US"/>
+          </a:p>
+        </p:txBody>
+      </p:sp>
+      <p:sp>
+        <p:nvSpPr>
+          <p:cNvPr id="5" name="Slide Number Placeholder 4"/>
+          <p:cNvSpPr>
+            <a:spLocks noGrp="1"/>
+          </p:cNvSpPr>
+          <p:nvPr>
+            <p:ph type="sldNum" sz="quarter" idx="12"/>
+          </p:nvPr>
+        </p:nvSpPr>
+        <p:spPr/>
+        <p:txBody>
+          <a:bodyPr/>
+          <a:lstStyle/>
+          <a:p>
+            <a:fld id="{DF7665AF-92BA-E649-941D-268879B3EA81}" type="slidenum">
+              <a:rPr lang="en-US" smtClean="0"/>
+              <a:pPr/>
+              <a:t>‹#›</a:t>
+            </a:fld>
+            <a:endParaRPr lang="en-US"/>
+          </a:p>
+        </p:txBody>
+      </p:sp>
+    </p:spTree>
+  </p:cSld>
+  <p:clrMapOvr>
+    <a:masterClrMapping/>
+  </p:clrMapOvr>
+</p:sldLayout>
+</file>
+
+<file path=ppt/slideLayouts/slideLayout18.xml><?xml version="1.0" encoding="utf-8"?>
+<p:sldLayout xmlns:a="http://schemas.openxmlformats.org/drawingml/2006/main" xmlns:r="http://schemas.openxmlformats.org/officeDocument/2006/relationships" xmlns:mc="http://schemas.openxmlformats.org/markup-compatibility/2006" xmlns:mv="urn:schemas-microsoft-com:mac:vml" xmlns:p="http://schemas.openxmlformats.org/presentationml/2006/main" mc:Ignorable="mv" mc:PreserveAttributes="mv:*" type="title" preserve="1">
+  <p:cSld name="Title Slide">
+    <p:spTree>
+      <p:nvGrpSpPr>
+        <p:cNvPr id="1" name=""/>
+        <p:cNvGrpSpPr/>
+        <p:nvPr/>
+      </p:nvGrpSpPr>
+      <p:grpSpPr>
+        <a:xfrm>
+          <a:off x="0" y="0"/>
+          <a:ext cx="0" cy="0"/>
+          <a:chOff x="0" y="0"/>
+          <a:chExt cx="0" cy="0"/>
+        </a:xfrm>
+      </p:grpSpPr>
+      <p:sp>
+        <p:nvSpPr>
+          <p:cNvPr id="3" name="Subtitle 2"/>
+          <p:cNvSpPr>
+            <a:spLocks noGrp="1"/>
+          </p:cNvSpPr>
+          <p:nvPr>
+            <p:ph type="subTitle" idx="1"/>
+          </p:nvPr>
+        </p:nvSpPr>
+        <p:spPr>
+          <a:xfrm>
+            <a:off x="914400" y="3034553"/>
+            <a:ext cx="8001000" cy="3823447"/>
+          </a:xfrm>
+          <a:solidFill>
+            <a:schemeClr val="bg2">
+              <a:lumMod val="40000"/>
+              <a:lumOff val="60000"/>
+            </a:schemeClr>
+          </a:solidFill>
+          <a:ln>
+            <a:noFill/>
+          </a:ln>
+        </p:spPr>
+        <p:style>
+          <a:lnRef idx="2">
+            <a:schemeClr val="accent1">
+              <a:shade val="50000"/>
+            </a:schemeClr>
+          </a:lnRef>
+          <a:fillRef idx="1">
+            <a:schemeClr val="accent1"/>
+          </a:fillRef>
+          <a:effectRef idx="0">
+            <a:schemeClr val="accent1"/>
+          </a:effectRef>
+          <a:fontRef idx="minor">
+            <a:schemeClr val="lt1"/>
+          </a:fontRef>
+        </p:style>
+        <p:txBody>
+          <a:bodyPr vert="horz" lIns="292608" tIns="91440" rIns="274320" bIns="91440" rtlCol="0" anchor="t" anchorCtr="0">
+            <a:normAutofit/>
+          </a:bodyPr>
+          <a:lstStyle>
+            <a:lvl1pPr marL="0" indent="0" algn="l" defTabSz="914400" rtl="0" eaLnBrk="1" latinLnBrk="0" hangingPunct="1">
+              <a:spcBef>
+                <a:spcPts val="2000"/>
+              </a:spcBef>
+              <a:buClr>
+                <a:schemeClr val="accent1"/>
+              </a:buClr>
+              <a:buFont typeface="Wingdings 2" pitchFamily="18" charset="2"/>
+              <a:buNone/>
+              <a:defRPr sz="2000" kern="1200">
+                <a:solidFill>
+                  <a:schemeClr val="tx1">
+                    <a:lumMod val="65000"/>
+                    <a:lumOff val="35000"/>
+                  </a:schemeClr>
+                </a:solidFill>
+                <a:latin typeface="+mn-lt"/>
+                <a:ea typeface="+mn-ea"/>
+                <a:cs typeface="+mn-cs"/>
+              </a:defRPr>
+            </a:lvl1pPr>
+            <a:lvl2pPr marL="457200" indent="0" algn="ctr">
+              <a:buNone/>
+              <a:defRPr>
+                <a:solidFill>
+                  <a:schemeClr val="tx1">
+                    <a:tint val="75000"/>
+                  </a:schemeClr>
+                </a:solidFill>
+              </a:defRPr>
+            </a:lvl2pPr>
+            <a:lvl3pPr marL="914400" indent="0" algn="ctr">
+              <a:buNone/>
+              <a:defRPr>
+                <a:solidFill>
+                  <a:schemeClr val="tx1">
+                    <a:tint val="75000"/>
+                  </a:schemeClr>
+                </a:solidFill>
+              </a:defRPr>
+            </a:lvl3pPr>
+            <a:lvl4pPr marL="1371600" indent="0" algn="ctr">
+              <a:buNone/>
+              <a:defRPr>
+                <a:solidFill>
+                  <a:schemeClr val="tx1">
+                    <a:tint val="75000"/>
+                  </a:schemeClr>
+                </a:solidFill>
+              </a:defRPr>
+            </a:lvl4pPr>
+            <a:lvl5pPr marL="1828800" indent="0" algn="ctr">
+              <a:buNone/>
+              <a:defRPr>
+                <a:solidFill>
+                  <a:schemeClr val="tx1">
+                    <a:tint val="75000"/>
+                  </a:schemeClr>
+                </a:solidFill>
+              </a:defRPr>
+            </a:lvl5pPr>
+            <a:lvl6pPr marL="2286000" indent="0" algn="ctr">
+              <a:buNone/>
+              <a:defRPr>
+                <a:solidFill>
+                  <a:schemeClr val="tx1">
+                    <a:tint val="75000"/>
+                  </a:schemeClr>
+                </a:solidFill>
+              </a:defRPr>
+            </a:lvl6pPr>
+            <a:lvl7pPr marL="2743200" indent="0" algn="ctr">
+              <a:buNone/>
+              <a:defRPr>
+                <a:solidFill>
+                  <a:schemeClr val="tx1">
+                    <a:tint val="75000"/>
+                  </a:schemeClr>
+                </a:solidFill>
+              </a:defRPr>
+            </a:lvl7pPr>
+            <a:lvl8pPr marL="3200400" indent="0" algn="ctr">
+              <a:buNone/>
+              <a:defRPr>
+                <a:solidFill>
+                  <a:schemeClr val="tx1">
+                    <a:tint val="75000"/>
+                  </a:schemeClr>
+                </a:solidFill>
+              </a:defRPr>
+            </a:lvl8pPr>
+            <a:lvl9pPr marL="3657600" indent="0" algn="ctr">
+              <a:buNone/>
+              <a:defRPr>
+                <a:solidFill>
+                  <a:schemeClr val="tx1">
+                    <a:tint val="75000"/>
+                  </a:schemeClr>
+                </a:solidFill>
+              </a:defRPr>
+            </a:lvl9pPr>
+          </a:lstStyle>
+          <a:p>
+            <a:r>
+              <a:rPr lang="en-US" dirty="0" smtClean="0"/>
+              <a:t>Click to edit Master subtitle style</a:t>
+            </a:r>
+            <a:endParaRPr dirty="0"/>
+          </a:p>
+        </p:txBody>
+      </p:sp>
+      <p:sp>
+        <p:nvSpPr>
+          <p:cNvPr id="2" name="Title 1"/>
+          <p:cNvSpPr>
+            <a:spLocks noGrp="1"/>
+          </p:cNvSpPr>
+          <p:nvPr>
+            <p:ph type="ctrTitle"/>
+          </p:nvPr>
+        </p:nvSpPr>
+        <p:spPr>
+          <a:xfrm>
+            <a:off x="0" y="2157319"/>
+            <a:ext cx="8915400" cy="877824"/>
+          </a:xfrm>
+        </p:spPr>
+        <p:txBody>
+          <a:bodyPr>
+            <a:normAutofit/>
+          </a:bodyPr>
+          <a:lstStyle>
+            <a:lvl1pPr>
+              <a:defRPr sz="3800"/>
+            </a:lvl1pPr>
+          </a:lstStyle>
+          <a:p>
+            <a:r>
+              <a:rPr lang="en-US" dirty="0" smtClean="0"/>
+              <a:t>Click to edit Master title style</a:t>
+            </a:r>
+            <a:endParaRPr dirty="0"/>
+          </a:p>
+        </p:txBody>
+      </p:sp>
+      <p:sp>
+        <p:nvSpPr>
+          <p:cNvPr id="4" name="Date Placeholder 3"/>
+          <p:cNvSpPr>
+            <a:spLocks noGrp="1"/>
+          </p:cNvSpPr>
+          <p:nvPr>
+            <p:ph type="dt" sz="half" idx="10"/>
+          </p:nvPr>
+        </p:nvSpPr>
+        <p:spPr/>
+        <p:txBody>
+          <a:bodyPr/>
+          <a:lstStyle/>
+          <a:p>
+            <a:fld id="{4C4AD4EB-88D0-C141-9474-CCD86A78CB94}" type="datetimeFigureOut">
+              <a:rPr lang="en-US" smtClean="0"/>
+              <a:pPr/>
+              <a:t>9/14/10</a:t>
+            </a:fld>
+            <a:endParaRPr lang="en-US" dirty="0"/>
+          </a:p>
+        </p:txBody>
+      </p:sp>
+      <p:sp>
+        <p:nvSpPr>
+          <p:cNvPr id="5" name="Footer Placeholder 4"/>
+          <p:cNvSpPr>
+            <a:spLocks noGrp="1"/>
+          </p:cNvSpPr>
+          <p:nvPr>
+            <p:ph type="ftr" sz="quarter" idx="11"/>
+          </p:nvPr>
+        </p:nvSpPr>
+        <p:spPr/>
+        <p:txBody>
+          <a:bodyPr/>
+          <a:lstStyle/>
+          <a:p>
+            <a:endParaRPr lang="en-US" dirty="0"/>
+          </a:p>
+        </p:txBody>
+      </p:sp>
+      <p:sp>
+        <p:nvSpPr>
+          <p:cNvPr id="6" name="Slide Number Placeholder 5"/>
+          <p:cNvSpPr>
+            <a:spLocks noGrp="1"/>
+          </p:cNvSpPr>
+          <p:nvPr>
+            <p:ph type="sldNum" sz="quarter" idx="12"/>
+          </p:nvPr>
+        </p:nvSpPr>
+        <p:spPr/>
+        <p:txBody>
+          <a:bodyPr/>
+          <a:lstStyle/>
+          <a:p>
+            <a:fld id="{DF7665AF-92BA-E649-941D-268879B3EA81}" type="slidenum">
+              <a:rPr lang="en-US" smtClean="0"/>
+              <a:pPr/>
+              <a:t>‹#›</a:t>
+            </a:fld>
+            <a:endParaRPr lang="en-US"/>
+          </a:p>
+        </p:txBody>
+      </p:sp>
+    </p:spTree>
+  </p:cSld>
+  <p:clrMapOvr>
+    <a:masterClrMapping/>
+  </p:clrMapOvr>
+</p:sldLayout>
+</file>
+
+<file path=ppt/slideLayouts/slideLayout19.xml><?xml version="1.0" encoding="utf-8"?>
+<p:sldLayout xmlns:a="http://schemas.openxmlformats.org/drawingml/2006/main" xmlns:r="http://schemas.openxmlformats.org/officeDocument/2006/relationships" xmlns:mc="http://schemas.openxmlformats.org/markup-compatibility/2006" xmlns:mv="urn:schemas-microsoft-com:mac:vml" xmlns:p="http://schemas.openxmlformats.org/presentationml/2006/main" mc:Ignorable="mv" mc:PreserveAttributes="mv:*" type="obj" preserve="1">
+  <p:cSld name="Title and Content">
+    <p:spTree>
+      <p:nvGrpSpPr>
+        <p:cNvPr id="1" name=""/>
+        <p:cNvGrpSpPr/>
+        <p:nvPr/>
+      </p:nvGrpSpPr>
+      <p:grpSpPr>
+        <a:xfrm>
+          <a:off x="0" y="0"/>
+          <a:ext cx="0" cy="0"/>
+          <a:chOff x="0" y="0"/>
+          <a:chExt cx="0" cy="0"/>
+        </a:xfrm>
+      </p:grpSpPr>
+      <p:sp>
+        <p:nvSpPr>
+          <p:cNvPr id="2" name="Title 1"/>
+          <p:cNvSpPr>
+            <a:spLocks noGrp="1"/>
+          </p:cNvSpPr>
+          <p:nvPr>
+            <p:ph type="title"/>
+          </p:nvPr>
+        </p:nvSpPr>
+        <p:spPr/>
+        <p:txBody>
+          <a:bodyPr/>
+          <a:lstStyle/>
+          <a:p>
+            <a:r>
+              <a:rPr lang="en-US" dirty="0" smtClean="0"/>
+              <a:t>Click to edit Master title style</a:t>
+            </a:r>
+            <a:endParaRPr dirty="0"/>
+          </a:p>
+        </p:txBody>
+      </p:sp>
+      <p:sp>
+        <p:nvSpPr>
+          <p:cNvPr id="3" name="Content Placeholder 2"/>
+          <p:cNvSpPr>
+            <a:spLocks noGrp="1"/>
+          </p:cNvSpPr>
+          <p:nvPr>
+            <p:ph idx="1"/>
+          </p:nvPr>
+        </p:nvSpPr>
+        <p:spPr>
+          <a:xfrm>
+            <a:off x="757947" y="1529880"/>
+            <a:ext cx="7966954" cy="4608884"/>
+          </a:xfrm>
+        </p:spPr>
+        <p:txBody>
+          <a:bodyPr/>
+          <a:lstStyle>
+            <a:lvl1pPr>
+              <a:buClr>
+                <a:schemeClr val="tx1">
+                  <a:lumMod val="75000"/>
+                  <a:lumOff val="25000"/>
+                </a:schemeClr>
+              </a:buClr>
+              <a:defRPr/>
+            </a:lvl1pPr>
+            <a:lvl2pPr>
+              <a:buClr>
+                <a:schemeClr val="tx1">
+                  <a:lumMod val="95000"/>
+                  <a:lumOff val="5000"/>
+                </a:schemeClr>
+              </a:buClr>
+              <a:defRPr/>
+            </a:lvl2pPr>
+            <a:lvl3pPr>
+              <a:buClr>
+                <a:schemeClr val="tx1">
+                  <a:lumMod val="75000"/>
+                  <a:lumOff val="25000"/>
+                </a:schemeClr>
+              </a:buClr>
+              <a:defRPr/>
+            </a:lvl3pPr>
+            <a:lvl4pPr>
+              <a:buClr>
+                <a:schemeClr val="bg2"/>
+              </a:buClr>
+              <a:defRPr/>
+            </a:lvl4pPr>
+            <a:lvl5pPr>
+              <a:buClr>
+                <a:schemeClr val="tx1">
+                  <a:lumMod val="75000"/>
+                  <a:lumOff val="25000"/>
+                </a:schemeClr>
+              </a:buClr>
+              <a:defRPr/>
+            </a:lvl5pPr>
+          </a:lstStyle>
+          <a:p>
+            <a:pPr lvl="0"/>
+            <a:r>
+              <a:rPr lang="en-US" dirty="0" smtClean="0"/>
+              <a:t>Click to edit Master text styles</a:t>
+            </a:r>
+          </a:p>
+          <a:p>
+            <a:pPr lvl="1"/>
+            <a:r>
+              <a:rPr lang="en-US" dirty="0" smtClean="0"/>
+              <a:t>Second level</a:t>
+            </a:r>
+          </a:p>
+          <a:p>
+            <a:pPr lvl="2"/>
+            <a:r>
+              <a:rPr lang="en-US" dirty="0" smtClean="0"/>
+              <a:t>Third level</a:t>
+            </a:r>
+          </a:p>
+          <a:p>
+            <a:pPr lvl="3"/>
+            <a:r>
+              <a:rPr lang="en-US" dirty="0" smtClean="0"/>
+              <a:t>Fourth level</a:t>
+            </a:r>
+          </a:p>
+          <a:p>
+            <a:pPr lvl="4"/>
+            <a:r>
+              <a:rPr lang="en-US" dirty="0" smtClean="0"/>
+              <a:t>Fifth level</a:t>
+            </a:r>
+            <a:endParaRPr dirty="0"/>
+          </a:p>
+        </p:txBody>
+      </p:sp>
+      <p:sp>
+        <p:nvSpPr>
+          <p:cNvPr id="4" name="Date Placeholder 3"/>
+          <p:cNvSpPr>
+            <a:spLocks noGrp="1"/>
+          </p:cNvSpPr>
+          <p:nvPr>
+            <p:ph type="dt" sz="half" idx="10"/>
+          </p:nvPr>
+        </p:nvSpPr>
+        <p:spPr/>
+        <p:txBody>
+          <a:bodyPr/>
+          <a:lstStyle/>
+          <a:p>
+            <a:fld id="{4C4AD4EB-88D0-C141-9474-CCD86A78CB94}" type="datetimeFigureOut">
+              <a:rPr lang="en-US" smtClean="0"/>
+              <a:pPr/>
+              <a:t>9/14/10</a:t>
+            </a:fld>
+            <a:endParaRPr lang="en-US"/>
+          </a:p>
+        </p:txBody>
+      </p:sp>
+      <p:sp>
+        <p:nvSpPr>
+          <p:cNvPr id="5" name="Footer Placeholder 4"/>
+          <p:cNvSpPr>
+            <a:spLocks noGrp="1"/>
+          </p:cNvSpPr>
+          <p:nvPr>
+            <p:ph type="ftr" sz="quarter" idx="11"/>
+          </p:nvPr>
+        </p:nvSpPr>
+        <p:spPr/>
+        <p:txBody>
+          <a:bodyPr/>
+          <a:lstStyle/>
+          <a:p>
+            <a:endParaRPr lang="en-US"/>
+          </a:p>
+        </p:txBody>
+      </p:sp>
+      <p:sp>
+        <p:nvSpPr>
+          <p:cNvPr id="6" name="Slide Number Placeholder 5"/>
+          <p:cNvSpPr>
+            <a:spLocks noGrp="1"/>
+          </p:cNvSpPr>
+          <p:nvPr>
+            <p:ph type="sldNum" sz="quarter" idx="12"/>
+          </p:nvPr>
+        </p:nvSpPr>
+        <p:spPr/>
+        <p:txBody>
+          <a:bodyPr/>
+          <a:lstStyle/>
+          <a:p>
+            <a:fld id="{DF7665AF-92BA-E649-941D-268879B3EA81}" type="slidenum">
+              <a:rPr lang="en-US" smtClean="0"/>
+              <a:pPr/>
+              <a:t>‹#›</a:t>
+            </a:fld>
+            <a:endParaRPr lang="en-US"/>
+          </a:p>
+        </p:txBody>
+      </p:sp>
+      <p:pic>
+        <p:nvPicPr>
+          <p:cNvPr id="7" name="Picture 1"/>
+          <p:cNvPicPr>
+            <a:picLocks noChangeArrowheads="1"/>
+          </p:cNvPicPr>
+          <p:nvPr userDrawn="1"/>
+        </p:nvPicPr>
+        <p:blipFill>
+          <a:blip r:embed="rId2"/>
+          <a:srcRect/>
+          <a:stretch>
+            <a:fillRect/>
+          </a:stretch>
+        </p:blipFill>
+        <p:spPr bwMode="auto">
+          <a:xfrm>
+            <a:off x="94958" y="263714"/>
+            <a:ext cx="786525" cy="709637"/>
+          </a:xfrm>
+          <a:prstGeom prst="rect">
+            <a:avLst/>
+          </a:prstGeom>
+          <a:noFill/>
+          <a:ln w="12700">
+            <a:noFill/>
+            <a:miter lim="800000"/>
+            <a:headEnd/>
+            <a:tailEnd/>
+          </a:ln>
+        </p:spPr>
+      </p:pic>
+    </p:spTree>
+  </p:cSld>
+  <p:clrMapOvr>
+    <a:masterClrMapping/>
+  </p:clrMapOvr>
+</p:sldLayout>
+</file>
+
 <file path=ppt/slideLayouts/slideLayout2.xml><?xml version="1.0" encoding="utf-8"?>
+<p:sldLayout xmlns:a="http://schemas.openxmlformats.org/drawingml/2006/main" xmlns:r="http://schemas.openxmlformats.org/officeDocument/2006/relationships" xmlns:mc="http://schemas.openxmlformats.org/markup-compatibility/2006" xmlns:mv="urn:schemas-microsoft-com:mac:vml" xmlns:p="http://schemas.openxmlformats.org/presentationml/2006/main" mc:Ignorable="mv" mc:PreserveAttributes="mv:*" preserve="1" userDrawn="1">
+  <p:cSld name="Title Slide">
+    <p:spTree>
+      <p:nvGrpSpPr>
+        <p:cNvPr id="1" name=""/>
+        <p:cNvGrpSpPr/>
+        <p:nvPr/>
+      </p:nvGrpSpPr>
+      <p:grpSpPr>
+        <a:xfrm>
+          <a:off x="0" y="0"/>
+          <a:ext cx="0" cy="0"/>
+          <a:chOff x="0" y="0"/>
+          <a:chExt cx="0" cy="0"/>
+        </a:xfrm>
+      </p:grpSpPr>
+      <p:pic>
+        <p:nvPicPr>
+          <p:cNvPr id="11" name="Picture 1"/>
+          <p:cNvPicPr>
+            <a:picLocks noChangeArrowheads="1"/>
+          </p:cNvPicPr>
+          <p:nvPr userDrawn="1"/>
+        </p:nvPicPr>
+        <p:blipFill>
+          <a:blip r:embed="rId2"/>
+          <a:srcRect/>
+          <a:stretch>
+            <a:fillRect/>
+          </a:stretch>
+        </p:blipFill>
+        <p:spPr bwMode="auto">
+          <a:xfrm>
+            <a:off x="7130616" y="570391"/>
+            <a:ext cx="1644429" cy="1289027"/>
+          </a:xfrm>
+          <a:prstGeom prst="rect">
+            <a:avLst/>
+          </a:prstGeom>
+          <a:noFill/>
+          <a:ln w="12700">
+            <a:noFill/>
+            <a:miter lim="800000"/>
+            <a:headEnd/>
+            <a:tailEnd/>
+          </a:ln>
+        </p:spPr>
+      </p:pic>
+      <p:sp>
+        <p:nvSpPr>
+          <p:cNvPr id="8" name="Rectangle 7"/>
+          <p:cNvSpPr/>
+          <p:nvPr userDrawn="1"/>
+        </p:nvSpPr>
+        <p:spPr>
+          <a:xfrm>
+            <a:off x="0" y="2157319"/>
+            <a:ext cx="8923005" cy="877234"/>
+          </a:xfrm>
+          <a:prstGeom prst="rect">
+            <a:avLst/>
+          </a:prstGeom>
+          <a:solidFill>
+            <a:srgbClr val="424242"/>
+          </a:solidFill>
+          <a:ln>
+            <a:noFill/>
+          </a:ln>
+          <a:effectLst/>
+          <a:scene3d>
+            <a:camera prst="obliqueTopRight"/>
+            <a:lightRig rig="threePt" dir="tl"/>
+          </a:scene3d>
+          <a:sp3d/>
+        </p:spPr>
+        <p:style>
+          <a:lnRef idx="1">
+            <a:schemeClr val="accent1"/>
+          </a:lnRef>
+          <a:fillRef idx="3">
+            <a:schemeClr val="accent1"/>
+          </a:fillRef>
+          <a:effectRef idx="2">
+            <a:schemeClr val="accent1"/>
+          </a:effectRef>
+          <a:fontRef idx="minor">
+            <a:schemeClr val="lt1"/>
+          </a:fontRef>
+        </p:style>
+        <p:txBody>
+          <a:bodyPr rtlCol="0" anchor="ctr"/>
+          <a:lstStyle/>
+          <a:p>
+            <a:pPr algn="ctr"/>
+            <a:endParaRPr lang="en-US"/>
+          </a:p>
+        </p:txBody>
+      </p:sp>
+      <p:pic>
+        <p:nvPicPr>
+          <p:cNvPr id="9" name="Picture 8" descr="SAGA Helvetica Logo.png"/>
+          <p:cNvPicPr>
+            <a:picLocks noChangeAspect="1"/>
+          </p:cNvPicPr>
+          <p:nvPr userDrawn="1"/>
+        </p:nvPicPr>
+        <p:blipFill>
+          <a:blip r:embed="rId3"/>
+          <a:stretch>
+            <a:fillRect/>
+          </a:stretch>
+        </p:blipFill>
+        <p:spPr>
+          <a:xfrm>
+            <a:off x="914400" y="570391"/>
+            <a:ext cx="2892308" cy="707358"/>
+          </a:xfrm>
+          <a:prstGeom prst="rect">
+            <a:avLst/>
+          </a:prstGeom>
+        </p:spPr>
+      </p:pic>
+      <p:sp>
+        <p:nvSpPr>
+          <p:cNvPr id="14" name="Title 13"/>
+          <p:cNvSpPr>
+            <a:spLocks noGrp="1"/>
+          </p:cNvSpPr>
+          <p:nvPr>
+            <p:ph type="title"/>
+          </p:nvPr>
+        </p:nvSpPr>
+        <p:spPr>
+          <a:xfrm>
+            <a:off x="914400" y="3043020"/>
+            <a:ext cx="8001000" cy="3814980"/>
+          </a:xfrm>
+          <a:solidFill>
+            <a:srgbClr val="E4E6DE"/>
+          </a:solidFill>
+        </p:spPr>
+        <p:txBody>
+          <a:bodyPr lIns="274320" tIns="91440" bIns="91440" anchor="t" anchorCtr="0">
+            <a:noAutofit/>
+          </a:bodyPr>
+          <a:lstStyle>
+            <a:lvl1pPr>
+              <a:defRPr sz="2000">
+                <a:solidFill>
+                  <a:srgbClr val="595959"/>
+                </a:solidFill>
+              </a:defRPr>
+            </a:lvl1pPr>
+          </a:lstStyle>
+          <a:p>
+            <a:r>
+              <a:rPr lang="en-US" dirty="0" smtClean="0"/>
+              <a:t>Click to edit Master title style</a:t>
+            </a:r>
+            <a:endParaRPr lang="en-US" dirty="0"/>
+          </a:p>
+        </p:txBody>
+      </p:sp>
+      <p:sp>
+        <p:nvSpPr>
+          <p:cNvPr id="6" name="Date Placeholder 5"/>
+          <p:cNvSpPr>
+            <a:spLocks noGrp="1"/>
+          </p:cNvSpPr>
+          <p:nvPr>
+            <p:ph type="dt" sz="half" idx="10"/>
+          </p:nvPr>
+        </p:nvSpPr>
+        <p:spPr>
+          <a:xfrm>
+            <a:off x="6580094" y="6492875"/>
+            <a:ext cx="2133600" cy="365125"/>
+          </a:xfrm>
+        </p:spPr>
+        <p:txBody>
+          <a:bodyPr/>
+          <a:lstStyle/>
+          <a:p>
+            <a:fld id="{ADB8239A-D789-5443-937F-338E3AE3D41C}" type="datetime1">
+              <a:rPr lang="en-US" smtClean="0"/>
+              <a:pPr/>
+              <a:t>9/15/10</a:t>
+            </a:fld>
+            <a:endParaRPr lang="en-US"/>
+          </a:p>
+        </p:txBody>
+      </p:sp>
+      <p:sp>
+        <p:nvSpPr>
+          <p:cNvPr id="10" name="Footer Placeholder 9"/>
+          <p:cNvSpPr>
+            <a:spLocks noGrp="1"/>
+          </p:cNvSpPr>
+          <p:nvPr>
+            <p:ph type="ftr" sz="quarter" idx="12"/>
+          </p:nvPr>
+        </p:nvSpPr>
+        <p:spPr>
+          <a:xfrm>
+            <a:off x="1120588" y="6492875"/>
+            <a:ext cx="2895600" cy="365125"/>
+          </a:xfrm>
+        </p:spPr>
+        <p:txBody>
+          <a:bodyPr/>
+          <a:lstStyle/>
+          <a:p>
+            <a:endParaRPr lang="en-US" dirty="0"/>
+          </a:p>
+        </p:txBody>
+      </p:sp>
+    </p:spTree>
+  </p:cSld>
+  <p:clrMapOvr>
+    <a:masterClrMapping/>
+  </p:clrMapOvr>
+</p:sldLayout>
+</file>
+
+<file path=ppt/slideLayouts/slideLayout20.xml><?xml version="1.0" encoding="utf-8"?>
+<p:sldLayout xmlns:a="http://schemas.openxmlformats.org/drawingml/2006/main" xmlns:r="http://schemas.openxmlformats.org/officeDocument/2006/relationships" xmlns:mc="http://schemas.openxmlformats.org/markup-compatibility/2006" xmlns:mv="urn:schemas-microsoft-com:mac:vml" xmlns:p="http://schemas.openxmlformats.org/presentationml/2006/main" mc:Ignorable="mv" mc:PreserveAttributes="mv:*" type="blank" preserve="1">
+  <p:cSld name="Blank">
+    <p:spTree>
+      <p:nvGrpSpPr>
+        <p:cNvPr id="1" name=""/>
+        <p:cNvGrpSpPr/>
+        <p:nvPr/>
+      </p:nvGrpSpPr>
+      <p:grpSpPr>
+        <a:xfrm>
+          <a:off x="0" y="0"/>
+          <a:ext cx="0" cy="0"/>
+          <a:chOff x="0" y="0"/>
+          <a:chExt cx="0" cy="0"/>
+        </a:xfrm>
+      </p:grpSpPr>
+      <p:sp>
+        <p:nvSpPr>
+          <p:cNvPr id="2" name="Date Placeholder 1"/>
+          <p:cNvSpPr>
+            <a:spLocks noGrp="1"/>
+          </p:cNvSpPr>
+          <p:nvPr>
+            <p:ph type="dt" sz="half" idx="10"/>
+          </p:nvPr>
+        </p:nvSpPr>
+        <p:spPr/>
+        <p:txBody>
+          <a:bodyPr/>
+          <a:lstStyle/>
+          <a:p>
+            <a:fld id="{4C4AD4EB-88D0-C141-9474-CCD86A78CB94}" type="datetimeFigureOut">
+              <a:rPr lang="en-US" smtClean="0"/>
+              <a:pPr/>
+              <a:t>9/14/10</a:t>
+            </a:fld>
+            <a:endParaRPr lang="en-US"/>
+          </a:p>
+        </p:txBody>
+      </p:sp>
+      <p:sp>
+        <p:nvSpPr>
+          <p:cNvPr id="3" name="Footer Placeholder 2"/>
+          <p:cNvSpPr>
+            <a:spLocks noGrp="1"/>
+          </p:cNvSpPr>
+          <p:nvPr>
+            <p:ph type="ftr" sz="quarter" idx="11"/>
+          </p:nvPr>
+        </p:nvSpPr>
+        <p:spPr/>
+        <p:txBody>
+          <a:bodyPr/>
+          <a:lstStyle/>
+          <a:p>
+            <a:endParaRPr lang="en-US"/>
+          </a:p>
+        </p:txBody>
+      </p:sp>
+      <p:sp>
+        <p:nvSpPr>
+          <p:cNvPr id="4" name="Slide Number Placeholder 3"/>
+          <p:cNvSpPr>
+            <a:spLocks noGrp="1"/>
+          </p:cNvSpPr>
+          <p:nvPr>
+            <p:ph type="sldNum" sz="quarter" idx="12"/>
+          </p:nvPr>
+        </p:nvSpPr>
+        <p:spPr/>
+        <p:txBody>
+          <a:bodyPr/>
+          <a:lstStyle/>
+          <a:p>
+            <a:fld id="{DF7665AF-92BA-E649-941D-268879B3EA81}" type="slidenum">
+              <a:rPr lang="en-US" smtClean="0"/>
+              <a:pPr/>
+              <a:t>‹#›</a:t>
+            </a:fld>
+            <a:endParaRPr lang="en-US"/>
+          </a:p>
+        </p:txBody>
+      </p:sp>
+    </p:spTree>
+  </p:cSld>
+  <p:clrMapOvr>
+    <a:masterClrMapping/>
+  </p:clrMapOvr>
+  <p:transition spd="med"/>
+</p:sldLayout>
+</file>
+
+<file path=ppt/slideLayouts/slideLayout3.xml><?xml version="1.0" encoding="utf-8"?>
 <p:sldLayout xmlns:a="http://schemas.openxmlformats.org/drawingml/2006/main" xmlns:r="http://schemas.openxmlformats.org/officeDocument/2006/relationships" xmlns:mc="http://schemas.openxmlformats.org/markup-compatibility/2006" xmlns:mv="urn:schemas-microsoft-com:mac:vml" xmlns:p="http://schemas.openxmlformats.org/presentationml/2006/main" mc:Ignorable="mv" mc:PreserveAttributes="mv:*" type="obj" preserve="1">
   <p:cSld name="Title and Content">
     <p:spTree>
@@ -4923,7 +6284,7 @@
 </p:sldLayout>
 </file>
 
-<file path=ppt/slideLayouts/slideLayout3.xml><?xml version="1.0" encoding="utf-8"?>
+<file path=ppt/slideLayouts/slideLayout4.xml><?xml version="1.0" encoding="utf-8"?>
 <p:sldLayout xmlns:a="http://schemas.openxmlformats.org/drawingml/2006/main" xmlns:r="http://schemas.openxmlformats.org/officeDocument/2006/relationships" xmlns:mc="http://schemas.openxmlformats.org/markup-compatibility/2006" xmlns:mv="urn:schemas-microsoft-com:mac:vml" xmlns:p="http://schemas.openxmlformats.org/presentationml/2006/main" mc:Ignorable="mv" mc:PreserveAttributes="mv:*" preserve="1">
   <p:cSld name="Title Slide with Picture">
     <p:spTree>
@@ -5205,7 +6566,7 @@
 </p:sldLayout>
 </file>
 
-<file path=ppt/slideLayouts/slideLayout4.xml><?xml version="1.0" encoding="utf-8"?>
+<file path=ppt/slideLayouts/slideLayout5.xml><?xml version="1.0" encoding="utf-8"?>
 <p:sldLayout xmlns:a="http://schemas.openxmlformats.org/drawingml/2006/main" xmlns:r="http://schemas.openxmlformats.org/officeDocument/2006/relationships" xmlns:mc="http://schemas.openxmlformats.org/markup-compatibility/2006" xmlns:mv="urn:schemas-microsoft-com:mac:vml" xmlns:p="http://schemas.openxmlformats.org/presentationml/2006/main" mc:Ignorable="mv" mc:PreserveAttributes="mv:*" type="secHead" preserve="1">
   <p:cSld name="Section Header">
     <p:spTree>
@@ -5502,7 +6863,7 @@
 </p:sldLayout>
 </file>
 
-<file path=ppt/slideLayouts/slideLayout5.xml><?xml version="1.0" encoding="utf-8"?>
+<file path=ppt/slideLayouts/slideLayout6.xml><?xml version="1.0" encoding="utf-8"?>
 <p:sldLayout xmlns:a="http://schemas.openxmlformats.org/drawingml/2006/main" xmlns:r="http://schemas.openxmlformats.org/officeDocument/2006/relationships" xmlns:mc="http://schemas.openxmlformats.org/markup-compatibility/2006" xmlns:mv="urn:schemas-microsoft-com:mac:vml" xmlns:p="http://schemas.openxmlformats.org/presentationml/2006/main" mc:Ignorable="mv" mc:PreserveAttributes="mv:*" type="twoObj" preserve="1">
   <p:cSld name="Two Content">
     <p:spTree>
@@ -5796,7 +7157,7 @@
 </p:sldLayout>
 </file>
 
-<file path=ppt/slideLayouts/slideLayout6.xml><?xml version="1.0" encoding="utf-8"?>
+<file path=ppt/slideLayouts/slideLayout7.xml><?xml version="1.0" encoding="utf-8"?>
 <p:sldLayout xmlns:a="http://schemas.openxmlformats.org/drawingml/2006/main" xmlns:r="http://schemas.openxmlformats.org/officeDocument/2006/relationships" xmlns:mc="http://schemas.openxmlformats.org/markup-compatibility/2006" xmlns:mv="urn:schemas-microsoft-com:mac:vml" xmlns:p="http://schemas.openxmlformats.org/presentationml/2006/main" mc:Ignorable="mv" mc:PreserveAttributes="mv:*" type="twoTxTwoObj" preserve="1">
   <p:cSld name="Comparison">
     <p:spTree>
@@ -6461,7 +7822,7 @@
 </p:sldLayout>
 </file>
 
-<file path=ppt/slideLayouts/slideLayout7.xml><?xml version="1.0" encoding="utf-8"?>
+<file path=ppt/slideLayouts/slideLayout8.xml><?xml version="1.0" encoding="utf-8"?>
 <p:sldLayout xmlns:a="http://schemas.openxmlformats.org/drawingml/2006/main" xmlns:r="http://schemas.openxmlformats.org/officeDocument/2006/relationships" xmlns:mc="http://schemas.openxmlformats.org/markup-compatibility/2006" xmlns:mv="urn:schemas-microsoft-com:mac:vml" xmlns:p="http://schemas.openxmlformats.org/presentationml/2006/main" mc:Ignorable="mv" mc:PreserveAttributes="mv:*" type="titleOnly" preserve="1">
   <p:cSld name="Title Only">
     <p:spTree>
@@ -6576,7 +7937,7 @@
 </p:sldLayout>
 </file>
 
-<file path=ppt/slideLayouts/slideLayout8.xml><?xml version="1.0" encoding="utf-8"?>
+<file path=ppt/slideLayouts/slideLayout9.xml><?xml version="1.0" encoding="utf-8"?>
 <p:sldLayout xmlns:a="http://schemas.openxmlformats.org/drawingml/2006/main" xmlns:r="http://schemas.openxmlformats.org/officeDocument/2006/relationships" xmlns:mc="http://schemas.openxmlformats.org/markup-compatibility/2006" xmlns:mv="urn:schemas-microsoft-com:mac:vml" xmlns:p="http://schemas.openxmlformats.org/presentationml/2006/main" mc:Ignorable="mv" mc:PreserveAttributes="mv:*" type="blank" preserve="1">
   <p:cSld name="Blank">
     <p:spTree>
@@ -6639,345 +8000,6 @@
       <p:sp>
         <p:nvSpPr>
           <p:cNvPr id="4" name="Slide Number Placeholder 3"/>
-          <p:cNvSpPr>
-            <a:spLocks noGrp="1"/>
-          </p:cNvSpPr>
-          <p:nvPr>
-            <p:ph type="sldNum" sz="quarter" idx="12"/>
-          </p:nvPr>
-        </p:nvSpPr>
-        <p:spPr/>
-        <p:txBody>
-          <a:bodyPr/>
-          <a:lstStyle/>
-          <a:p>
-            <a:fld id="{DF7665AF-92BA-E649-941D-268879B3EA81}" type="slidenum">
-              <a:rPr lang="en-US" smtClean="0"/>
-              <a:pPr/>
-              <a:t>‹#›</a:t>
-            </a:fld>
-            <a:endParaRPr lang="en-US"/>
-          </a:p>
-        </p:txBody>
-      </p:sp>
-    </p:spTree>
-  </p:cSld>
-  <p:clrMapOvr>
-    <a:masterClrMapping/>
-  </p:clrMapOvr>
-</p:sldLayout>
-</file>
-
-<file path=ppt/slideLayouts/slideLayout9.xml><?xml version="1.0" encoding="utf-8"?>
-<p:sldLayout xmlns:a="http://schemas.openxmlformats.org/drawingml/2006/main" xmlns:r="http://schemas.openxmlformats.org/officeDocument/2006/relationships" xmlns:mc="http://schemas.openxmlformats.org/markup-compatibility/2006" xmlns:mv="urn:schemas-microsoft-com:mac:vml" xmlns:p="http://schemas.openxmlformats.org/presentationml/2006/main" mc:Ignorable="mv" mc:PreserveAttributes="mv:*" type="objTx" preserve="1">
-  <p:cSld name="Content with Caption">
-    <p:spTree>
-      <p:nvGrpSpPr>
-        <p:cNvPr id="1" name=""/>
-        <p:cNvGrpSpPr/>
-        <p:nvPr/>
-      </p:nvGrpSpPr>
-      <p:grpSpPr>
-        <a:xfrm>
-          <a:off x="0" y="0"/>
-          <a:ext cx="0" cy="0"/>
-          <a:chOff x="0" y="0"/>
-          <a:chExt cx="0" cy="0"/>
-        </a:xfrm>
-      </p:grpSpPr>
-      <p:sp>
-        <p:nvSpPr>
-          <p:cNvPr id="2" name="Title 1"/>
-          <p:cNvSpPr>
-            <a:spLocks noGrp="1"/>
-          </p:cNvSpPr>
-          <p:nvPr>
-            <p:ph type="title"/>
-          </p:nvPr>
-        </p:nvSpPr>
-        <p:spPr>
-          <a:xfrm>
-            <a:off x="0" y="1124712"/>
-            <a:ext cx="8915400" cy="914400"/>
-          </a:xfrm>
-          <a:solidFill>
-            <a:schemeClr val="tx2"/>
-          </a:solidFill>
-        </p:spPr>
-        <p:txBody>
-          <a:bodyPr vert="horz" lIns="1188720" tIns="45720" rIns="274320" bIns="45720" rtlCol="0" anchor="ctr">
-            <a:normAutofit/>
-          </a:bodyPr>
-          <a:lstStyle>
-            <a:lvl1pPr marL="0" indent="0" algn="l" defTabSz="914400" rtl="0" eaLnBrk="1" latinLnBrk="0" hangingPunct="1">
-              <a:spcBef>
-                <a:spcPct val="0"/>
-              </a:spcBef>
-              <a:buNone/>
-              <a:defRPr sz="3600" kern="1200">
-                <a:solidFill>
-                  <a:schemeClr val="bg1"/>
-                </a:solidFill>
-                <a:latin typeface="+mj-lt"/>
-                <a:ea typeface="+mj-ea"/>
-                <a:cs typeface="+mj-cs"/>
-              </a:defRPr>
-            </a:lvl1pPr>
-          </a:lstStyle>
-          <a:p>
-            <a:r>
-              <a:rPr lang="en-US" smtClean="0"/>
-              <a:t>Click to edit Master title style</a:t>
-            </a:r>
-            <a:endParaRPr/>
-          </a:p>
-        </p:txBody>
-      </p:sp>
-      <p:sp>
-        <p:nvSpPr>
-          <p:cNvPr id="3" name="Content Placeholder 2"/>
-          <p:cNvSpPr>
-            <a:spLocks noGrp="1"/>
-          </p:cNvSpPr>
-          <p:nvPr>
-            <p:ph idx="1"/>
-          </p:nvPr>
-        </p:nvSpPr>
-        <p:spPr>
-          <a:xfrm>
-            <a:off x="5147534" y="2590800"/>
-            <a:ext cx="3566160" cy="3686175"/>
-          </a:xfrm>
-        </p:spPr>
-        <p:txBody>
-          <a:bodyPr/>
-          <a:lstStyle>
-            <a:lvl1pPr>
-              <a:defRPr sz="1800"/>
-            </a:lvl1pPr>
-            <a:lvl2pPr>
-              <a:defRPr sz="1800"/>
-            </a:lvl2pPr>
-            <a:lvl3pPr>
-              <a:defRPr sz="1800"/>
-            </a:lvl3pPr>
-            <a:lvl4pPr>
-              <a:defRPr sz="1800"/>
-            </a:lvl4pPr>
-            <a:lvl5pPr>
-              <a:defRPr sz="1800"/>
-            </a:lvl5pPr>
-            <a:lvl6pPr>
-              <a:defRPr sz="2000"/>
-            </a:lvl6pPr>
-            <a:lvl7pPr>
-              <a:defRPr sz="2000"/>
-            </a:lvl7pPr>
-            <a:lvl8pPr>
-              <a:defRPr sz="2000"/>
-            </a:lvl8pPr>
-            <a:lvl9pPr>
-              <a:defRPr sz="2000"/>
-            </a:lvl9pPr>
-          </a:lstStyle>
-          <a:p>
-            <a:pPr lvl="0"/>
-            <a:r>
-              <a:rPr lang="en-US" smtClean="0"/>
-              <a:t>Click to edit Master text styles</a:t>
-            </a:r>
-          </a:p>
-          <a:p>
-            <a:pPr lvl="1"/>
-            <a:r>
-              <a:rPr lang="en-US" smtClean="0"/>
-              <a:t>Second level</a:t>
-            </a:r>
-          </a:p>
-          <a:p>
-            <a:pPr lvl="2"/>
-            <a:r>
-              <a:rPr lang="en-US" smtClean="0"/>
-              <a:t>Third level</a:t>
-            </a:r>
-          </a:p>
-          <a:p>
-            <a:pPr lvl="3"/>
-            <a:r>
-              <a:rPr lang="en-US" smtClean="0"/>
-              <a:t>Fourth level</a:t>
-            </a:r>
-          </a:p>
-          <a:p>
-            <a:pPr lvl="4"/>
-            <a:r>
-              <a:rPr lang="en-US" smtClean="0"/>
-              <a:t>Fifth level</a:t>
-            </a:r>
-            <a:endParaRPr/>
-          </a:p>
-        </p:txBody>
-      </p:sp>
-      <p:sp>
-        <p:nvSpPr>
-          <p:cNvPr id="4" name="Text Placeholder 3"/>
-          <p:cNvSpPr>
-            <a:spLocks noGrp="1"/>
-          </p:cNvSpPr>
-          <p:nvPr>
-            <p:ph type="body" sz="half" idx="2"/>
-          </p:nvPr>
-        </p:nvSpPr>
-        <p:spPr>
-          <a:xfrm>
-            <a:off x="900952" y="2039111"/>
-            <a:ext cx="3566160" cy="4224528"/>
-          </a:xfrm>
-          <a:solidFill>
-            <a:schemeClr val="bg2">
-              <a:lumMod val="40000"/>
-              <a:lumOff val="60000"/>
-            </a:schemeClr>
-          </a:solidFill>
-          <a:ln>
-            <a:noFill/>
-          </a:ln>
-        </p:spPr>
-        <p:style>
-          <a:lnRef idx="2">
-            <a:schemeClr val="accent1">
-              <a:shade val="50000"/>
-            </a:schemeClr>
-          </a:lnRef>
-          <a:fillRef idx="1">
-            <a:schemeClr val="accent1"/>
-          </a:fillRef>
-          <a:effectRef idx="0">
-            <a:schemeClr val="accent1"/>
-          </a:effectRef>
-          <a:fontRef idx="minor">
-            <a:schemeClr val="lt1"/>
-          </a:fontRef>
-        </p:style>
-        <p:txBody>
-          <a:bodyPr vert="horz" lIns="292608" tIns="274320" rIns="274320" bIns="274320" rtlCol="0" anchor="t" anchorCtr="0">
-            <a:normAutofit/>
-          </a:bodyPr>
-          <a:lstStyle>
-            <a:lvl1pPr marL="0" indent="0" algn="l" defTabSz="914400" rtl="0" eaLnBrk="1" latinLnBrk="0" hangingPunct="1">
-              <a:spcBef>
-                <a:spcPts val="2000"/>
-              </a:spcBef>
-              <a:buClr>
-                <a:schemeClr val="accent1"/>
-              </a:buClr>
-              <a:buFont typeface="Wingdings 2" pitchFamily="18" charset="2"/>
-              <a:buNone/>
-              <a:defRPr sz="1800" kern="1200">
-                <a:solidFill>
-                  <a:schemeClr val="tx1">
-                    <a:lumMod val="65000"/>
-                    <a:lumOff val="35000"/>
-                  </a:schemeClr>
-                </a:solidFill>
-                <a:latin typeface="+mn-lt"/>
-                <a:ea typeface="+mn-ea"/>
-                <a:cs typeface="+mn-cs"/>
-              </a:defRPr>
-            </a:lvl1pPr>
-            <a:lvl2pPr marL="457200" indent="0">
-              <a:buNone/>
-              <a:defRPr sz="1200"/>
-            </a:lvl2pPr>
-            <a:lvl3pPr marL="914400" indent="0">
-              <a:buNone/>
-              <a:defRPr sz="1000"/>
-            </a:lvl3pPr>
-            <a:lvl4pPr marL="1371600" indent="0">
-              <a:buNone/>
-              <a:defRPr sz="900"/>
-            </a:lvl4pPr>
-            <a:lvl5pPr marL="1828800" indent="0">
-              <a:buNone/>
-              <a:defRPr sz="900"/>
-            </a:lvl5pPr>
-            <a:lvl6pPr marL="2286000" indent="0">
-              <a:buNone/>
-              <a:defRPr sz="900"/>
-            </a:lvl6pPr>
-            <a:lvl7pPr marL="2743200" indent="0">
-              <a:buNone/>
-              <a:defRPr sz="900"/>
-            </a:lvl7pPr>
-            <a:lvl8pPr marL="3200400" indent="0">
-              <a:buNone/>
-              <a:defRPr sz="900"/>
-            </a:lvl8pPr>
-            <a:lvl9pPr marL="3657600" indent="0">
-              <a:buNone/>
-              <a:defRPr sz="900"/>
-            </a:lvl9pPr>
-          </a:lstStyle>
-          <a:p>
-            <a:pPr lvl="0"/>
-            <a:r>
-              <a:rPr lang="en-US" smtClean="0"/>
-              <a:t>Click to edit Master text styles</a:t>
-            </a:r>
-          </a:p>
-        </p:txBody>
-      </p:sp>
-      <p:sp>
-        <p:nvSpPr>
-          <p:cNvPr id="5" name="Date Placeholder 4"/>
-          <p:cNvSpPr>
-            <a:spLocks noGrp="1"/>
-          </p:cNvSpPr>
-          <p:nvPr>
-            <p:ph type="dt" sz="half" idx="10"/>
-          </p:nvPr>
-        </p:nvSpPr>
-        <p:spPr>
-          <a:xfrm>
-            <a:off x="6580094" y="188259"/>
-            <a:ext cx="2133600" cy="365125"/>
-          </a:xfrm>
-        </p:spPr>
-        <p:txBody>
-          <a:bodyPr/>
-          <a:lstStyle/>
-          <a:p>
-            <a:fld id="{F19CAA94-9393-BB4A-8CB6-008B1351A132}" type="datetime1">
-              <a:rPr lang="en-US" smtClean="0"/>
-              <a:pPr/>
-              <a:t>9/15/10</a:t>
-            </a:fld>
-            <a:endParaRPr lang="en-US"/>
-          </a:p>
-        </p:txBody>
-      </p:sp>
-      <p:sp>
-        <p:nvSpPr>
-          <p:cNvPr id="6" name="Footer Placeholder 5"/>
-          <p:cNvSpPr>
-            <a:spLocks noGrp="1"/>
-          </p:cNvSpPr>
-          <p:nvPr>
-            <p:ph type="ftr" sz="quarter" idx="11"/>
-          </p:nvPr>
-        </p:nvSpPr>
-        <p:spPr/>
-        <p:txBody>
-          <a:bodyPr/>
-          <a:lstStyle/>
-          <a:p>
-            <a:endParaRPr lang="en-US"/>
-          </a:p>
-        </p:txBody>
-      </p:sp>
-      <p:sp>
-        <p:nvSpPr>
-          <p:cNvPr id="7" name="Slide Number Placeholder 6"/>
           <p:cNvSpPr>
             <a:spLocks noGrp="1"/>
           </p:cNvSpPr>
@@ -7353,21 +8375,22 @@
   </p:cSld>
   <p:clrMap bg1="lt1" tx1="dk1" bg2="lt2" tx2="dk2" accent1="accent1" accent2="accent2" accent3="accent3" accent4="accent4" accent5="accent5" accent6="accent6" hlink="hlink" folHlink="folHlink"/>
   <p:sldLayoutIdLst>
-    <p:sldLayoutId id="2147483661" r:id="rId1"/>
-    <p:sldLayoutId id="2147483662" r:id="rId2"/>
-    <p:sldLayoutId id="2147483663" r:id="rId3"/>
-    <p:sldLayoutId id="2147483664" r:id="rId4"/>
-    <p:sldLayoutId id="2147483665" r:id="rId5"/>
-    <p:sldLayoutId id="2147483666" r:id="rId6"/>
-    <p:sldLayoutId id="2147483667" r:id="rId7"/>
-    <p:sldLayoutId id="2147483668" r:id="rId8"/>
-    <p:sldLayoutId id="2147483669" r:id="rId9"/>
-    <p:sldLayoutId id="2147483670" r:id="rId10"/>
-    <p:sldLayoutId id="2147483671" r:id="rId11"/>
-    <p:sldLayoutId id="2147483672" r:id="rId12"/>
-    <p:sldLayoutId id="2147483673" r:id="rId13"/>
-    <p:sldLayoutId id="2147483674" r:id="rId14"/>
-    <p:sldLayoutId id="2147483675" r:id="rId15"/>
+    <p:sldLayoutId id="2147483676" r:id="rId1"/>
+    <p:sldLayoutId id="2147483661" r:id="rId2"/>
+    <p:sldLayoutId id="2147483662" r:id="rId3"/>
+    <p:sldLayoutId id="2147483663" r:id="rId4"/>
+    <p:sldLayoutId id="2147483664" r:id="rId5"/>
+    <p:sldLayoutId id="2147483665" r:id="rId6"/>
+    <p:sldLayoutId id="2147483666" r:id="rId7"/>
+    <p:sldLayoutId id="2147483667" r:id="rId8"/>
+    <p:sldLayoutId id="2147483668" r:id="rId9"/>
+    <p:sldLayoutId id="2147483669" r:id="rId10"/>
+    <p:sldLayoutId id="2147483670" r:id="rId11"/>
+    <p:sldLayoutId id="2147483671" r:id="rId12"/>
+    <p:sldLayoutId id="2147483672" r:id="rId13"/>
+    <p:sldLayoutId id="2147483673" r:id="rId14"/>
+    <p:sldLayoutId id="2147483674" r:id="rId15"/>
+    <p:sldLayoutId id="2147483675" r:id="rId16"/>
   </p:sldLayoutIdLst>
   <p:hf sldNum="0" hdr="0" ftr="0" dt="0"/>
   <p:txStyles>
@@ -7657,6 +8680,684 @@
 </p:sldMaster>
 </file>
 
+<file path=ppt/slideMasters/slideMaster2.xml><?xml version="1.0" encoding="utf-8"?>
+<p:sldMaster xmlns:a="http://schemas.openxmlformats.org/drawingml/2006/main" xmlns:r="http://schemas.openxmlformats.org/officeDocument/2006/relationships" xmlns:mc="http://schemas.openxmlformats.org/markup-compatibility/2006" xmlns:mv="urn:schemas-microsoft-com:mac:vml" xmlns:p="http://schemas.openxmlformats.org/presentationml/2006/main" mc:Ignorable="mv" mc:PreserveAttributes="mv:*" preserve="1">
+  <p:cSld>
+    <p:bg>
+      <p:bgRef idx="1001">
+        <a:schemeClr val="bg1"/>
+      </p:bgRef>
+    </p:bg>
+    <p:spTree>
+      <p:nvGrpSpPr>
+        <p:cNvPr id="1" name=""/>
+        <p:cNvGrpSpPr/>
+        <p:nvPr/>
+      </p:nvGrpSpPr>
+      <p:grpSpPr>
+        <a:xfrm>
+          <a:off x="0" y="0"/>
+          <a:ext cx="0" cy="0"/>
+          <a:chOff x="0" y="0"/>
+          <a:chExt cx="0" cy="0"/>
+        </a:xfrm>
+      </p:grpSpPr>
+      <p:sp>
+        <p:nvSpPr>
+          <p:cNvPr id="2" name="Title Placeholder 1"/>
+          <p:cNvSpPr>
+            <a:spLocks noGrp="1"/>
+          </p:cNvSpPr>
+          <p:nvPr>
+            <p:ph type="title"/>
+          </p:nvPr>
+        </p:nvSpPr>
+        <p:spPr>
+          <a:xfrm>
+            <a:off x="1114424" y="263714"/>
+            <a:ext cx="8029576" cy="914400"/>
+          </a:xfrm>
+          <a:prstGeom prst="rect">
+            <a:avLst/>
+          </a:prstGeom>
+          <a:solidFill>
+            <a:schemeClr val="tx2"/>
+          </a:solidFill>
+        </p:spPr>
+        <p:txBody>
+          <a:bodyPr vert="horz" lIns="1188720" tIns="45720" rIns="274320" bIns="45720" rtlCol="0" anchor="ctr">
+            <a:normAutofit/>
+          </a:bodyPr>
+          <a:lstStyle/>
+          <a:p>
+            <a:r>
+              <a:rPr lang="en-US" dirty="0" smtClean="0"/>
+              <a:t>Click to edit Master title style</a:t>
+            </a:r>
+            <a:endParaRPr dirty="0"/>
+          </a:p>
+        </p:txBody>
+      </p:sp>
+      <p:sp>
+        <p:nvSpPr>
+          <p:cNvPr id="3" name="Text Placeholder 2"/>
+          <p:cNvSpPr>
+            <a:spLocks noGrp="1"/>
+          </p:cNvSpPr>
+          <p:nvPr>
+            <p:ph type="body" idx="1"/>
+          </p:nvPr>
+        </p:nvSpPr>
+        <p:spPr>
+          <a:xfrm>
+            <a:off x="1114424" y="1549124"/>
+            <a:ext cx="7610476" cy="4791700"/>
+          </a:xfrm>
+          <a:prstGeom prst="rect">
+            <a:avLst/>
+          </a:prstGeom>
+        </p:spPr>
+        <p:txBody>
+          <a:bodyPr vert="horz" lIns="91440" tIns="45720" rIns="91440" bIns="45720" rtlCol="0">
+            <a:normAutofit/>
+          </a:bodyPr>
+          <a:lstStyle/>
+          <a:p>
+            <a:pPr lvl="0"/>
+            <a:r>
+              <a:rPr lang="en-US" dirty="0" smtClean="0"/>
+              <a:t>Click to edit Master text styles</a:t>
+            </a:r>
+          </a:p>
+          <a:p>
+            <a:pPr lvl="1"/>
+            <a:r>
+              <a:rPr lang="en-US" dirty="0" smtClean="0"/>
+              <a:t>Second level</a:t>
+            </a:r>
+          </a:p>
+          <a:p>
+            <a:pPr lvl="2"/>
+            <a:r>
+              <a:rPr lang="en-US" dirty="0" smtClean="0"/>
+              <a:t>Third level</a:t>
+            </a:r>
+          </a:p>
+          <a:p>
+            <a:pPr lvl="3"/>
+            <a:r>
+              <a:rPr lang="en-US" dirty="0" smtClean="0"/>
+              <a:t>Fourth level</a:t>
+            </a:r>
+          </a:p>
+          <a:p>
+            <a:pPr lvl="4"/>
+            <a:r>
+              <a:rPr lang="en-US" dirty="0" smtClean="0"/>
+              <a:t>Fifth level</a:t>
+            </a:r>
+            <a:endParaRPr dirty="0"/>
+          </a:p>
+        </p:txBody>
+      </p:sp>
+      <p:sp>
+        <p:nvSpPr>
+          <p:cNvPr id="4" name="Date Placeholder 3"/>
+          <p:cNvSpPr>
+            <a:spLocks noGrp="1"/>
+          </p:cNvSpPr>
+          <p:nvPr>
+            <p:ph type="dt" sz="half" idx="2"/>
+          </p:nvPr>
+        </p:nvSpPr>
+        <p:spPr>
+          <a:xfrm>
+            <a:off x="6580094" y="188259"/>
+            <a:ext cx="2133600" cy="365125"/>
+          </a:xfrm>
+          <a:prstGeom prst="rect">
+            <a:avLst/>
+          </a:prstGeom>
+        </p:spPr>
+        <p:txBody>
+          <a:bodyPr vert="horz" lIns="91440" tIns="45720" rIns="91440" bIns="45720" rtlCol="0" anchor="ctr"/>
+          <a:lstStyle>
+            <a:lvl1pPr algn="r">
+              <a:defRPr sz="1000">
+                <a:solidFill>
+                  <a:schemeClr val="tx1">
+                    <a:lumMod val="65000"/>
+                    <a:lumOff val="35000"/>
+                  </a:schemeClr>
+                </a:solidFill>
+              </a:defRPr>
+            </a:lvl1pPr>
+          </a:lstStyle>
+          <a:p>
+            <a:fld id="{4C4AD4EB-88D0-C141-9474-CCD86A78CB94}" type="datetimeFigureOut">
+              <a:rPr lang="en-US" smtClean="0"/>
+              <a:pPr/>
+              <a:t>9/14/10</a:t>
+            </a:fld>
+            <a:endParaRPr lang="en-US"/>
+          </a:p>
+        </p:txBody>
+      </p:sp>
+      <p:sp>
+        <p:nvSpPr>
+          <p:cNvPr id="5" name="Footer Placeholder 4"/>
+          <p:cNvSpPr>
+            <a:spLocks noGrp="1"/>
+          </p:cNvSpPr>
+          <p:nvPr>
+            <p:ph type="ftr" sz="quarter" idx="3"/>
+          </p:nvPr>
+        </p:nvSpPr>
+        <p:spPr>
+          <a:xfrm>
+            <a:off x="1120588" y="188259"/>
+            <a:ext cx="2895600" cy="365125"/>
+          </a:xfrm>
+          <a:prstGeom prst="rect">
+            <a:avLst/>
+          </a:prstGeom>
+        </p:spPr>
+        <p:txBody>
+          <a:bodyPr vert="horz" lIns="91440" tIns="45720" rIns="91440" bIns="45720" rtlCol="0" anchor="ctr"/>
+          <a:lstStyle>
+            <a:lvl1pPr algn="l">
+              <a:defRPr sz="1000">
+                <a:solidFill>
+                  <a:schemeClr val="tx1">
+                    <a:lumMod val="65000"/>
+                    <a:lumOff val="35000"/>
+                  </a:schemeClr>
+                </a:solidFill>
+              </a:defRPr>
+            </a:lvl1pPr>
+          </a:lstStyle>
+          <a:p>
+            <a:endParaRPr lang="en-US"/>
+          </a:p>
+        </p:txBody>
+      </p:sp>
+      <p:sp>
+        <p:nvSpPr>
+          <p:cNvPr id="6" name="Slide Number Placeholder 5"/>
+          <p:cNvSpPr>
+            <a:spLocks noGrp="1"/>
+          </p:cNvSpPr>
+          <p:nvPr>
+            <p:ph type="sldNum" sz="quarter" idx="4"/>
+          </p:nvPr>
+        </p:nvSpPr>
+        <p:spPr>
+          <a:xfrm>
+            <a:off x="8789894" y="6569075"/>
+            <a:ext cx="457200" cy="365125"/>
+          </a:xfrm>
+          <a:prstGeom prst="rect">
+            <a:avLst/>
+          </a:prstGeom>
+        </p:spPr>
+        <p:txBody>
+          <a:bodyPr vert="horz" lIns="91440" tIns="45720" rIns="91440" bIns="45720" rtlCol="0" anchor="ctr"/>
+          <a:lstStyle>
+            <a:lvl1pPr algn="ctr">
+              <a:defRPr sz="800">
+                <a:solidFill>
+                  <a:schemeClr val="tx1">
+                    <a:lumMod val="65000"/>
+                    <a:lumOff val="35000"/>
+                  </a:schemeClr>
+                </a:solidFill>
+              </a:defRPr>
+            </a:lvl1pPr>
+          </a:lstStyle>
+          <a:p>
+            <a:fld id="{DF7665AF-92BA-E649-941D-268879B3EA81}" type="slidenum">
+              <a:rPr lang="en-US" smtClean="0"/>
+              <a:pPr/>
+              <a:t>‹#›</a:t>
+            </a:fld>
+            <a:endParaRPr lang="en-US"/>
+          </a:p>
+        </p:txBody>
+      </p:sp>
+      <p:sp>
+        <p:nvSpPr>
+          <p:cNvPr id="7" name="Rectangle 6"/>
+          <p:cNvSpPr/>
+          <p:nvPr/>
+        </p:nvSpPr>
+        <p:spPr>
+          <a:xfrm>
+            <a:off x="914400" y="0"/>
+            <a:ext cx="7999413" cy="182880"/>
+          </a:xfrm>
+          <a:prstGeom prst="rect">
+            <a:avLst/>
+          </a:prstGeom>
+          <a:solidFill>
+            <a:schemeClr val="bg2">
+              <a:lumMod val="60000"/>
+              <a:lumOff val="40000"/>
+            </a:schemeClr>
+          </a:solidFill>
+          <a:ln>
+            <a:noFill/>
+          </a:ln>
+        </p:spPr>
+        <p:style>
+          <a:lnRef idx="2">
+            <a:schemeClr val="accent1">
+              <a:shade val="50000"/>
+            </a:schemeClr>
+          </a:lnRef>
+          <a:fillRef idx="1">
+            <a:schemeClr val="accent1"/>
+          </a:fillRef>
+          <a:effectRef idx="0">
+            <a:schemeClr val="accent1"/>
+          </a:effectRef>
+          <a:fontRef idx="minor">
+            <a:schemeClr val="lt1"/>
+          </a:fontRef>
+        </p:style>
+        <p:txBody>
+          <a:bodyPr rtlCol="0" anchor="ctr"/>
+          <a:lstStyle/>
+          <a:p>
+            <a:pPr algn="ctr"/>
+            <a:endParaRPr/>
+          </a:p>
+        </p:txBody>
+      </p:sp>
+      <p:sp>
+        <p:nvSpPr>
+          <p:cNvPr id="8" name="Rectangle 7"/>
+          <p:cNvSpPr/>
+          <p:nvPr/>
+        </p:nvSpPr>
+        <p:spPr>
+          <a:xfrm>
+            <a:off x="914400" y="6675120"/>
+            <a:ext cx="7999413" cy="182880"/>
+          </a:xfrm>
+          <a:prstGeom prst="rect">
+            <a:avLst/>
+          </a:prstGeom>
+          <a:solidFill>
+            <a:schemeClr val="bg2">
+              <a:lumMod val="40000"/>
+              <a:lumOff val="60000"/>
+            </a:schemeClr>
+          </a:solidFill>
+          <a:ln>
+            <a:noFill/>
+          </a:ln>
+        </p:spPr>
+        <p:style>
+          <a:lnRef idx="2">
+            <a:schemeClr val="accent1">
+              <a:shade val="50000"/>
+            </a:schemeClr>
+          </a:lnRef>
+          <a:fillRef idx="1">
+            <a:schemeClr val="accent1"/>
+          </a:fillRef>
+          <a:effectRef idx="0">
+            <a:schemeClr val="accent1"/>
+          </a:effectRef>
+          <a:fontRef idx="minor">
+            <a:schemeClr val="lt1"/>
+          </a:fontRef>
+        </p:style>
+        <p:txBody>
+          <a:bodyPr rtlCol="0" anchor="ctr"/>
+          <a:lstStyle/>
+          <a:p>
+            <a:pPr algn="ctr"/>
+            <a:endParaRPr/>
+          </a:p>
+        </p:txBody>
+      </p:sp>
+      <p:pic>
+        <p:nvPicPr>
+          <p:cNvPr id="9" name="Picture 1"/>
+          <p:cNvPicPr>
+            <a:picLocks noChangeArrowheads="1"/>
+          </p:cNvPicPr>
+          <p:nvPr userDrawn="1"/>
+        </p:nvPicPr>
+        <p:blipFill>
+          <a:blip r:embed="rId6"/>
+          <a:srcRect/>
+          <a:stretch>
+            <a:fillRect/>
+          </a:stretch>
+        </p:blipFill>
+        <p:spPr bwMode="auto">
+          <a:xfrm>
+            <a:off x="94958" y="263714"/>
+            <a:ext cx="786525" cy="709637"/>
+          </a:xfrm>
+          <a:prstGeom prst="rect">
+            <a:avLst/>
+          </a:prstGeom>
+          <a:noFill/>
+          <a:ln w="12700">
+            <a:noFill/>
+            <a:miter lim="800000"/>
+            <a:headEnd/>
+            <a:tailEnd/>
+          </a:ln>
+        </p:spPr>
+      </p:pic>
+    </p:spTree>
+  </p:cSld>
+  <p:clrMap bg1="lt1" tx1="dk1" bg2="lt2" tx2="dk2" accent1="accent1" accent2="accent2" accent3="accent3" accent4="accent4" accent5="accent5" accent6="accent6" hlink="hlink" folHlink="folHlink"/>
+  <p:sldLayoutIdLst>
+    <p:sldLayoutId id="2147483678" r:id="rId1"/>
+    <p:sldLayoutId id="2147483679" r:id="rId2"/>
+    <p:sldLayoutId id="2147483680" r:id="rId3"/>
+    <p:sldLayoutId id="2147483681" r:id="rId4"/>
+  </p:sldLayoutIdLst>
+  <p:txStyles>
+    <p:titleStyle>
+      <a:lvl1pPr marL="0" indent="0" algn="l" defTabSz="914400" rtl="0" eaLnBrk="1" latinLnBrk="0" hangingPunct="1">
+        <a:spcBef>
+          <a:spcPct val="0"/>
+        </a:spcBef>
+        <a:buNone/>
+        <a:defRPr sz="3200" kern="1200">
+          <a:solidFill>
+            <a:schemeClr val="bg1"/>
+          </a:solidFill>
+          <a:latin typeface="+mj-lt"/>
+          <a:ea typeface="+mj-ea"/>
+          <a:cs typeface="+mj-cs"/>
+        </a:defRPr>
+      </a:lvl1pPr>
+    </p:titleStyle>
+    <p:bodyStyle>
+      <a:lvl1pPr marL="342900" indent="-342900" algn="l" defTabSz="914400" rtl="0" eaLnBrk="1" latinLnBrk="0" hangingPunct="1">
+        <a:spcBef>
+          <a:spcPts val="2000"/>
+        </a:spcBef>
+        <a:buClr>
+          <a:schemeClr val="tx1">
+            <a:lumMod val="95000"/>
+            <a:lumOff val="5000"/>
+          </a:schemeClr>
+        </a:buClr>
+        <a:buFont typeface="Wingdings 2" pitchFamily="18" charset="2"/>
+        <a:buChar char=""/>
+        <a:defRPr sz="2000" kern="1200">
+          <a:solidFill>
+            <a:schemeClr val="tx1">
+              <a:lumMod val="65000"/>
+              <a:lumOff val="35000"/>
+            </a:schemeClr>
+          </a:solidFill>
+          <a:latin typeface="+mn-lt"/>
+          <a:ea typeface="+mn-ea"/>
+          <a:cs typeface="+mn-cs"/>
+        </a:defRPr>
+      </a:lvl1pPr>
+      <a:lvl2pPr marL="685800" indent="-336550" algn="l" defTabSz="914400" rtl="0" eaLnBrk="1" latinLnBrk="0" hangingPunct="1">
+        <a:spcBef>
+          <a:spcPts val="600"/>
+        </a:spcBef>
+        <a:buClr>
+          <a:schemeClr val="tx1">
+            <a:lumMod val="85000"/>
+            <a:lumOff val="15000"/>
+          </a:schemeClr>
+        </a:buClr>
+        <a:buFont typeface="Arial"/>
+        <a:buChar char="•"/>
+        <a:defRPr sz="1800" kern="1200">
+          <a:solidFill>
+            <a:schemeClr val="accent5"/>
+          </a:solidFill>
+          <a:latin typeface="+mn-lt"/>
+          <a:ea typeface="+mn-ea"/>
+          <a:cs typeface="+mn-cs"/>
+        </a:defRPr>
+      </a:lvl2pPr>
+      <a:lvl3pPr marL="1035050" indent="-349250" algn="l" defTabSz="914400" rtl="0" eaLnBrk="1" latinLnBrk="0" hangingPunct="1">
+        <a:spcBef>
+          <a:spcPts val="600"/>
+        </a:spcBef>
+        <a:buClr>
+          <a:schemeClr val="tx1">
+            <a:lumMod val="75000"/>
+            <a:lumOff val="25000"/>
+          </a:schemeClr>
+        </a:buClr>
+        <a:buFont typeface="Arial"/>
+        <a:buChar char="•"/>
+        <a:defRPr sz="1800" kern="1200">
+          <a:solidFill>
+            <a:schemeClr val="tx1">
+              <a:lumMod val="75000"/>
+              <a:lumOff val="25000"/>
+            </a:schemeClr>
+          </a:solidFill>
+          <a:latin typeface="+mn-lt"/>
+          <a:ea typeface="+mn-ea"/>
+          <a:cs typeface="+mn-cs"/>
+        </a:defRPr>
+      </a:lvl3pPr>
+      <a:lvl4pPr marL="1371600" indent="-336550" algn="l" defTabSz="914400" rtl="0" eaLnBrk="1" latinLnBrk="0" hangingPunct="1">
+        <a:spcBef>
+          <a:spcPts val="600"/>
+        </a:spcBef>
+        <a:buClr>
+          <a:schemeClr val="tx1">
+            <a:lumMod val="65000"/>
+            <a:lumOff val="35000"/>
+          </a:schemeClr>
+        </a:buClr>
+        <a:buFont typeface="Arial"/>
+        <a:buChar char="•"/>
+        <a:defRPr sz="1800" kern="1200">
+          <a:solidFill>
+            <a:schemeClr val="tx1">
+              <a:lumMod val="65000"/>
+              <a:lumOff val="35000"/>
+            </a:schemeClr>
+          </a:solidFill>
+          <a:latin typeface="+mn-lt"/>
+          <a:ea typeface="+mn-ea"/>
+          <a:cs typeface="+mn-cs"/>
+        </a:defRPr>
+      </a:lvl4pPr>
+      <a:lvl5pPr marL="1720850" indent="-349250" algn="l" defTabSz="914400" rtl="0" eaLnBrk="1" latinLnBrk="0" hangingPunct="1">
+        <a:spcBef>
+          <a:spcPts val="600"/>
+        </a:spcBef>
+        <a:buClr>
+          <a:schemeClr val="tx1">
+            <a:lumMod val="50000"/>
+            <a:lumOff val="50000"/>
+          </a:schemeClr>
+        </a:buClr>
+        <a:buFont typeface="Arial"/>
+        <a:buChar char="•"/>
+        <a:defRPr sz="1800" kern="1200">
+          <a:solidFill>
+            <a:schemeClr val="tx1">
+              <a:lumMod val="65000"/>
+              <a:lumOff val="35000"/>
+            </a:schemeClr>
+          </a:solidFill>
+          <a:latin typeface="+mn-lt"/>
+          <a:ea typeface="+mn-ea"/>
+          <a:cs typeface="+mn-cs"/>
+        </a:defRPr>
+      </a:lvl5pPr>
+      <a:lvl6pPr marL="2514600" indent="-228600" algn="l" defTabSz="914400" rtl="0" eaLnBrk="1" latinLnBrk="0" hangingPunct="1">
+        <a:spcBef>
+          <a:spcPct val="20000"/>
+        </a:spcBef>
+        <a:buFont typeface="Arial" pitchFamily="34" charset="0"/>
+        <a:buChar char="•"/>
+        <a:defRPr sz="2000" kern="1200">
+          <a:solidFill>
+            <a:schemeClr val="tx1"/>
+          </a:solidFill>
+          <a:latin typeface="+mn-lt"/>
+          <a:ea typeface="+mn-ea"/>
+          <a:cs typeface="+mn-cs"/>
+        </a:defRPr>
+      </a:lvl6pPr>
+      <a:lvl7pPr marL="2971800" indent="-228600" algn="l" defTabSz="914400" rtl="0" eaLnBrk="1" latinLnBrk="0" hangingPunct="1">
+        <a:spcBef>
+          <a:spcPct val="20000"/>
+        </a:spcBef>
+        <a:buFont typeface="Arial" pitchFamily="34" charset="0"/>
+        <a:buChar char="•"/>
+        <a:defRPr sz="2000" kern="1200">
+          <a:solidFill>
+            <a:schemeClr val="tx1"/>
+          </a:solidFill>
+          <a:latin typeface="+mn-lt"/>
+          <a:ea typeface="+mn-ea"/>
+          <a:cs typeface="+mn-cs"/>
+        </a:defRPr>
+      </a:lvl7pPr>
+      <a:lvl8pPr marL="3429000" indent="-228600" algn="l" defTabSz="914400" rtl="0" eaLnBrk="1" latinLnBrk="0" hangingPunct="1">
+        <a:spcBef>
+          <a:spcPct val="20000"/>
+        </a:spcBef>
+        <a:buFont typeface="Arial" pitchFamily="34" charset="0"/>
+        <a:buChar char="•"/>
+        <a:defRPr sz="2000" kern="1200">
+          <a:solidFill>
+            <a:schemeClr val="tx1"/>
+          </a:solidFill>
+          <a:latin typeface="+mn-lt"/>
+          <a:ea typeface="+mn-ea"/>
+          <a:cs typeface="+mn-cs"/>
+        </a:defRPr>
+      </a:lvl8pPr>
+      <a:lvl9pPr marL="3886200" indent="-228600" algn="l" defTabSz="914400" rtl="0" eaLnBrk="1" latinLnBrk="0" hangingPunct="1">
+        <a:spcBef>
+          <a:spcPct val="20000"/>
+        </a:spcBef>
+        <a:buFont typeface="Arial" pitchFamily="34" charset="0"/>
+        <a:buChar char="•"/>
+        <a:defRPr sz="2000" kern="1200">
+          <a:solidFill>
+            <a:schemeClr val="tx1"/>
+          </a:solidFill>
+          <a:latin typeface="+mn-lt"/>
+          <a:ea typeface="+mn-ea"/>
+          <a:cs typeface="+mn-cs"/>
+        </a:defRPr>
+      </a:lvl9pPr>
+    </p:bodyStyle>
+    <p:otherStyle>
+      <a:defPPr>
+        <a:defRPr/>
+      </a:defPPr>
+      <a:lvl1pPr marL="0" algn="l" defTabSz="914400" rtl="0" eaLnBrk="1" latinLnBrk="0" hangingPunct="1">
+        <a:defRPr sz="1800" kern="1200">
+          <a:solidFill>
+            <a:schemeClr val="tx1"/>
+          </a:solidFill>
+          <a:latin typeface="+mn-lt"/>
+          <a:ea typeface="+mn-ea"/>
+          <a:cs typeface="+mn-cs"/>
+        </a:defRPr>
+      </a:lvl1pPr>
+      <a:lvl2pPr marL="457200" algn="l" defTabSz="914400" rtl="0" eaLnBrk="1" latinLnBrk="0" hangingPunct="1">
+        <a:defRPr sz="1800" kern="1200">
+          <a:solidFill>
+            <a:schemeClr val="tx1"/>
+          </a:solidFill>
+          <a:latin typeface="+mn-lt"/>
+          <a:ea typeface="+mn-ea"/>
+          <a:cs typeface="+mn-cs"/>
+        </a:defRPr>
+      </a:lvl2pPr>
+      <a:lvl3pPr marL="914400" algn="l" defTabSz="914400" rtl="0" eaLnBrk="1" latinLnBrk="0" hangingPunct="1">
+        <a:defRPr sz="1800" kern="1200">
+          <a:solidFill>
+            <a:schemeClr val="tx1"/>
+          </a:solidFill>
+          <a:latin typeface="+mn-lt"/>
+          <a:ea typeface="+mn-ea"/>
+          <a:cs typeface="+mn-cs"/>
+        </a:defRPr>
+      </a:lvl3pPr>
+      <a:lvl4pPr marL="1371600" algn="l" defTabSz="914400" rtl="0" eaLnBrk="1" latinLnBrk="0" hangingPunct="1">
+        <a:defRPr sz="1800" kern="1200">
+          <a:solidFill>
+            <a:schemeClr val="tx1"/>
+          </a:solidFill>
+          <a:latin typeface="+mn-lt"/>
+          <a:ea typeface="+mn-ea"/>
+          <a:cs typeface="+mn-cs"/>
+        </a:defRPr>
+      </a:lvl4pPr>
+      <a:lvl5pPr marL="1828800" algn="l" defTabSz="914400" rtl="0" eaLnBrk="1" latinLnBrk="0" hangingPunct="1">
+        <a:defRPr sz="1800" kern="1200">
+          <a:solidFill>
+            <a:schemeClr val="tx1"/>
+          </a:solidFill>
+          <a:latin typeface="+mn-lt"/>
+          <a:ea typeface="+mn-ea"/>
+          <a:cs typeface="+mn-cs"/>
+        </a:defRPr>
+      </a:lvl5pPr>
+      <a:lvl6pPr marL="2286000" algn="l" defTabSz="914400" rtl="0" eaLnBrk="1" latinLnBrk="0" hangingPunct="1">
+        <a:defRPr sz="1800" kern="1200">
+          <a:solidFill>
+            <a:schemeClr val="tx1"/>
+          </a:solidFill>
+          <a:latin typeface="+mn-lt"/>
+          <a:ea typeface="+mn-ea"/>
+          <a:cs typeface="+mn-cs"/>
+        </a:defRPr>
+      </a:lvl6pPr>
+      <a:lvl7pPr marL="2743200" algn="l" defTabSz="914400" rtl="0" eaLnBrk="1" latinLnBrk="0" hangingPunct="1">
+        <a:defRPr sz="1800" kern="1200">
+          <a:solidFill>
+            <a:schemeClr val="tx1"/>
+          </a:solidFill>
+          <a:latin typeface="+mn-lt"/>
+          <a:ea typeface="+mn-ea"/>
+          <a:cs typeface="+mn-cs"/>
+        </a:defRPr>
+      </a:lvl7pPr>
+      <a:lvl8pPr marL="3200400" algn="l" defTabSz="914400" rtl="0" eaLnBrk="1" latinLnBrk="0" hangingPunct="1">
+        <a:defRPr sz="1800" kern="1200">
+          <a:solidFill>
+            <a:schemeClr val="tx1"/>
+          </a:solidFill>
+          <a:latin typeface="+mn-lt"/>
+          <a:ea typeface="+mn-ea"/>
+          <a:cs typeface="+mn-cs"/>
+        </a:defRPr>
+      </a:lvl8pPr>
+      <a:lvl9pPr marL="3657600" algn="l" defTabSz="914400" rtl="0" eaLnBrk="1" latinLnBrk="0" hangingPunct="1">
+        <a:defRPr sz="1800" kern="1200">
+          <a:solidFill>
+            <a:schemeClr val="tx1"/>
+          </a:solidFill>
+          <a:latin typeface="+mn-lt"/>
+          <a:ea typeface="+mn-ea"/>
+          <a:cs typeface="+mn-cs"/>
+        </a:defRPr>
+      </a:lvl9pPr>
+    </p:otherStyle>
+  </p:txStyles>
+</p:sldMaster>
+</file>
+
 <file path=ppt/slides/slide1.xml><?xml version="1.0" encoding="utf-8"?>
 <p:sld xmlns:a="http://schemas.openxmlformats.org/drawingml/2006/main" xmlns:r="http://schemas.openxmlformats.org/officeDocument/2006/relationships" xmlns:mc="http://schemas.openxmlformats.org/markup-compatibility/2006" xmlns:mv="urn:schemas-microsoft-com:mac:vml" xmlns:p="http://schemas.openxmlformats.org/presentationml/2006/main" mc:Ignorable="mv" mc:PreserveAttributes="mv:*">
   <p:cSld>
@@ -7676,56 +9377,45 @@
       </p:grpSpPr>
       <p:sp>
         <p:nvSpPr>
-          <p:cNvPr id="3" name="Subtitle 2"/>
-          <p:cNvSpPr>
-            <a:spLocks noGrp="1"/>
-          </p:cNvSpPr>
-          <p:nvPr>
-            <p:ph type="subTitle" idx="4294967295"/>
-          </p:nvPr>
-        </p:nvSpPr>
-        <p:spPr>
-          <a:xfrm>
-            <a:off x="914400" y="4318000"/>
-            <a:ext cx="8001000" cy="2540000"/>
-          </a:xfrm>
-        </p:spPr>
+          <p:cNvPr id="14" name="Subtitle 13"/>
+          <p:cNvSpPr>
+            <a:spLocks noGrp="1"/>
+          </p:cNvSpPr>
+          <p:nvPr>
+            <p:ph type="subTitle" idx="1"/>
+          </p:nvPr>
+        </p:nvSpPr>
+        <p:spPr/>
         <p:txBody>
           <a:bodyPr/>
           <a:lstStyle/>
           <a:p>
-            <a:r>
-              <a:rPr lang="en-US" dirty="0" smtClean="0"/>
-              <a:t>Building and Installing</a:t>
-            </a:r>
-            <a:endParaRPr lang="en-US" dirty="0"/>
-          </a:p>
-        </p:txBody>
-      </p:sp>
-      <p:sp>
-        <p:nvSpPr>
-          <p:cNvPr id="13" name="Title 12"/>
-          <p:cNvSpPr>
-            <a:spLocks noGrp="1"/>
-          </p:cNvSpPr>
-          <p:nvPr>
-            <p:ph type="title"/>
+            <a:endParaRPr lang="en-US"/>
+          </a:p>
+        </p:txBody>
+      </p:sp>
+      <p:sp>
+        <p:nvSpPr>
+          <p:cNvPr id="12" name="Title 11"/>
+          <p:cNvSpPr>
+            <a:spLocks noGrp="1"/>
+          </p:cNvSpPr>
+          <p:nvPr>
+            <p:ph type="ctrTitle"/>
           </p:nvPr>
         </p:nvSpPr>
         <p:spPr/>
         <p:txBody>
-          <a:bodyPr tIns="274320"/>
-          <a:lstStyle/>
-          <a:p>
-            <a:r>
-              <a:rPr lang="en-US" dirty="0" smtClean="0"/>
-              <a:t>Efficient Replica-Exchange Simulations on Large-Scale </a:t>
-            </a:r>
-            <a:r>
-              <a:rPr lang="en-US" dirty="0" smtClean="0"/>
-              <a:t>Production Infrastructure</a:t>
-            </a:r>
-            <a:endParaRPr lang="en-US" dirty="0"/>
+          <a:bodyPr>
+            <a:noAutofit/>
+          </a:bodyPr>
+          <a:lstStyle/>
+          <a:p>
+            <a:r>
+              <a:rPr lang="en-US" sz="2800" dirty="0" smtClean="0"/>
+              <a:t>Efficient Replica-Exchange Simulations on Large-Scale Production Infrastructure</a:t>
+            </a:r>
+            <a:endParaRPr lang="en-US" sz="2800" dirty="0"/>
           </a:p>
         </p:txBody>
       </p:sp>
@@ -7868,7 +9558,7 @@
         <p:spPr/>
         <p:txBody>
           <a:bodyPr>
-            <a:normAutofit/>
+            <a:normAutofit fontScale="90000"/>
           </a:bodyPr>
           <a:lstStyle/>
           <a:p>
@@ -7894,7 +9584,7 @@
           <mc:Choice xmlns:ma="http://schemas.microsoft.com/office/mac/drawingml/2008/main" Requires="ma">
             <p:blipFill>
               <a:blip r:embed="rId3"/>
-              <a:srcRect t="-1503" b="-1503"/>
+              <a:srcRect t="-4166" b="-4166"/>
               <a:stretch>
                 <a:fillRect/>
               </a:stretch>
@@ -7903,7 +9593,7 @@
           <mc:Fallback>
             <p:blipFill>
               <a:blip r:embed="rId4"/>
-              <a:srcRect t="-1503" b="-1503"/>
+              <a:srcRect t="-4166" b="-4166"/>
               <a:stretch>
                 <a:fillRect/>
               </a:stretch>
@@ -7977,12 +9667,7 @@
             <p:ph idx="1"/>
           </p:nvPr>
         </p:nvSpPr>
-        <p:spPr>
-          <a:xfrm>
-            <a:off x="757947" y="1817641"/>
-            <a:ext cx="7966954" cy="4197711"/>
-          </a:xfrm>
-        </p:spPr>
+        <p:spPr/>
         <p:txBody>
           <a:bodyPr>
             <a:normAutofit/>
@@ -8076,15 +9761,10 @@
             <p:ph idx="1"/>
           </p:nvPr>
         </p:nvSpPr>
-        <p:spPr>
-          <a:xfrm>
-            <a:off x="457200" y="1817641"/>
-            <a:ext cx="8229600" cy="1870454"/>
-          </a:xfrm>
-        </p:spPr>
+        <p:spPr/>
         <p:txBody>
           <a:bodyPr>
-            <a:normAutofit fontScale="92500"/>
+            <a:normAutofit/>
           </a:bodyPr>
           <a:lstStyle/>
           <a:p>
@@ -8177,12 +9857,7 @@
             <p:ph idx="1"/>
           </p:nvPr>
         </p:nvSpPr>
-        <p:spPr>
-          <a:xfrm>
-            <a:off x="457200" y="1987826"/>
-            <a:ext cx="8081547" cy="2595683"/>
-          </a:xfrm>
-        </p:spPr>
+        <p:spPr/>
         <p:txBody>
           <a:bodyPr>
             <a:normAutofit/>
@@ -8244,8 +9919,8 @@
           </p:cNvPicPr>
           <p:nvPr/>
         </p:nvPicPr>
-        <mc:AlternateContent>
-          <mc:Choice xmlns:ma="http://schemas.microsoft.com/office/mac/drawingml/2008/main" Requires="ma">
+        <mc:AlternateContent xmlns:ma="http://schemas.microsoft.com/office/mac/drawingml/2008/main">
+          <mc:Choice Requires="ma">
             <p:blipFill>
               <a:blip r:embed="rId2"/>
               <a:stretch>
@@ -8253,7 +9928,7 @@
               </a:stretch>
             </p:blipFill>
           </mc:Choice>
-          <mc:Fallback>
+          <mc:Fallback xmlns:p="http://schemas.openxmlformats.org/presentationml/2006/main" xmlns:mv="urn:schemas-microsoft-com:mac:vml" xmlns:mc="http://schemas.openxmlformats.org/markup-compatibility/2006" xmlns:r="http://schemas.openxmlformats.org/officeDocument/2006/relationships" xmlns:a="http://schemas.openxmlformats.org/drawingml/2006/main" xmlns="">
             <p:blipFill>
               <a:blip r:embed="rId3"/>
               <a:stretch>
@@ -8361,15 +10036,7 @@
           <a:p>
             <a:r>
               <a:rPr lang="en-US" dirty="0" smtClean="0"/>
-              <a:t>Comparison – when running on</a:t>
-            </a:r>
-            <a:r>
-              <a:rPr lang="en-US" dirty="0" smtClean="0"/>
-              <a:t> one </a:t>
-            </a:r>
-            <a:r>
-              <a:rPr lang="en-US" dirty="0" smtClean="0"/>
-              <a:t>machine</a:t>
+              <a:t>Comparison – when running on one machine</a:t>
             </a:r>
             <a:endParaRPr lang="en-US" dirty="0"/>
           </a:p>
@@ -8385,12 +10052,7 @@
             <p:ph idx="1"/>
           </p:nvPr>
         </p:nvSpPr>
-        <p:spPr>
-          <a:xfrm>
-            <a:off x="457200" y="1817641"/>
-            <a:ext cx="8229600" cy="4525963"/>
-          </a:xfrm>
-        </p:spPr>
+        <p:spPr/>
         <p:txBody>
           <a:bodyPr/>
           <a:lstStyle/>
@@ -8497,7 +10159,7 @@
         <p:spPr/>
         <p:txBody>
           <a:bodyPr>
-            <a:normAutofit/>
+            <a:normAutofit fontScale="90000"/>
           </a:bodyPr>
           <a:lstStyle/>
           <a:p>
@@ -8519,15 +10181,10 @@
             <p:ph idx="1"/>
           </p:nvPr>
         </p:nvSpPr>
-        <p:spPr>
-          <a:xfrm>
-            <a:off x="457200" y="1817641"/>
-            <a:ext cx="8229600" cy="4525963"/>
-          </a:xfrm>
-        </p:spPr>
+        <p:spPr/>
         <p:txBody>
           <a:bodyPr>
-            <a:normAutofit lnSpcReduction="10000"/>
+            <a:normAutofit fontScale="92500" lnSpcReduction="10000"/>
           </a:bodyPr>
           <a:lstStyle/>
           <a:p>
@@ -8553,15 +10210,7 @@
                   <a:srgbClr val="595959"/>
                 </a:solidFill>
               </a:rPr>
-              <a:t>, a LONI/Teragrid machine</a:t>
-            </a:r>
-            <a:r>
-              <a:rPr lang="en-US" dirty="0" smtClean="0">
-                <a:solidFill>
-                  <a:srgbClr val="595959"/>
-                </a:solidFill>
-              </a:rPr>
-              <a:t>.</a:t>
+              <a:t>, a LONI/Teragrid machine.</a:t>
             </a:r>
           </a:p>
           <a:p>
@@ -8590,11 +10239,6 @@
               </a:rPr>
               <a:t> is launched with sufficient number of cores. The metric used is the time to complete a particular number of exchanges.</a:t>
             </a:r>
-            <a:endParaRPr lang="en-US" dirty="0" smtClean="0">
-              <a:solidFill>
-                <a:srgbClr val="595959"/>
-              </a:solidFill>
-            </a:endParaRPr>
           </a:p>
           <a:p>
             <a:pPr lvl="0"/>
@@ -8606,11 +10250,6 @@
               </a:rPr>
               <a:t>The ratio between the number of replicas and the number of exchanges is kept constant, for the purpose of comparison.</a:t>
             </a:r>
-            <a:endParaRPr lang="en-US" dirty="0" smtClean="0">
-              <a:solidFill>
-                <a:srgbClr val="595959"/>
-              </a:solidFill>
-            </a:endParaRPr>
           </a:p>
           <a:p>
             <a:r>
@@ -8619,15 +10258,7 @@
                   <a:srgbClr val="595959"/>
                 </a:solidFill>
               </a:rPr>
-              <a:t>Each experiment has been repeated at least 10 </a:t>
-            </a:r>
-            <a:r>
-              <a:rPr lang="en-US" dirty="0" smtClean="0">
-                <a:solidFill>
-                  <a:srgbClr val="595959"/>
-                </a:solidFill>
-              </a:rPr>
-              <a:t>times.</a:t>
+              <a:t>Each experiment has been repeated at least 10 times.</a:t>
             </a:r>
             <a:endParaRPr lang="en-US" dirty="0">
               <a:solidFill>
@@ -8690,6 +10321,7 @@
   <p:clrMapOvr>
     <a:masterClrMapping/>
   </p:clrMapOvr>
+  <p:transition spd="med"/>
   <p:timing>
     <p:tnLst>
       <p:par>
@@ -8753,7 +10385,7 @@
         <p:spPr/>
         <p:txBody>
           <a:bodyPr>
-            <a:normAutofit fontScale="85000" lnSpcReduction="10000"/>
+            <a:normAutofit fontScale="92500" lnSpcReduction="20000"/>
           </a:bodyPr>
           <a:lstStyle/>
           <a:p>
@@ -8839,7 +10471,7 @@
         <p:spPr/>
         <p:txBody>
           <a:bodyPr>
-            <a:normAutofit/>
+            <a:normAutofit fontScale="90000"/>
           </a:bodyPr>
           <a:lstStyle/>
           <a:p>
@@ -8868,11 +10500,7 @@
           <a:p>
             <a:r>
               <a:rPr lang="en-US" dirty="0" smtClean="0"/>
-              <a:t>In the next few slides, we will see the results when run the experiments over 2 </a:t>
-            </a:r>
-            <a:r>
-              <a:rPr lang="en-US" dirty="0" smtClean="0"/>
-              <a:t>machines.</a:t>
+              <a:t>In the next few slides, we will see the results when run the experiments over 2 machines.</a:t>
             </a:r>
           </a:p>
           <a:p>
@@ -8961,7 +10589,7 @@
         <p:spPr/>
         <p:txBody>
           <a:bodyPr>
-            <a:normAutofit fontScale="92500" lnSpcReduction="10000"/>
+            <a:normAutofit fontScale="92500"/>
           </a:bodyPr>
           <a:lstStyle/>
           <a:p>
@@ -8971,15 +10599,7 @@
                   <a:srgbClr val="595959"/>
                 </a:solidFill>
               </a:rPr>
-              <a:t>We </a:t>
-            </a:r>
-            <a:r>
-              <a:rPr lang="en-US" dirty="0" smtClean="0">
-                <a:solidFill>
-                  <a:srgbClr val="595959"/>
-                </a:solidFill>
-              </a:rPr>
-              <a:t>configured the traditional and asynchronous RE (both centralized and decentralized) to run a parallel NAMD simulation with 8 replicas sampling a temperature between 300 K and 450 K on </a:t>
+              <a:t>We configured the traditional and asynchronous RE (both centralized and decentralized) to run a parallel NAMD simulation with 8 replicas sampling a temperature between 300 K and 450 K on </a:t>
             </a:r>
             <a:r>
               <a:rPr lang="en-US" dirty="0" err="1" smtClean="0">
@@ -8995,38 +10615,17 @@
                   <a:srgbClr val="595959"/>
                 </a:solidFill>
               </a:rPr>
-              <a:t> and Ranger.</a:t>
-            </a:r>
+              <a:t> and Ranger. </a:t>
+            </a:r>
+          </a:p>
+          <a:p>
             <a:r>
               <a:rPr lang="en-US" dirty="0" smtClean="0">
                 <a:solidFill>
                   <a:srgbClr val="595959"/>
                 </a:solidFill>
               </a:rPr>
-              <a:t> </a:t>
-            </a:r>
-            <a:endParaRPr lang="en-US" dirty="0" smtClean="0">
-              <a:solidFill>
-                <a:srgbClr val="595959"/>
-              </a:solidFill>
-            </a:endParaRPr>
-          </a:p>
-          <a:p>
-            <a:r>
-              <a:rPr lang="en-US" dirty="0" smtClean="0">
-                <a:solidFill>
-                  <a:srgbClr val="595959"/>
-                </a:solidFill>
-              </a:rPr>
-              <a:t>Each </a:t>
-            </a:r>
-            <a:r>
-              <a:rPr lang="en-US" dirty="0" smtClean="0">
-                <a:solidFill>
-                  <a:srgbClr val="595959"/>
-                </a:solidFill>
-              </a:rPr>
-              <a:t>replica uses 16 MPI processes and runs 500 time steps between exchange attempts. In each case a two </a:t>
+              <a:t>Each replica uses 16 MPI processes and runs 500 time steps between exchange attempts. In each case a two </a:t>
             </a:r>
             <a:r>
               <a:rPr lang="en-US" dirty="0" err="1" smtClean="0">
@@ -9042,15 +10641,17 @@
                   <a:srgbClr val="595959"/>
                 </a:solidFill>
               </a:rPr>
-              <a:t> are launched with each requesting 64 cores. The metric used is the time to complete a particular number of exchanges</a:t>
-            </a:r>
+              <a:t> are launched with each requesting 64 cores. The metric used is the time to complete a particular number of exchanges.</a:t>
+            </a:r>
+          </a:p>
+          <a:p>
             <a:r>
               <a:rPr lang="en-US" dirty="0" smtClean="0">
                 <a:solidFill>
                   <a:srgbClr val="595959"/>
                 </a:solidFill>
               </a:rPr>
-              <a:t>.</a:t>
+              <a:t>In the graph, the distributed runs and local runs are compared.</a:t>
             </a:r>
           </a:p>
           <a:p>
@@ -9060,57 +10661,7 @@
                   <a:srgbClr val="595959"/>
                 </a:solidFill>
               </a:rPr>
-              <a:t>In </a:t>
-            </a:r>
-            <a:r>
-              <a:rPr lang="en-US" dirty="0" smtClean="0">
-                <a:solidFill>
-                  <a:srgbClr val="595959"/>
-                </a:solidFill>
-              </a:rPr>
-              <a:t>the graph, the distributed runs and local runs are compared</a:t>
-            </a:r>
-            <a:r>
-              <a:rPr lang="en-US" dirty="0" smtClean="0">
-                <a:solidFill>
-                  <a:srgbClr val="595959"/>
-                </a:solidFill>
-              </a:rPr>
-              <a:t>.</a:t>
-            </a:r>
-          </a:p>
-          <a:p>
-            <a:r>
-              <a:rPr lang="en-US" dirty="0" smtClean="0">
-                <a:solidFill>
-                  <a:srgbClr val="595959"/>
-                </a:solidFill>
-              </a:rPr>
-              <a:t>In </a:t>
-            </a:r>
-            <a:r>
-              <a:rPr lang="en-US" dirty="0" smtClean="0">
-                <a:solidFill>
-                  <a:srgbClr val="595959"/>
-                </a:solidFill>
-              </a:rPr>
-              <a:t>the distributed runs, the run time starts when any one job on a machine becomes active. The job on the second machine may or may not become </a:t>
-            </a:r>
-            <a:r>
-              <a:rPr lang="en-US" dirty="0" smtClean="0">
-                <a:solidFill>
-                  <a:srgbClr val="595959"/>
-                </a:solidFill>
-              </a:rPr>
-              <a:t>active</a:t>
-            </a:r>
-            <a:r>
-              <a:rPr lang="en-US" dirty="0" smtClean="0">
-                <a:solidFill>
-                  <a:srgbClr val="595959"/>
-                </a:solidFill>
-              </a:rPr>
-              <a:t>.</a:t>
+              <a:t>In the distributed runs, the run time starts when any one job on a machine becomes active. The job on the second machine may or may not become active.</a:t>
             </a:r>
           </a:p>
         </p:txBody>
@@ -9173,12 +10724,7 @@
             <p:ph idx="1"/>
           </p:nvPr>
         </p:nvSpPr>
-        <p:spPr>
-          <a:xfrm>
-            <a:off x="457200" y="1817641"/>
-            <a:ext cx="5288841" cy="4525963"/>
-          </a:xfrm>
-        </p:spPr>
+        <p:spPr/>
         <p:txBody>
           <a:bodyPr>
             <a:normAutofit/>
@@ -9282,6 +10828,7 @@
   <p:clrMapOvr>
     <a:masterClrMapping/>
   </p:clrMapOvr>
+  <p:transition spd="med"/>
 </p:sld>
 </file>
 
@@ -9309,10 +10856,15 @@
             <a:spLocks noGrp="1"/>
           </p:cNvSpPr>
           <p:nvPr>
-            <p:ph type="title"/>
-          </p:nvPr>
-        </p:nvSpPr>
-        <p:spPr/>
+            <p:ph type="title" idx="4294967295"/>
+          </p:nvPr>
+        </p:nvSpPr>
+        <p:spPr>
+          <a:xfrm>
+            <a:off x="1114425" y="263525"/>
+            <a:ext cx="8029575" cy="914400"/>
+          </a:xfrm>
+        </p:spPr>
         <p:txBody>
           <a:bodyPr>
             <a:normAutofit fontScale="90000"/>
@@ -9334,10 +10886,15 @@
             <a:spLocks noGrp="1"/>
           </p:cNvSpPr>
           <p:nvPr>
-            <p:ph idx="1"/>
-          </p:nvPr>
-        </p:nvSpPr>
-        <p:spPr/>
+            <p:ph idx="4294967295"/>
+          </p:nvPr>
+        </p:nvSpPr>
+        <p:spPr>
+          <a:xfrm>
+            <a:off x="1176338" y="1530350"/>
+            <a:ext cx="7967662" cy="4608513"/>
+          </a:xfrm>
+        </p:spPr>
         <p:txBody>
           <a:bodyPr>
             <a:normAutofit/>
@@ -9382,6 +10939,7 @@
   <p:clrMapOvr>
     <a:masterClrMapping/>
   </p:clrMapOvr>
+  <p:transition spd="med"/>
   <p:timing>
     <p:tnLst>
       <p:par>
@@ -9416,10 +10974,15 @@
             <a:spLocks noGrp="1"/>
           </p:cNvSpPr>
           <p:nvPr>
-            <p:ph type="title"/>
-          </p:nvPr>
-        </p:nvSpPr>
-        <p:spPr/>
+            <p:ph type="title" idx="4294967295"/>
+          </p:nvPr>
+        </p:nvSpPr>
+        <p:spPr>
+          <a:xfrm>
+            <a:off x="1114425" y="263525"/>
+            <a:ext cx="8029575" cy="914400"/>
+          </a:xfrm>
+        </p:spPr>
         <p:txBody>
           <a:bodyPr>
             <a:normAutofit fontScale="90000"/>
@@ -9441,10 +11004,15 @@
             <a:spLocks noGrp="1"/>
           </p:cNvSpPr>
           <p:nvPr>
-            <p:ph idx="1"/>
-          </p:nvPr>
-        </p:nvSpPr>
-        <p:spPr/>
+            <p:ph idx="4294967295"/>
+          </p:nvPr>
+        </p:nvSpPr>
+        <p:spPr>
+          <a:xfrm>
+            <a:off x="1176338" y="1530350"/>
+            <a:ext cx="7967662" cy="4608513"/>
+          </a:xfrm>
+        </p:spPr>
         <p:txBody>
           <a:bodyPr>
             <a:normAutofit/>
@@ -9500,6 +11068,7 @@
   <p:clrMapOvr>
     <a:masterClrMapping/>
   </p:clrMapOvr>
+  <p:transition spd="med"/>
   <p:timing>
     <p:tnLst>
       <p:par>
@@ -9558,6 +11127,7 @@
   <p:clrMapOvr>
     <a:masterClrMapping/>
   </p:clrMapOvr>
+  <p:transition/>
   <p:timing>
     <p:tnLst>
       <p:par>
@@ -9601,7 +11171,7 @@
           <a:lstStyle/>
           <a:p>
             <a:r>
-              <a:rPr lang="en-US" dirty="0" smtClean="0"/>
+              <a:rPr lang="en-US" smtClean="0"/>
               <a:t>The Problem</a:t>
             </a:r>
             <a:endParaRPr lang="en-US" dirty="0"/>
@@ -9621,36 +11191,30 @@
         <p:spPr/>
         <p:txBody>
           <a:bodyPr>
-            <a:normAutofit fontScale="92500" lnSpcReduction="10000"/>
+            <a:normAutofit lnSpcReduction="10000"/>
           </a:bodyPr>
           <a:lstStyle/>
           <a:p>
             <a:r>
-              <a:rPr lang="en-US" dirty="0" smtClean="0"/>
+              <a:rPr lang="en-US" smtClean="0"/>
               <a:t>Developing applications that are able to orchestrate heterogeneous resources across distributed resources is a complex task.</a:t>
             </a:r>
           </a:p>
           <a:p>
-            <a:pPr>
-              <a:buNone/>
-            </a:pPr>
-            <a:endParaRPr lang="en-US" dirty="0" smtClean="0"/>
-          </a:p>
-          <a:p>
-            <a:r>
-              <a:rPr lang="en-US" dirty="0" smtClean="0"/>
+            <a:endParaRPr lang="en-US" smtClean="0"/>
+          </a:p>
+          <a:p>
+            <a:r>
+              <a:rPr lang="en-US" smtClean="0"/>
               <a:t>RE simulations involve a large number of loosely coupled ensembles.</a:t>
             </a:r>
           </a:p>
           <a:p>
-            <a:pPr>
-              <a:buNone/>
-            </a:pPr>
-            <a:endParaRPr lang="en-US" dirty="0" smtClean="0"/>
-          </a:p>
-          <a:p>
-            <a:r>
-              <a:rPr lang="en-US" dirty="0" smtClean="0"/>
+            <a:endParaRPr lang="en-US" smtClean="0"/>
+          </a:p>
+          <a:p>
+            <a:r>
+              <a:rPr lang="en-US" smtClean="0"/>
               <a:t>The challenge is to break the coupling between the development and the underlying infrastructure, to enable RE to be flexible (across infrastructure), extensible (to new methods of communication and coordination) and scalable.</a:t>
             </a:r>
             <a:endParaRPr lang="en-US" dirty="0"/>
@@ -9724,7 +11288,9 @@
         </p:nvSpPr>
         <p:spPr/>
         <p:txBody>
-          <a:bodyPr/>
+          <a:bodyPr>
+            <a:normAutofit/>
+          </a:bodyPr>
           <a:lstStyle/>
           <a:p>
             <a:r>
@@ -10018,7 +11584,7 @@
         <p:spPr/>
         <p:txBody>
           <a:bodyPr>
-            <a:normAutofit lnSpcReduction="10000"/>
+            <a:normAutofit/>
           </a:bodyPr>
           <a:lstStyle/>
           <a:p>
@@ -10124,7 +11690,7 @@
         <p:spPr/>
         <p:txBody>
           <a:bodyPr>
-            <a:normAutofit fontScale="77500" lnSpcReduction="20000"/>
+            <a:normAutofit fontScale="85000" lnSpcReduction="10000"/>
           </a:bodyPr>
           <a:lstStyle/>
           <a:p>
@@ -10244,12 +11810,7 @@
             <p:ph idx="1"/>
           </p:nvPr>
         </p:nvSpPr>
-        <p:spPr>
-          <a:xfrm>
-            <a:off x="457200" y="2109304"/>
-            <a:ext cx="8229600" cy="2046501"/>
-          </a:xfrm>
-        </p:spPr>
+        <p:spPr/>
         <p:txBody>
           <a:bodyPr>
             <a:noAutofit/>
@@ -10480,9 +12041,9 @@
 </file>
 
 <file path=ppt/theme/theme2.xml><?xml version="1.0" encoding="utf-8"?>
-<a:theme xmlns:a="http://schemas.openxmlformats.org/drawingml/2006/main" name="Office Theme">
+<a:theme xmlns:a="http://schemas.openxmlformats.org/drawingml/2006/main" name="1_Perspective">
   <a:themeElements>
-    <a:clrScheme name="Office">
+    <a:clrScheme name="Perspective">
       <a:dk1>
         <a:sysClr val="windowText" lastClr="000000"/>
       </a:dk1>
@@ -10490,159 +12051,70 @@
         <a:sysClr val="window" lastClr="FFFFFF"/>
       </a:lt1>
       <a:dk2>
-        <a:srgbClr val="1F497D"/>
+        <a:srgbClr val="333333"/>
       </a:dk2>
       <a:lt2>
-        <a:srgbClr val="EEECE1"/>
+        <a:srgbClr val="BBC0AC"/>
       </a:lt2>
       <a:accent1>
-        <a:srgbClr val="4F81BD"/>
+        <a:srgbClr val="A2C816"/>
       </a:accent1>
       <a:accent2>
-        <a:srgbClr val="C0504D"/>
+        <a:srgbClr val="E07602"/>
       </a:accent2>
       <a:accent3>
-        <a:srgbClr val="9BBB59"/>
+        <a:srgbClr val="E4C402"/>
       </a:accent3>
       <a:accent4>
-        <a:srgbClr val="8064A2"/>
+        <a:srgbClr val="7DC1EF"/>
       </a:accent4>
       <a:accent5>
-        <a:srgbClr val="4BACC6"/>
+        <a:srgbClr val="21449B"/>
       </a:accent5>
       <a:accent6>
-        <a:srgbClr val="F79646"/>
+        <a:srgbClr val="A2B170"/>
       </a:accent6>
       <a:hlink>
-        <a:srgbClr val="0000FF"/>
+        <a:srgbClr val="8DA440"/>
       </a:hlink>
       <a:folHlink>
-        <a:srgbClr val="800080"/>
+        <a:srgbClr val="4C4F3F"/>
       </a:folHlink>
     </a:clrScheme>
-    <a:fontScheme name="Office">
+    <a:fontScheme name="Perspective">
       <a:majorFont>
-        <a:latin typeface="Calibri"/>
+        <a:latin typeface="Century Gothic"/>
         <a:ea typeface=""/>
         <a:cs typeface=""/>
-        <a:font script="Jpan" typeface="ＭＳ Ｐゴシック"/>
-        <a:font script="Hang" typeface="맑은 고딕"/>
-        <a:font script="Hans" typeface="宋体"/>
-        <a:font script="Hant" typeface="新細明體"/>
-        <a:font script="Arab" typeface="Times New Roman"/>
-        <a:font script="Hebr" typeface="Times New Roman"/>
-        <a:font script="Thai" typeface="Angsana New"/>
-        <a:font script="Ethi" typeface="Nyala"/>
-        <a:font script="Beng" typeface="Vrinda"/>
-        <a:font script="Gujr" typeface="Shruti"/>
-        <a:font script="Khmr" typeface="MoolBoran"/>
-        <a:font script="Knda" typeface="Tunga"/>
-        <a:font script="Guru" typeface="Raavi"/>
-        <a:font script="Cans" typeface="Euphemia"/>
-        <a:font script="Cher" typeface="Plantagenet Cherokee"/>
-        <a:font script="Yiii" typeface="Microsoft Yi Baiti"/>
-        <a:font script="Tibt" typeface="Microsoft Himalaya"/>
-        <a:font script="Thaa" typeface="MV Boli"/>
-        <a:font script="Deva" typeface="Mangal"/>
-        <a:font script="Telu" typeface="Gautami"/>
-        <a:font script="Taml" typeface="Latha"/>
-        <a:font script="Syrc" typeface="Estrangelo Edessa"/>
-        <a:font script="Orya" typeface="Kalinga"/>
-        <a:font script="Mlym" typeface="Kartika"/>
-        <a:font script="Laoo" typeface="DokChampa"/>
-        <a:font script="Sinh" typeface="Iskoola Pota"/>
-        <a:font script="Mong" typeface="Mongolian Baiti"/>
-        <a:font script="Viet" typeface="Times New Roman"/>
-        <a:font script="Uigh" typeface="Microsoft Uighur"/>
+        <a:font script="Jpan" typeface="メイリオ"/>
       </a:majorFont>
       <a:minorFont>
-        <a:latin typeface="Calibri"/>
+        <a:latin typeface="Century Gothic"/>
         <a:ea typeface=""/>
         <a:cs typeface=""/>
-        <a:font script="Jpan" typeface="ＭＳ Ｐゴシック"/>
-        <a:font script="Hang" typeface="맑은 고딕"/>
-        <a:font script="Hans" typeface="宋体"/>
-        <a:font script="Hant" typeface="新細明體"/>
-        <a:font script="Arab" typeface="Arial"/>
-        <a:font script="Hebr" typeface="Arial"/>
-        <a:font script="Thai" typeface="Cordia New"/>
-        <a:font script="Ethi" typeface="Nyala"/>
-        <a:font script="Beng" typeface="Vrinda"/>
-        <a:font script="Gujr" typeface="Shruti"/>
-        <a:font script="Khmr" typeface="DaunPenh"/>
-        <a:font script="Knda" typeface="Tunga"/>
-        <a:font script="Guru" typeface="Raavi"/>
-        <a:font script="Cans" typeface="Euphemia"/>
-        <a:font script="Cher" typeface="Plantagenet Cherokee"/>
-        <a:font script="Yiii" typeface="Microsoft Yi Baiti"/>
-        <a:font script="Tibt" typeface="Microsoft Himalaya"/>
-        <a:font script="Thaa" typeface="MV Boli"/>
-        <a:font script="Deva" typeface="Mangal"/>
-        <a:font script="Telu" typeface="Gautami"/>
-        <a:font script="Taml" typeface="Latha"/>
-        <a:font script="Syrc" typeface="Estrangelo Edessa"/>
-        <a:font script="Orya" typeface="Kalinga"/>
-        <a:font script="Mlym" typeface="Kartika"/>
-        <a:font script="Laoo" typeface="DokChampa"/>
-        <a:font script="Sinh" typeface="Iskoola Pota"/>
-        <a:font script="Mong" typeface="Mongolian Baiti"/>
-        <a:font script="Viet" typeface="Arial"/>
-        <a:font script="Uigh" typeface="Microsoft Uighur"/>
+        <a:font script="Jpan" typeface="メイリオ"/>
       </a:minorFont>
     </a:fontScheme>
-    <a:fmtScheme name="Office">
+    <a:fmtScheme name="Perspective">
       <a:fillStyleLst>
         <a:solidFill>
           <a:schemeClr val="phClr"/>
         </a:solidFill>
-        <a:gradFill rotWithShape="1">
-          <a:gsLst>
-            <a:gs pos="0">
-              <a:schemeClr val="phClr">
-                <a:tint val="50000"/>
-                <a:satMod val="300000"/>
-              </a:schemeClr>
-            </a:gs>
-            <a:gs pos="35000">
-              <a:schemeClr val="phClr">
-                <a:tint val="37000"/>
-                <a:satMod val="300000"/>
-              </a:schemeClr>
-            </a:gs>
-            <a:gs pos="100000">
-              <a:schemeClr val="phClr">
-                <a:tint val="15000"/>
-                <a:satMod val="350000"/>
-              </a:schemeClr>
-            </a:gs>
-          </a:gsLst>
-          <a:lin ang="16200000" scaled="1"/>
-        </a:gradFill>
-        <a:gradFill rotWithShape="1">
-          <a:gsLst>
-            <a:gs pos="0">
-              <a:schemeClr val="phClr">
-                <a:tint val="100000"/>
-                <a:shade val="100000"/>
-                <a:satMod val="130000"/>
-              </a:schemeClr>
-            </a:gs>
-            <a:gs pos="100000">
-              <a:schemeClr val="phClr">
-                <a:tint val="50000"/>
-                <a:shade val="100000"/>
-                <a:satMod val="350000"/>
-              </a:schemeClr>
-            </a:gs>
-          </a:gsLst>
-          <a:lin ang="16200000" scaled="0"/>
-        </a:gradFill>
+        <a:solidFill>
+          <a:schemeClr val="phClr">
+            <a:shade val="90000"/>
+          </a:schemeClr>
+        </a:solidFill>
+        <a:solidFill>
+          <a:schemeClr val="phClr">
+            <a:shade val="80000"/>
+          </a:schemeClr>
+        </a:solidFill>
       </a:fillStyleLst>
       <a:lnStyleLst>
-        <a:ln w="9525" cap="flat" cmpd="sng" algn="ctr">
+        <a:ln w="12700" cap="flat" cmpd="sng" algn="ctr">
           <a:solidFill>
             <a:schemeClr val="phClr">
-              <a:shade val="95000"/>
               <a:satMod val="105000"/>
             </a:schemeClr>
           </a:solidFill>
@@ -10654,110 +12126,70 @@
           </a:solidFill>
           <a:prstDash val="solid"/>
         </a:ln>
-        <a:ln w="38100" cap="flat" cmpd="sng" algn="ctr">
+        <a:ln w="25400" cap="flat" cmpd="sng" algn="ctr">
           <a:solidFill>
-            <a:schemeClr val="phClr"/>
+            <a:schemeClr val="phClr">
+              <a:alpha val="80000"/>
+            </a:schemeClr>
           </a:solidFill>
           <a:prstDash val="solid"/>
         </a:ln>
       </a:lnStyleLst>
       <a:effectStyleLst>
         <a:effectStyle>
-          <a:effectLst>
-            <a:outerShdw blurRad="40000" dist="20000" dir="5400000" rotWithShape="0">
-              <a:srgbClr val="000000">
-                <a:alpha val="38000"/>
-              </a:srgbClr>
-            </a:outerShdw>
-          </a:effectLst>
+          <a:effectLst/>
         </a:effectStyle>
         <a:effectStyle>
-          <a:effectLst>
-            <a:outerShdw blurRad="40000" dist="23000" dir="5400000" rotWithShape="0">
-              <a:srgbClr val="000000">
-                <a:alpha val="35000"/>
-              </a:srgbClr>
-            </a:outerShdw>
-          </a:effectLst>
+          <a:effectLst/>
+          <a:scene3d>
+            <a:camera prst="obliqueTopRight"/>
+            <a:lightRig rig="threePt" dir="tl"/>
+          </a:scene3d>
+          <a:sp3d>
+            <a:bevelT w="25400" h="25400"/>
+          </a:sp3d>
         </a:effectStyle>
         <a:effectStyle>
-          <a:effectLst>
-            <a:outerShdw blurRad="40000" dist="23000" dir="5400000" rotWithShape="0">
-              <a:srgbClr val="000000">
-                <a:alpha val="35000"/>
-              </a:srgbClr>
-            </a:outerShdw>
-          </a:effectLst>
+          <a:effectLst/>
           <a:scene3d>
-            <a:camera prst="orthographicFront">
-              <a:rot lat="0" lon="0" rev="0"/>
-            </a:camera>
-            <a:lightRig rig="threePt" dir="t">
-              <a:rot lat="0" lon="0" rev="1200000"/>
+            <a:camera prst="perspectiveFront" fov="4200000"/>
+            <a:lightRig rig="balanced" dir="tl">
+              <a:rot lat="0" lon="0" rev="18600000"/>
             </a:lightRig>
           </a:scene3d>
-          <a:sp3d>
-            <a:bevelT w="63500" h="25400"/>
+          <a:sp3d prstMaterial="metal">
+            <a:bevelT w="63500" h="50800" prst="angle"/>
           </a:sp3d>
         </a:effectStyle>
       </a:effectStyleLst>
       <a:bgFillStyleLst>
         <a:solidFill>
-          <a:schemeClr val="phClr"/>
+          <a:schemeClr val="phClr">
+            <a:tint val="90000"/>
+          </a:schemeClr>
         </a:solidFill>
-        <a:gradFill rotWithShape="1">
-          <a:gsLst>
-            <a:gs pos="0">
-              <a:schemeClr val="phClr">
-                <a:tint val="40000"/>
-                <a:satMod val="350000"/>
-              </a:schemeClr>
-            </a:gs>
-            <a:gs pos="40000">
-              <a:schemeClr val="phClr">
-                <a:tint val="45000"/>
-                <a:shade val="99000"/>
-                <a:satMod val="350000"/>
-              </a:schemeClr>
-            </a:gs>
-            <a:gs pos="100000">
-              <a:schemeClr val="phClr">
-                <a:shade val="20000"/>
-                <a:satMod val="255000"/>
-              </a:schemeClr>
-            </a:gs>
-          </a:gsLst>
-          <a:path path="circle">
-            <a:fillToRect l="50000" t="-80000" r="50000" b="180000"/>
-          </a:path>
-        </a:gradFill>
-        <a:gradFill rotWithShape="1">
-          <a:gsLst>
-            <a:gs pos="0">
-              <a:schemeClr val="phClr">
-                <a:tint val="80000"/>
-                <a:satMod val="300000"/>
-              </a:schemeClr>
-            </a:gs>
-            <a:gs pos="100000">
-              <a:schemeClr val="phClr">
-                <a:shade val="30000"/>
-                <a:satMod val="200000"/>
-              </a:schemeClr>
-            </a:gs>
-          </a:gsLst>
-          <a:path path="circle">
-            <a:fillToRect l="50000" t="50000" r="50000" b="50000"/>
-          </a:path>
-        </a:gradFill>
+        <a:solidFill>
+          <a:schemeClr val="phClr">
+            <a:tint val="50000"/>
+          </a:schemeClr>
+        </a:solidFill>
+        <a:solidFill>
+          <a:schemeClr val="phClr">
+            <a:shade val="60000"/>
+          </a:schemeClr>
+        </a:solidFill>
       </a:bgFillStyleLst>
     </a:fmtScheme>
   </a:themeElements>
   <a:objectDefaults>
     <a:spDef>
       <a:spPr/>
-      <a:bodyPr/>
-      <a:lstStyle/>
+      <a:bodyPr rtlCol="0" anchor="ctr"/>
+      <a:lstStyle>
+        <a:defPPr algn="ctr">
+          <a:defRPr/>
+        </a:defPPr>
+      </a:lstStyle>
       <a:style>
         <a:lnRef idx="1">
           <a:schemeClr val="accent1"/>
@@ -11113,4 +12545,322 @@
   </a:objectDefaults>
   <a:extraClrSchemeLst/>
 </a:theme>
+</file>
+
+<file path=ppt/theme/theme4.xml><?xml version="1.0" encoding="utf-8"?>
+<a:theme xmlns:a="http://schemas.openxmlformats.org/drawingml/2006/main" name="Office Theme">
+  <a:themeElements>
+    <a:clrScheme name="Office">
+      <a:dk1>
+        <a:sysClr val="windowText" lastClr="000000"/>
+      </a:dk1>
+      <a:lt1>
+        <a:sysClr val="window" lastClr="FFFFFF"/>
+      </a:lt1>
+      <a:dk2>
+        <a:srgbClr val="1F497D"/>
+      </a:dk2>
+      <a:lt2>
+        <a:srgbClr val="EEECE1"/>
+      </a:lt2>
+      <a:accent1>
+        <a:srgbClr val="4F81BD"/>
+      </a:accent1>
+      <a:accent2>
+        <a:srgbClr val="C0504D"/>
+      </a:accent2>
+      <a:accent3>
+        <a:srgbClr val="9BBB59"/>
+      </a:accent3>
+      <a:accent4>
+        <a:srgbClr val="8064A2"/>
+      </a:accent4>
+      <a:accent5>
+        <a:srgbClr val="4BACC6"/>
+      </a:accent5>
+      <a:accent6>
+        <a:srgbClr val="F79646"/>
+      </a:accent6>
+      <a:hlink>
+        <a:srgbClr val="0000FF"/>
+      </a:hlink>
+      <a:folHlink>
+        <a:srgbClr val="800080"/>
+      </a:folHlink>
+    </a:clrScheme>
+    <a:fontScheme name="Office">
+      <a:majorFont>
+        <a:latin typeface="Calibri"/>
+        <a:ea typeface=""/>
+        <a:cs typeface=""/>
+        <a:font script="Jpan" typeface="ＭＳ Ｐゴシック"/>
+        <a:font script="Hang" typeface="맑은 고딕"/>
+        <a:font script="Hans" typeface="宋体"/>
+        <a:font script="Hant" typeface="新細明體"/>
+        <a:font script="Arab" typeface="Times New Roman"/>
+        <a:font script="Hebr" typeface="Times New Roman"/>
+        <a:font script="Thai" typeface="Angsana New"/>
+        <a:font script="Ethi" typeface="Nyala"/>
+        <a:font script="Beng" typeface="Vrinda"/>
+        <a:font script="Gujr" typeface="Shruti"/>
+        <a:font script="Khmr" typeface="MoolBoran"/>
+        <a:font script="Knda" typeface="Tunga"/>
+        <a:font script="Guru" typeface="Raavi"/>
+        <a:font script="Cans" typeface="Euphemia"/>
+        <a:font script="Cher" typeface="Plantagenet Cherokee"/>
+        <a:font script="Yiii" typeface="Microsoft Yi Baiti"/>
+        <a:font script="Tibt" typeface="Microsoft Himalaya"/>
+        <a:font script="Thaa" typeface="MV Boli"/>
+        <a:font script="Deva" typeface="Mangal"/>
+        <a:font script="Telu" typeface="Gautami"/>
+        <a:font script="Taml" typeface="Latha"/>
+        <a:font script="Syrc" typeface="Estrangelo Edessa"/>
+        <a:font script="Orya" typeface="Kalinga"/>
+        <a:font script="Mlym" typeface="Kartika"/>
+        <a:font script="Laoo" typeface="DokChampa"/>
+        <a:font script="Sinh" typeface="Iskoola Pota"/>
+        <a:font script="Mong" typeface="Mongolian Baiti"/>
+        <a:font script="Viet" typeface="Times New Roman"/>
+        <a:font script="Uigh" typeface="Microsoft Uighur"/>
+      </a:majorFont>
+      <a:minorFont>
+        <a:latin typeface="Calibri"/>
+        <a:ea typeface=""/>
+        <a:cs typeface=""/>
+        <a:font script="Jpan" typeface="ＭＳ Ｐゴシック"/>
+        <a:font script="Hang" typeface="맑은 고딕"/>
+        <a:font script="Hans" typeface="宋体"/>
+        <a:font script="Hant" typeface="新細明體"/>
+        <a:font script="Arab" typeface="Arial"/>
+        <a:font script="Hebr" typeface="Arial"/>
+        <a:font script="Thai" typeface="Cordia New"/>
+        <a:font script="Ethi" typeface="Nyala"/>
+        <a:font script="Beng" typeface="Vrinda"/>
+        <a:font script="Gujr" typeface="Shruti"/>
+        <a:font script="Khmr" typeface="DaunPenh"/>
+        <a:font script="Knda" typeface="Tunga"/>
+        <a:font script="Guru" typeface="Raavi"/>
+        <a:font script="Cans" typeface="Euphemia"/>
+        <a:font script="Cher" typeface="Plantagenet Cherokee"/>
+        <a:font script="Yiii" typeface="Microsoft Yi Baiti"/>
+        <a:font script="Tibt" typeface="Microsoft Himalaya"/>
+        <a:font script="Thaa" typeface="MV Boli"/>
+        <a:font script="Deva" typeface="Mangal"/>
+        <a:font script="Telu" typeface="Gautami"/>
+        <a:font script="Taml" typeface="Latha"/>
+        <a:font script="Syrc" typeface="Estrangelo Edessa"/>
+        <a:font script="Orya" typeface="Kalinga"/>
+        <a:font script="Mlym" typeface="Kartika"/>
+        <a:font script="Laoo" typeface="DokChampa"/>
+        <a:font script="Sinh" typeface="Iskoola Pota"/>
+        <a:font script="Mong" typeface="Mongolian Baiti"/>
+        <a:font script="Viet" typeface="Arial"/>
+        <a:font script="Uigh" typeface="Microsoft Uighur"/>
+      </a:minorFont>
+    </a:fontScheme>
+    <a:fmtScheme name="Office">
+      <a:fillStyleLst>
+        <a:solidFill>
+          <a:schemeClr val="phClr"/>
+        </a:solidFill>
+        <a:gradFill rotWithShape="1">
+          <a:gsLst>
+            <a:gs pos="0">
+              <a:schemeClr val="phClr">
+                <a:tint val="50000"/>
+                <a:satMod val="300000"/>
+              </a:schemeClr>
+            </a:gs>
+            <a:gs pos="35000">
+              <a:schemeClr val="phClr">
+                <a:tint val="37000"/>
+                <a:satMod val="300000"/>
+              </a:schemeClr>
+            </a:gs>
+            <a:gs pos="100000">
+              <a:schemeClr val="phClr">
+                <a:tint val="15000"/>
+                <a:satMod val="350000"/>
+              </a:schemeClr>
+            </a:gs>
+          </a:gsLst>
+          <a:lin ang="16200000" scaled="1"/>
+        </a:gradFill>
+        <a:gradFill rotWithShape="1">
+          <a:gsLst>
+            <a:gs pos="0">
+              <a:schemeClr val="phClr">
+                <a:tint val="100000"/>
+                <a:shade val="100000"/>
+                <a:satMod val="130000"/>
+              </a:schemeClr>
+            </a:gs>
+            <a:gs pos="100000">
+              <a:schemeClr val="phClr">
+                <a:tint val="50000"/>
+                <a:shade val="100000"/>
+                <a:satMod val="350000"/>
+              </a:schemeClr>
+            </a:gs>
+          </a:gsLst>
+          <a:lin ang="16200000" scaled="0"/>
+        </a:gradFill>
+      </a:fillStyleLst>
+      <a:lnStyleLst>
+        <a:ln w="9525" cap="flat" cmpd="sng" algn="ctr">
+          <a:solidFill>
+            <a:schemeClr val="phClr">
+              <a:shade val="95000"/>
+              <a:satMod val="105000"/>
+            </a:schemeClr>
+          </a:solidFill>
+          <a:prstDash val="solid"/>
+        </a:ln>
+        <a:ln w="25400" cap="flat" cmpd="sng" algn="ctr">
+          <a:solidFill>
+            <a:schemeClr val="phClr"/>
+          </a:solidFill>
+          <a:prstDash val="solid"/>
+        </a:ln>
+        <a:ln w="38100" cap="flat" cmpd="sng" algn="ctr">
+          <a:solidFill>
+            <a:schemeClr val="phClr"/>
+          </a:solidFill>
+          <a:prstDash val="solid"/>
+        </a:ln>
+      </a:lnStyleLst>
+      <a:effectStyleLst>
+        <a:effectStyle>
+          <a:effectLst>
+            <a:outerShdw blurRad="40000" dist="20000" dir="5400000" rotWithShape="0">
+              <a:srgbClr val="000000">
+                <a:alpha val="38000"/>
+              </a:srgbClr>
+            </a:outerShdw>
+          </a:effectLst>
+        </a:effectStyle>
+        <a:effectStyle>
+          <a:effectLst>
+            <a:outerShdw blurRad="40000" dist="23000" dir="5400000" rotWithShape="0">
+              <a:srgbClr val="000000">
+                <a:alpha val="35000"/>
+              </a:srgbClr>
+            </a:outerShdw>
+          </a:effectLst>
+        </a:effectStyle>
+        <a:effectStyle>
+          <a:effectLst>
+            <a:outerShdw blurRad="40000" dist="23000" dir="5400000" rotWithShape="0">
+              <a:srgbClr val="000000">
+                <a:alpha val="35000"/>
+              </a:srgbClr>
+            </a:outerShdw>
+          </a:effectLst>
+          <a:scene3d>
+            <a:camera prst="orthographicFront">
+              <a:rot lat="0" lon="0" rev="0"/>
+            </a:camera>
+            <a:lightRig rig="threePt" dir="t">
+              <a:rot lat="0" lon="0" rev="1200000"/>
+            </a:lightRig>
+          </a:scene3d>
+          <a:sp3d>
+            <a:bevelT w="63500" h="25400"/>
+          </a:sp3d>
+        </a:effectStyle>
+      </a:effectStyleLst>
+      <a:bgFillStyleLst>
+        <a:solidFill>
+          <a:schemeClr val="phClr"/>
+        </a:solidFill>
+        <a:gradFill rotWithShape="1">
+          <a:gsLst>
+            <a:gs pos="0">
+              <a:schemeClr val="phClr">
+                <a:tint val="40000"/>
+                <a:satMod val="350000"/>
+              </a:schemeClr>
+            </a:gs>
+            <a:gs pos="40000">
+              <a:schemeClr val="phClr">
+                <a:tint val="45000"/>
+                <a:shade val="99000"/>
+                <a:satMod val="350000"/>
+              </a:schemeClr>
+            </a:gs>
+            <a:gs pos="100000">
+              <a:schemeClr val="phClr">
+                <a:shade val="20000"/>
+                <a:satMod val="255000"/>
+              </a:schemeClr>
+            </a:gs>
+          </a:gsLst>
+          <a:path path="circle">
+            <a:fillToRect l="50000" t="-80000" r="50000" b="180000"/>
+          </a:path>
+        </a:gradFill>
+        <a:gradFill rotWithShape="1">
+          <a:gsLst>
+            <a:gs pos="0">
+              <a:schemeClr val="phClr">
+                <a:tint val="80000"/>
+                <a:satMod val="300000"/>
+              </a:schemeClr>
+            </a:gs>
+            <a:gs pos="100000">
+              <a:schemeClr val="phClr">
+                <a:shade val="30000"/>
+                <a:satMod val="200000"/>
+              </a:schemeClr>
+            </a:gs>
+          </a:gsLst>
+          <a:path path="circle">
+            <a:fillToRect l="50000" t="50000" r="50000" b="50000"/>
+          </a:path>
+        </a:gradFill>
+      </a:bgFillStyleLst>
+    </a:fmtScheme>
+  </a:themeElements>
+  <a:objectDefaults>
+    <a:spDef>
+      <a:spPr/>
+      <a:bodyPr/>
+      <a:lstStyle/>
+      <a:style>
+        <a:lnRef idx="1">
+          <a:schemeClr val="accent1"/>
+        </a:lnRef>
+        <a:fillRef idx="3">
+          <a:schemeClr val="accent1"/>
+        </a:fillRef>
+        <a:effectRef idx="2">
+          <a:schemeClr val="accent1"/>
+        </a:effectRef>
+        <a:fontRef idx="minor">
+          <a:schemeClr val="lt1"/>
+        </a:fontRef>
+      </a:style>
+    </a:spDef>
+    <a:lnDef>
+      <a:spPr/>
+      <a:bodyPr/>
+      <a:lstStyle/>
+      <a:style>
+        <a:lnRef idx="2">
+          <a:schemeClr val="accent1"/>
+        </a:lnRef>
+        <a:fillRef idx="0">
+          <a:schemeClr val="accent1"/>
+        </a:fillRef>
+        <a:effectRef idx="1">
+          <a:schemeClr val="accent1"/>
+        </a:effectRef>
+        <a:fontRef idx="minor">
+          <a:schemeClr val="tx1"/>
+        </a:fontRef>
+      </a:style>
+    </a:lnDef>
+  </a:objectDefaults>
+  <a:extraClrSchemeLst/>
+</a:theme>
 </file>
</xml_diff>

<commit_message>
updates to the RE.ppt graphs
git-svn-id: file://localhost/tmp/svn2git/svn@3139 defb5e50-622e-49ec-a68e-d72c7db87b45
</commit_message>
<xml_diff>
--- a/papers/async-re/data/RE.pptx
+++ b/papers/async-re/data/RE.pptx
@@ -6,10 +6,10 @@
     <p:sldMasterId id="2147483677" r:id="rId2"/>
   </p:sldMasterIdLst>
   <p:notesMasterIdLst>
-    <p:notesMasterId r:id="rId26"/>
+    <p:notesMasterId r:id="rId25"/>
   </p:notesMasterIdLst>
   <p:handoutMasterIdLst>
-    <p:handoutMasterId r:id="rId27"/>
+    <p:handoutMasterId r:id="rId26"/>
   </p:handoutMasterIdLst>
   <p:sldIdLst>
     <p:sldId id="256" r:id="rId3"/>
@@ -32,9 +32,8 @@
     <p:sldId id="277" r:id="rId20"/>
     <p:sldId id="285" r:id="rId21"/>
     <p:sldId id="279" r:id="rId22"/>
-    <p:sldId id="280" r:id="rId23"/>
-    <p:sldId id="281" r:id="rId24"/>
-    <p:sldId id="282" r:id="rId25"/>
+    <p:sldId id="281" r:id="rId23"/>
+    <p:sldId id="282" r:id="rId24"/>
   </p:sldIdLst>
   <p:sldSz cx="9144000" cy="6858000" type="screen4x3"/>
   <p:notesSz cx="6858000" cy="9144000"/>
@@ -142,24 +141,6 @@
   <c:lang val="en-US"/>
   <c:style val="1"/>
   <c:chart>
-    <c:title>
-      <c:tx>
-        <c:rich>
-          <a:bodyPr/>
-          <a:lstStyle/>
-          <a:p>
-            <a:pPr>
-              <a:defRPr/>
-            </a:pPr>
-            <a:r>
-              <a:rPr lang="en-US"/>
-              <a:t>Performance of different RE models locally on LONI/Teragrid resource QueenBee</a:t>
-            </a:r>
-          </a:p>
-        </c:rich>
-      </c:tx>
-      <c:layout/>
-    </c:title>
     <c:plotArea>
       <c:layout/>
       <c:lineChart>
@@ -230,35 +211,40 @@
             </c:minus>
           </c:errBars>
           <c:cat>
-            <c:numRef>
-              <c:f>'Andre Rework'!$B$2:$F$2</c:f>
-              <c:numCache>
-                <c:formatCode>0</c:formatCode>
-                <c:ptCount val="5"/>
+            <c:strRef>
+              <c:f>'Andre Rework'!$B$2:$H$2</c:f>
+              <c:strCache>
+                <c:ptCount val="7"/>
                 <c:pt idx="0">
-                  <c:v>4.0</c:v>
+                  <c:v>4(16)</c:v>
                 </c:pt>
                 <c:pt idx="1">
-                  <c:v>8.0</c:v>
+                  <c:v>8(32)</c:v>
                 </c:pt>
                 <c:pt idx="2">
-                  <c:v>16.0</c:v>
+                  <c:v>16(64)</c:v>
                 </c:pt>
                 <c:pt idx="3">
-                  <c:v>32.0</c:v>
+                  <c:v>32(128)</c:v>
                 </c:pt>
                 <c:pt idx="4">
-                  <c:v>64.0</c:v>
+                  <c:v>64(256)</c:v>
                 </c:pt>
-              </c:numCache>
-            </c:numRef>
+                <c:pt idx="5">
+                  <c:v>128(512)</c:v>
+                </c:pt>
+                <c:pt idx="6">
+                  <c:v>256(1024)</c:v>
+                </c:pt>
+              </c:strCache>
+            </c:strRef>
           </c:cat>
           <c:val>
             <c:numRef>
-              <c:f>'Andre Rework'!$B$3:$F$3</c:f>
+              <c:f>'Andre Rework'!$B$3:$H$3</c:f>
               <c:numCache>
                 <c:formatCode>General</c:formatCode>
-                <c:ptCount val="5"/>
+                <c:ptCount val="7"/>
                 <c:pt idx="0">
                   <c:v>624.0</c:v>
                 </c:pt>
@@ -272,7 +258,13 @@
                   <c:v>1023.0</c:v>
                 </c:pt>
                 <c:pt idx="4">
-                  <c:v>1432.0</c:v>
+                  <c:v>1350.0</c:v>
+                </c:pt>
+                <c:pt idx="5">
+                  <c:v>2100.0</c:v>
+                </c:pt>
+                <c:pt idx="6">
+                  <c:v>3200.0</c:v>
                 </c:pt>
               </c:numCache>
             </c:numRef>
@@ -340,35 +332,40 @@
             </c:minus>
           </c:errBars>
           <c:cat>
-            <c:numRef>
-              <c:f>'Andre Rework'!$B$2:$F$2</c:f>
-              <c:numCache>
-                <c:formatCode>0</c:formatCode>
-                <c:ptCount val="5"/>
+            <c:strRef>
+              <c:f>'Andre Rework'!$B$2:$H$2</c:f>
+              <c:strCache>
+                <c:ptCount val="7"/>
                 <c:pt idx="0">
-                  <c:v>4.0</c:v>
+                  <c:v>4(16)</c:v>
                 </c:pt>
                 <c:pt idx="1">
-                  <c:v>8.0</c:v>
+                  <c:v>8(32)</c:v>
                 </c:pt>
                 <c:pt idx="2">
-                  <c:v>16.0</c:v>
+                  <c:v>16(64)</c:v>
                 </c:pt>
                 <c:pt idx="3">
-                  <c:v>32.0</c:v>
+                  <c:v>32(128)</c:v>
                 </c:pt>
                 <c:pt idx="4">
-                  <c:v>64.0</c:v>
+                  <c:v>64(256)</c:v>
                 </c:pt>
-              </c:numCache>
-            </c:numRef>
+                <c:pt idx="5">
+                  <c:v>128(512)</c:v>
+                </c:pt>
+                <c:pt idx="6">
+                  <c:v>256(1024)</c:v>
+                </c:pt>
+              </c:strCache>
+            </c:strRef>
           </c:cat>
           <c:val>
             <c:numRef>
-              <c:f>'Andre Rework'!$B$4:$F$4</c:f>
+              <c:f>'Andre Rework'!$B$4:$H$4</c:f>
               <c:numCache>
                 <c:formatCode>General</c:formatCode>
-                <c:ptCount val="5"/>
+                <c:ptCount val="7"/>
                 <c:pt idx="0">
                   <c:v>628.6</c:v>
                 </c:pt>
@@ -376,13 +373,19 @@
                   <c:v>630.0</c:v>
                 </c:pt>
                 <c:pt idx="2">
-                  <c:v>701.8299999999995</c:v>
+                  <c:v>701.83</c:v>
                 </c:pt>
                 <c:pt idx="3">
                   <c:v>804.0</c:v>
                 </c:pt>
                 <c:pt idx="4">
-                  <c:v>1014.0</c:v>
+                  <c:v>1097.0</c:v>
+                </c:pt>
+                <c:pt idx="5">
+                  <c:v>1393.0</c:v>
+                </c:pt>
+                <c:pt idx="6">
+                  <c:v>1800.0</c:v>
                 </c:pt>
               </c:numCache>
             </c:numRef>
@@ -450,35 +453,40 @@
             </c:minus>
           </c:errBars>
           <c:cat>
-            <c:numRef>
-              <c:f>'Andre Rework'!$B$2:$F$2</c:f>
-              <c:numCache>
-                <c:formatCode>0</c:formatCode>
-                <c:ptCount val="5"/>
+            <c:strRef>
+              <c:f>'Andre Rework'!$B$2:$H$2</c:f>
+              <c:strCache>
+                <c:ptCount val="7"/>
                 <c:pt idx="0">
-                  <c:v>4.0</c:v>
+                  <c:v>4(16)</c:v>
                 </c:pt>
                 <c:pt idx="1">
-                  <c:v>8.0</c:v>
+                  <c:v>8(32)</c:v>
                 </c:pt>
                 <c:pt idx="2">
-                  <c:v>16.0</c:v>
+                  <c:v>16(64)</c:v>
                 </c:pt>
                 <c:pt idx="3">
-                  <c:v>32.0</c:v>
+                  <c:v>32(128)</c:v>
                 </c:pt>
                 <c:pt idx="4">
-                  <c:v>64.0</c:v>
+                  <c:v>64(256)</c:v>
                 </c:pt>
-              </c:numCache>
-            </c:numRef>
+                <c:pt idx="5">
+                  <c:v>128(512)</c:v>
+                </c:pt>
+                <c:pt idx="6">
+                  <c:v>256(1024)</c:v>
+                </c:pt>
+              </c:strCache>
+            </c:strRef>
           </c:cat>
           <c:val>
             <c:numRef>
-              <c:f>'Andre Rework'!$B$5:$F$5</c:f>
+              <c:f>'Andre Rework'!$B$5:$H$5</c:f>
               <c:numCache>
                 <c:formatCode>General</c:formatCode>
-                <c:ptCount val="5"/>
+                <c:ptCount val="7"/>
                 <c:pt idx="0">
                   <c:v>588.9</c:v>
                 </c:pt>
@@ -486,24 +494,30 @@
                   <c:v>609.0</c:v>
                 </c:pt>
                 <c:pt idx="2">
-                  <c:v>583.3299999999995</c:v>
+                  <c:v>583.33</c:v>
                 </c:pt>
                 <c:pt idx="3">
                   <c:v>641.0</c:v>
                 </c:pt>
                 <c:pt idx="4">
-                  <c:v>650.0</c:v>
+                  <c:v>660.0</c:v>
+                </c:pt>
+                <c:pt idx="5">
+                  <c:v>717.0</c:v>
+                </c:pt>
+                <c:pt idx="6">
+                  <c:v>792.0</c:v>
                 </c:pt>
               </c:numCache>
             </c:numRef>
           </c:val>
         </c:ser>
         <c:marker val="1"/>
-        <c:axId val="552184392"/>
-        <c:axId val="685375528"/>
+        <c:axId val="603564840"/>
+        <c:axId val="603615096"/>
       </c:lineChart>
       <c:catAx>
-        <c:axId val="552184392"/>
+        <c:axId val="603564840"/>
         <c:scaling>
           <c:orientation val="minMax"/>
         </c:scaling>
@@ -518,9 +532,22 @@
                   <a:defRPr lang="de-DE" sz="1400"/>
                 </a:pPr>
                 <a:r>
-                  <a:rPr lang="de-DE" sz="1400"/>
-                  <a:t>Number of Replicas</a:t>
+                  <a:rPr lang="de-DE" sz="1400" dirty="0" err="1"/>
+                  <a:t>Number</a:t>
                 </a:r>
+                <a:r>
+                  <a:rPr lang="de-DE" sz="1400" dirty="0"/>
+                  <a:t> of </a:t>
+                </a:r>
+                <a:r>
+                  <a:rPr lang="de-DE" sz="1400" dirty="0" err="1" smtClean="0"/>
+                  <a:t>Replicas(Number</a:t>
+                </a:r>
+                <a:r>
+                  <a:rPr lang="de-DE" sz="1400" dirty="0" smtClean="0"/>
+                  <a:t> of Exchanges)</a:t>
+                </a:r>
+                <a:endParaRPr lang="de-DE" sz="1400" dirty="0"/>
               </a:p>
             </c:rich>
           </c:tx>
@@ -538,20 +565,18 @@
             <a:endParaRPr lang="en-US"/>
           </a:p>
         </c:txPr>
-        <c:crossAx val="685375528"/>
+        <c:crossAx val="603615096"/>
         <c:crosses val="autoZero"/>
         <c:auto val="1"/>
         <c:lblAlgn val="ctr"/>
         <c:lblOffset val="100"/>
       </c:catAx>
       <c:valAx>
-        <c:axId val="685375528"/>
+        <c:axId val="603615096"/>
         <c:scaling>
           <c:orientation val="minMax"/>
-          <c:min val="400.0"/>
         </c:scaling>
         <c:axPos val="l"/>
-        <c:majorGridlines/>
         <c:title>
           <c:tx>
             <c:rich>
@@ -582,10 +607,9 @@
             <a:endParaRPr lang="en-US"/>
           </a:p>
         </c:txPr>
-        <c:crossAx val="552184392"/>
+        <c:crossAx val="603564840"/>
         <c:crosses val="autoZero"/>
         <c:crossBetween val="between"/>
-        <c:majorUnit val="100.0"/>
       </c:valAx>
     </c:plotArea>
     <c:legend>
@@ -614,84 +638,64 @@
   <c:lang val="en-US"/>
   <c:style val="1"/>
   <c:chart>
-    <c:title>
-      <c:tx>
-        <c:rich>
-          <a:bodyPr/>
-          <a:lstStyle/>
-          <a:p>
-            <a:pPr>
-              <a:defRPr/>
-            </a:pPr>
-            <a:r>
-              <a:rPr lang="en-US"/>
-              <a:t>Results (distributed over Teragrid resources Ranger and QueenBee) </a:t>
-            </a:r>
-          </a:p>
-        </c:rich>
-      </c:tx>
-      <c:layout/>
-    </c:title>
     <c:plotArea>
       <c:layout/>
-      <c:barChart>
-        <c:barDir val="col"/>
-        <c:grouping val="clustered"/>
+      <c:lineChart>
+        <c:grouping val="standard"/>
         <c:ser>
           <c:idx val="0"/>
           <c:order val="0"/>
           <c:tx>
             <c:strRef>
-              <c:f>Sheet1!$A$36</c:f>
+              <c:f>'Andre Rework'!$A$87</c:f>
               <c:strCache>
                 <c:ptCount val="1"/>
                 <c:pt idx="0">
-                  <c:v>Synchronous</c:v>
+                  <c:v>Synchronous </c:v>
                 </c:pt>
               </c:strCache>
             </c:strRef>
           </c:tx>
+          <c:marker>
+            <c:symbol val="diamond"/>
+            <c:size val="7"/>
+          </c:marker>
           <c:errBars>
+            <c:errDir val="y"/>
             <c:errBarType val="both"/>
             <c:errValType val="cust"/>
             <c:plus>
               <c:numRef>
-                <c:f>(Sheet1!$C$36,Sheet1!$E$36,Sheet1!$G$36,Sheet1!$I$36)</c:f>
+                <c:f>'Andre Rework'!$B$91:$D$91</c:f>
                 <c:numCache>
                   <c:formatCode>General</c:formatCode>
-                  <c:ptCount val="4"/>
+                  <c:ptCount val="3"/>
                   <c:pt idx="0">
-                    <c:v>108.8993296581756</c:v>
+                    <c:v>8.81</c:v>
                   </c:pt>
                   <c:pt idx="1">
-                    <c:v>48.6</c:v>
+                    <c:v>10.05</c:v>
                   </c:pt>
                   <c:pt idx="2">
-                    <c:v>8.81</c:v>
-                  </c:pt>
-                  <c:pt idx="3">
-                    <c:v>11.2</c:v>
+                    <c:v>14.5</c:v>
                   </c:pt>
                 </c:numCache>
               </c:numRef>
             </c:plus>
             <c:minus>
               <c:numRef>
-                <c:f>(Sheet1!$C$36,Sheet1!$E$36,Sheet1!$G$36,Sheet1!$I$36)</c:f>
+                <c:f>'Andre Rework'!$B$91:$D$91</c:f>
                 <c:numCache>
                   <c:formatCode>General</c:formatCode>
-                  <c:ptCount val="4"/>
+                  <c:ptCount val="3"/>
                   <c:pt idx="0">
-                    <c:v>108.8993296581756</c:v>
+                    <c:v>8.81</c:v>
                   </c:pt>
                   <c:pt idx="1">
-                    <c:v>48.6</c:v>
+                    <c:v>10.05</c:v>
                   </c:pt>
                   <c:pt idx="2">
-                    <c:v>8.81</c:v>
-                  </c:pt>
-                  <c:pt idx="3">
-                    <c:v>11.2</c:v>
+                    <c:v>14.5</c:v>
                   </c:pt>
                 </c:numCache>
               </c:numRef>
@@ -699,41 +703,35 @@
           </c:errBars>
           <c:cat>
             <c:strRef>
-              <c:f>(Sheet1!$B$35,Sheet1!$D$35,Sheet1!$F$35,Sheet1!$H$35)</c:f>
+              <c:f>'Andre Rework'!$B$86:$D$86</c:f>
               <c:strCache>
-                <c:ptCount val="4"/>
+                <c:ptCount val="3"/>
                 <c:pt idx="0">
-                  <c:v>1A. 32 ex, 2 machines</c:v>
+                  <c:v>4(1)</c:v>
                 </c:pt>
                 <c:pt idx="1">
-                  <c:v>1B. 16 ex, 2 machines</c:v>
+                  <c:v>8(2)</c:v>
                 </c:pt>
                 <c:pt idx="2">
-                  <c:v>2. 16 ex, 1 machine</c:v>
-                </c:pt>
-                <c:pt idx="3">
-                  <c:v>3. 32 ex, 1 machine</c:v>
+                  <c:v>16(4)</c:v>
                 </c:pt>
               </c:strCache>
             </c:strRef>
           </c:cat>
           <c:val>
             <c:numRef>
-              <c:f>(Sheet1!$B$36,Sheet1!$D$36,Sheet1!$F$36,Sheet1!$H$36)</c:f>
+              <c:f>'Andre Rework'!$B$87:$D$87</c:f>
               <c:numCache>
                 <c:formatCode>General</c:formatCode>
-                <c:ptCount val="4"/>
+                <c:ptCount val="3"/>
                 <c:pt idx="0">
-                  <c:v>1182.6</c:v>
+                  <c:v>624.0</c:v>
                 </c:pt>
                 <c:pt idx="1">
-                  <c:v>576.3</c:v>
+                  <c:v>805.0</c:v>
                 </c:pt>
                 <c:pt idx="2">
-                  <c:v>624.0</c:v>
-                </c:pt>
-                <c:pt idx="3">
-                  <c:v>685.0</c:v>
+                  <c:v>1179.8</c:v>
                 </c:pt>
               </c:numCache>
             </c:numRef>
@@ -744,7 +742,7 @@
           <c:order val="1"/>
           <c:tx>
             <c:strRef>
-              <c:f>Sheet1!$A$37</c:f>
+              <c:f>'Andre Rework'!$A$88</c:f>
               <c:strCache>
                 <c:ptCount val="1"/>
                 <c:pt idx="0">
@@ -754,46 +752,41 @@
             </c:strRef>
           </c:tx>
           <c:errBars>
+            <c:errDir val="y"/>
             <c:errBarType val="both"/>
             <c:errValType val="cust"/>
             <c:plus>
               <c:numRef>
-                <c:f>(Sheet1!$C$37,Sheet1!$E$37,Sheet1!$G$37,Sheet1!$I$37)</c:f>
+                <c:f>'Andre Rework'!$B$92:$D$92</c:f>
                 <c:numCache>
                   <c:formatCode>General</c:formatCode>
-                  <c:ptCount val="4"/>
+                  <c:ptCount val="3"/>
                   <c:pt idx="0">
-                    <c:v>96.030916486808</c:v>
+                    <c:v>11.1</c:v>
                   </c:pt>
                   <c:pt idx="1">
-                    <c:v>39.2</c:v>
+                    <c:v>5.57</c:v>
                   </c:pt>
                   <c:pt idx="2">
-                    <c:v>11.1</c:v>
-                  </c:pt>
-                  <c:pt idx="3">
-                    <c:v>3.23</c:v>
+                    <c:v>7.11</c:v>
                   </c:pt>
                 </c:numCache>
               </c:numRef>
             </c:plus>
             <c:minus>
               <c:numRef>
-                <c:f>(Sheet1!$C$37,Sheet1!$E$37,Sheet1!$G$37,Sheet1!$I$37)</c:f>
+                <c:f>'Andre Rework'!$B$92:$D$92</c:f>
                 <c:numCache>
                   <c:formatCode>General</c:formatCode>
-                  <c:ptCount val="4"/>
+                  <c:ptCount val="3"/>
                   <c:pt idx="0">
-                    <c:v>96.030916486808</c:v>
+                    <c:v>11.1</c:v>
                   </c:pt>
                   <c:pt idx="1">
-                    <c:v>39.2</c:v>
+                    <c:v>5.57</c:v>
                   </c:pt>
                   <c:pt idx="2">
-                    <c:v>11.1</c:v>
-                  </c:pt>
-                  <c:pt idx="3">
-                    <c:v>3.23</c:v>
+                    <c:v>7.11</c:v>
                   </c:pt>
                 </c:numCache>
               </c:numRef>
@@ -801,41 +794,35 @@
           </c:errBars>
           <c:cat>
             <c:strRef>
-              <c:f>(Sheet1!$B$35,Sheet1!$D$35,Sheet1!$F$35,Sheet1!$H$35)</c:f>
+              <c:f>'Andre Rework'!$B$86:$D$86</c:f>
               <c:strCache>
-                <c:ptCount val="4"/>
+                <c:ptCount val="3"/>
                 <c:pt idx="0">
-                  <c:v>1A. 32 ex, 2 machines</c:v>
+                  <c:v>4(1)</c:v>
                 </c:pt>
                 <c:pt idx="1">
-                  <c:v>1B. 16 ex, 2 machines</c:v>
+                  <c:v>8(2)</c:v>
                 </c:pt>
                 <c:pt idx="2">
-                  <c:v>2. 16 ex, 1 machine</c:v>
-                </c:pt>
-                <c:pt idx="3">
-                  <c:v>3. 32 ex, 1 machine</c:v>
+                  <c:v>16(4)</c:v>
                 </c:pt>
               </c:strCache>
             </c:strRef>
           </c:cat>
           <c:val>
             <c:numRef>
-              <c:f>(Sheet1!$B$37,Sheet1!$D$37,Sheet1!$F$37,Sheet1!$H$37)</c:f>
+              <c:f>'Andre Rework'!$B$88:$D$88</c:f>
               <c:numCache>
                 <c:formatCode>General</c:formatCode>
-                <c:ptCount val="4"/>
+                <c:ptCount val="3"/>
                 <c:pt idx="0">
-                  <c:v>868.9166666666666</c:v>
+                  <c:v>628.6</c:v>
                 </c:pt>
                 <c:pt idx="1">
-                  <c:v>450.4</c:v>
+                  <c:v>632.0</c:v>
                 </c:pt>
                 <c:pt idx="2">
-                  <c:v>628.0</c:v>
-                </c:pt>
-                <c:pt idx="3">
-                  <c:v>630.0</c:v>
+                  <c:v>685.0</c:v>
                 </c:pt>
               </c:numCache>
             </c:numRef>
@@ -846,7 +833,7 @@
           <c:order val="2"/>
           <c:tx>
             <c:strRef>
-              <c:f>Sheet1!$A$38</c:f>
+              <c:f>'Andre Rework'!$A$89</c:f>
               <c:strCache>
                 <c:ptCount val="1"/>
                 <c:pt idx="0">
@@ -856,46 +843,41 @@
             </c:strRef>
           </c:tx>
           <c:errBars>
+            <c:errDir val="y"/>
             <c:errBarType val="both"/>
             <c:errValType val="cust"/>
             <c:plus>
               <c:numRef>
-                <c:f>(Sheet1!$C$38,Sheet1!$E$38,Sheet1!$G$38,Sheet1!$I$38)</c:f>
+                <c:f>'Andre Rework'!$B$93:$D$93</c:f>
                 <c:numCache>
                   <c:formatCode>General</c:formatCode>
-                  <c:ptCount val="4"/>
+                  <c:ptCount val="3"/>
                   <c:pt idx="0">
-                    <c:v>50.7496579079877</c:v>
+                    <c:v>5.97</c:v>
                   </c:pt>
                   <c:pt idx="1">
-                    <c:v>27.5</c:v>
+                    <c:v>9.17</c:v>
                   </c:pt>
                   <c:pt idx="2">
-                    <c:v>5.97</c:v>
-                  </c:pt>
-                  <c:pt idx="3">
-                    <c:v>6.14</c:v>
+                    <c:v>1.66</c:v>
                   </c:pt>
                 </c:numCache>
               </c:numRef>
             </c:plus>
             <c:minus>
               <c:numRef>
-                <c:f>(Sheet1!$C$38,Sheet1!$E$38,Sheet1!$G$38,Sheet1!$I$38)</c:f>
+                <c:f>'Andre Rework'!$B$93:$D$93</c:f>
                 <c:numCache>
                   <c:formatCode>General</c:formatCode>
-                  <c:ptCount val="4"/>
+                  <c:ptCount val="3"/>
                   <c:pt idx="0">
-                    <c:v>50.7496579079877</c:v>
+                    <c:v>5.97</c:v>
                   </c:pt>
                   <c:pt idx="1">
-                    <c:v>27.5</c:v>
+                    <c:v>9.17</c:v>
                   </c:pt>
                   <c:pt idx="2">
-                    <c:v>5.97</c:v>
-                  </c:pt>
-                  <c:pt idx="3">
-                    <c:v>6.14</c:v>
+                    <c:v>1.66</c:v>
                   </c:pt>
                 </c:numCache>
               </c:numRef>
@@ -903,51 +885,46 @@
           </c:errBars>
           <c:cat>
             <c:strRef>
-              <c:f>(Sheet1!$B$35,Sheet1!$D$35,Sheet1!$F$35,Sheet1!$H$35)</c:f>
+              <c:f>'Andre Rework'!$B$86:$D$86</c:f>
               <c:strCache>
-                <c:ptCount val="4"/>
+                <c:ptCount val="3"/>
                 <c:pt idx="0">
-                  <c:v>1A. 32 ex, 2 machines</c:v>
+                  <c:v>4(1)</c:v>
                 </c:pt>
                 <c:pt idx="1">
-                  <c:v>1B. 16 ex, 2 machines</c:v>
+                  <c:v>8(2)</c:v>
                 </c:pt>
                 <c:pt idx="2">
-                  <c:v>2. 16 ex, 1 machine</c:v>
-                </c:pt>
-                <c:pt idx="3">
-                  <c:v>3. 32 ex, 1 machine</c:v>
+                  <c:v>16(4)</c:v>
                 </c:pt>
               </c:strCache>
             </c:strRef>
           </c:cat>
           <c:val>
             <c:numRef>
-              <c:f>(Sheet1!$B$38,Sheet1!$D$38,Sheet1!$F$38,Sheet1!$H$38)</c:f>
+              <c:f>'Andre Rework'!$B$89:$D$89</c:f>
               <c:numCache>
                 <c:formatCode>General</c:formatCode>
-                <c:ptCount val="4"/>
+                <c:ptCount val="3"/>
                 <c:pt idx="0">
-                  <c:v>676.0</c:v>
+                  <c:v>588.9</c:v>
                 </c:pt>
                 <c:pt idx="1">
-                  <c:v>359.1</c:v>
+                  <c:v>607.8</c:v>
                 </c:pt>
                 <c:pt idx="2">
-                  <c:v>588.0</c:v>
-                </c:pt>
-                <c:pt idx="3">
-                  <c:v>609.0</c:v>
+                  <c:v>641.0</c:v>
                 </c:pt>
               </c:numCache>
             </c:numRef>
           </c:val>
         </c:ser>
-        <c:axId val="671736600"/>
-        <c:axId val="67663848"/>
-      </c:barChart>
+        <c:marker val="1"/>
+        <c:axId val="602739336"/>
+        <c:axId val="602082584"/>
+      </c:lineChart>
       <c:catAx>
-        <c:axId val="671736600"/>
+        <c:axId val="602739336"/>
         <c:scaling>
           <c:orientation val="minMax"/>
         </c:scaling>
@@ -959,31 +936,41 @@
               <a:lstStyle/>
               <a:p>
                 <a:pPr>
-                  <a:defRPr/>
+                  <a:defRPr lang="de-DE" sz="1400"/>
                 </a:pPr>
                 <a:r>
-                  <a:rPr lang="en-US"/>
-                  <a:t>1A - 2 X 64 cores, 4 replicas/bigjob; 1B - in same experiment as 1, time noted for 16 exchanges; 2 - 1 X 64 cores, 4 replicas/bigjob; 3 - 1 X 128 cores, 8 replicas/bigjob</a:t>
+                  <a:rPr sz="1400"/>
+                  <a:t>Number of Replicas(Number of Machines)</a:t>
                 </a:r>
               </a:p>
             </c:rich>
           </c:tx>
           <c:layout/>
         </c:title>
+        <c:numFmt formatCode="h:mm" sourceLinked="1"/>
         <c:tickLblPos val="nextTo"/>
-        <c:crossAx val="67663848"/>
+        <c:txPr>
+          <a:bodyPr/>
+          <a:lstStyle/>
+          <a:p>
+            <a:pPr>
+              <a:defRPr lang="de-DE" sz="1300"/>
+            </a:pPr>
+            <a:endParaRPr lang="en-US"/>
+          </a:p>
+        </c:txPr>
+        <c:crossAx val="602082584"/>
         <c:crosses val="autoZero"/>
         <c:auto val="1"/>
         <c:lblAlgn val="ctr"/>
         <c:lblOffset val="100"/>
       </c:catAx>
       <c:valAx>
-        <c:axId val="67663848"/>
+        <c:axId val="602082584"/>
         <c:scaling>
           <c:orientation val="minMax"/>
         </c:scaling>
         <c:axPos val="l"/>
-        <c:majorGridlines/>
         <c:title>
           <c:tx>
             <c:rich>
@@ -991,10 +978,10 @@
               <a:lstStyle/>
               <a:p>
                 <a:pPr>
-                  <a:defRPr/>
+                  <a:defRPr lang="de-DE" sz="1300"/>
                 </a:pPr>
                 <a:r>
-                  <a:rPr lang="en-US"/>
+                  <a:rPr lang="de-DE" sz="1300"/>
                   <a:t>Runtime (in sec)</a:t>
                 </a:r>
               </a:p>
@@ -1004,27 +991,37 @@
         </c:title>
         <c:numFmt formatCode="General" sourceLinked="1"/>
         <c:tickLblPos val="nextTo"/>
-        <c:crossAx val="671736600"/>
+        <c:txPr>
+          <a:bodyPr/>
+          <a:lstStyle/>
+          <a:p>
+            <a:pPr>
+              <a:defRPr lang="de-DE" sz="1300"/>
+            </a:pPr>
+            <a:endParaRPr lang="en-US"/>
+          </a:p>
+        </c:txPr>
+        <c:crossAx val="602739336"/>
         <c:crosses val="autoZero"/>
         <c:crossBetween val="between"/>
       </c:valAx>
     </c:plotArea>
     <c:legend>
-      <c:legendPos val="r"/>
+      <c:legendPos val="b"/>
       <c:layout/>
+      <c:txPr>
+        <a:bodyPr/>
+        <a:lstStyle/>
+        <a:p>
+          <a:pPr>
+            <a:defRPr lang="de-DE" sz="1200"/>
+          </a:pPr>
+          <a:endParaRPr lang="en-US"/>
+        </a:p>
+      </c:txPr>
     </c:legend>
     <c:plotVisOnly val="1"/>
   </c:chart>
-  <c:txPr>
-    <a:bodyPr/>
-    <a:lstStyle/>
-    <a:p>
-      <a:pPr>
-        <a:defRPr sz="1800"/>
-      </a:pPr>
-      <a:endParaRPr lang="en-US"/>
-    </a:p>
-  </c:txPr>
   <c:externalData r:id="rId1"/>
 </c:chartSpace>
 </file>
@@ -1112,7 +1109,7 @@
             <a:fld id="{9A6AC4B2-6F12-454D-8DA7-7B9C78843B81}" type="datetimeFigureOut">
               <a:rPr lang="en-US" smtClean="0"/>
               <a:pPr/>
-              <a:t>9/15/10</a:t>
+              <a:t>11/2/10</a:t>
             </a:fld>
             <a:endParaRPr lang="en-US"/>
           </a:p>
@@ -1275,7 +1272,7 @@
             <a:fld id="{19F24AD4-A78B-B645-8B43-825B1EB2901C}" type="datetimeFigureOut">
               <a:rPr lang="en-US" smtClean="0"/>
               <a:pPr/>
-              <a:t>9/15/10</a:t>
+              <a:t>11/2/10</a:t>
             </a:fld>
             <a:endParaRPr lang="en-US"/>
           </a:p>
@@ -1907,88 +1904,6 @@
 </p:notes>
 </file>
 
-<file path=ppt/notesSlides/notesSlide13.xml><?xml version="1.0" encoding="utf-8"?>
-<p:notes xmlns:a="http://schemas.openxmlformats.org/drawingml/2006/main" xmlns:r="http://schemas.openxmlformats.org/officeDocument/2006/relationships" xmlns:mc="http://schemas.openxmlformats.org/markup-compatibility/2006" xmlns:mv="urn:schemas-microsoft-com:mac:vml" xmlns:p="http://schemas.openxmlformats.org/presentationml/2006/main" mc:Ignorable="mv" mc:PreserveAttributes="mv:*">
-  <p:cSld>
-    <p:spTree>
-      <p:nvGrpSpPr>
-        <p:cNvPr id="1" name=""/>
-        <p:cNvGrpSpPr/>
-        <p:nvPr/>
-      </p:nvGrpSpPr>
-      <p:grpSpPr>
-        <a:xfrm>
-          <a:off x="0" y="0"/>
-          <a:ext cx="0" cy="0"/>
-          <a:chOff x="0" y="0"/>
-          <a:chExt cx="0" cy="0"/>
-        </a:xfrm>
-      </p:grpSpPr>
-      <p:sp>
-        <p:nvSpPr>
-          <p:cNvPr id="2" name="Slide Image Placeholder 1"/>
-          <p:cNvSpPr>
-            <a:spLocks noGrp="1" noRot="1" noChangeAspect="1"/>
-          </p:cNvSpPr>
-          <p:nvPr>
-            <p:ph type="sldImg"/>
-          </p:nvPr>
-        </p:nvSpPr>
-        <p:spPr/>
-      </p:sp>
-      <p:sp>
-        <p:nvSpPr>
-          <p:cNvPr id="3" name="Notes Placeholder 2"/>
-          <p:cNvSpPr>
-            <a:spLocks noGrp="1"/>
-          </p:cNvSpPr>
-          <p:nvPr>
-            <p:ph type="body" idx="1"/>
-          </p:nvPr>
-        </p:nvSpPr>
-        <p:spPr/>
-        <p:txBody>
-          <a:bodyPr>
-            <a:normAutofit/>
-          </a:bodyPr>
-          <a:lstStyle/>
-          <a:p>
-            <a:endParaRPr lang="en-US" dirty="0"/>
-          </a:p>
-        </p:txBody>
-      </p:sp>
-      <p:sp>
-        <p:nvSpPr>
-          <p:cNvPr id="4" name="Slide Number Placeholder 3"/>
-          <p:cNvSpPr>
-            <a:spLocks noGrp="1"/>
-          </p:cNvSpPr>
-          <p:nvPr>
-            <p:ph type="sldNum" sz="quarter" idx="10"/>
-          </p:nvPr>
-        </p:nvSpPr>
-        <p:spPr/>
-        <p:txBody>
-          <a:bodyPr/>
-          <a:lstStyle/>
-          <a:p>
-            <a:fld id="{D770256F-FACB-CC4B-A3D9-71375CB20943}" type="slidenum">
-              <a:rPr lang="en-US" smtClean="0"/>
-              <a:pPr/>
-              <a:t>22</a:t>
-            </a:fld>
-            <a:endParaRPr lang="en-US"/>
-          </a:p>
-        </p:txBody>
-      </p:sp>
-    </p:spTree>
-  </p:cSld>
-  <p:clrMapOvr>
-    <a:masterClrMapping/>
-  </p:clrMapOvr>
-</p:notes>
-</file>
-
 <file path=ppt/notesSlides/notesSlide2.xml><?xml version="1.0" encoding="utf-8"?>
 <p:notes xmlns:a="http://schemas.openxmlformats.org/drawingml/2006/main" xmlns:r="http://schemas.openxmlformats.org/officeDocument/2006/relationships" xmlns:mc="http://schemas.openxmlformats.org/markup-compatibility/2006" xmlns:mv="urn:schemas-microsoft-com:mac:vml" xmlns:p="http://schemas.openxmlformats.org/presentationml/2006/main" mc:Ignorable="mv" mc:PreserveAttributes="mv:*">
   <p:cSld>
@@ -3025,7 +2940,7 @@
             <a:fld id="{4C4AD4EB-88D0-C141-9474-CCD86A78CB94}" type="datetimeFigureOut">
               <a:rPr lang="en-US" smtClean="0"/>
               <a:pPr/>
-              <a:t>9/14/10</a:t>
+              <a:t>11/2/10</a:t>
             </a:fld>
             <a:endParaRPr lang="en-US" dirty="0"/>
           </a:p>
@@ -3364,7 +3279,7 @@
             <a:fld id="{F19CAA94-9393-BB4A-8CB6-008B1351A132}" type="datetime1">
               <a:rPr lang="en-US" smtClean="0"/>
               <a:pPr/>
-              <a:t>9/15/10</a:t>
+              <a:t>11/2/10</a:t>
             </a:fld>
             <a:endParaRPr lang="en-US"/>
           </a:p>
@@ -3687,7 +3602,7 @@
             <a:fld id="{459EC1CE-E98D-704D-AD6F-6E3323A36483}" type="datetime1">
               <a:rPr lang="en-US" smtClean="0"/>
               <a:pPr/>
-              <a:t>9/15/10</a:t>
+              <a:t>11/2/10</a:t>
             </a:fld>
             <a:endParaRPr lang="en-US"/>
           </a:p>
@@ -3963,7 +3878,7 @@
             <a:fld id="{23E692A5-8B3E-1949-B0CC-6F0593ACFA8E}" type="datetime1">
               <a:rPr lang="en-US" smtClean="0"/>
               <a:pPr/>
-              <a:t>9/15/10</a:t>
+              <a:t>11/2/10</a:t>
             </a:fld>
             <a:endParaRPr lang="en-US"/>
           </a:p>
@@ -4255,7 +4170,7 @@
             <a:fld id="{C381DA14-A3C0-9C42-96F2-BEE3D5DE963D}" type="datetime1">
               <a:rPr lang="en-US" smtClean="0"/>
               <a:pPr/>
-              <a:t>9/15/10</a:t>
+              <a:t>11/2/10</a:t>
             </a:fld>
             <a:endParaRPr lang="en-US"/>
           </a:p>
@@ -4582,7 +4497,7 @@
             <a:fld id="{33319320-9A5F-694B-B7B5-C734EC93AAA2}" type="datetime1">
               <a:rPr lang="en-US" smtClean="0"/>
               <a:pPr/>
-              <a:t>9/15/10</a:t>
+              <a:t>11/2/10</a:t>
             </a:fld>
             <a:endParaRPr lang="en-US"/>
           </a:p>
@@ -4830,7 +4745,7 @@
             <a:fld id="{CF6CE397-A6E6-7547-B24A-92BB5049E0F2}" type="datetime1">
               <a:rPr lang="en-US" smtClean="0"/>
               <a:pPr/>
-              <a:t>9/15/10</a:t>
+              <a:t>11/2/10</a:t>
             </a:fld>
             <a:endParaRPr lang="en-US"/>
           </a:p>
@@ -5007,7 +4922,7 @@
             <a:fld id="{27AB7D46-BD5E-E641-9118-DCE28F3B83FA}" type="datetime1">
               <a:rPr lang="en-US" smtClean="0"/>
               <a:pPr/>
-              <a:t>9/15/10</a:t>
+              <a:t>11/2/10</a:t>
             </a:fld>
             <a:endParaRPr lang="en-US"/>
           </a:p>
@@ -5122,7 +5037,7 @@
             <a:fld id="{4C4AD4EB-88D0-C141-9474-CCD86A78CB94}" type="datetimeFigureOut">
               <a:rPr lang="en-US" smtClean="0"/>
               <a:pPr/>
-              <a:t>9/14/10</a:t>
+              <a:t>11/2/10</a:t>
             </a:fld>
             <a:endParaRPr lang="en-US"/>
           </a:p>
@@ -5405,7 +5320,7 @@
             <a:fld id="{4C4AD4EB-88D0-C141-9474-CCD86A78CB94}" type="datetimeFigureOut">
               <a:rPr lang="en-US" smtClean="0"/>
               <a:pPr/>
-              <a:t>9/14/10</a:t>
+              <a:t>11/2/10</a:t>
             </a:fld>
             <a:endParaRPr lang="en-US" dirty="0"/>
           </a:p>
@@ -5620,7 +5535,7 @@
             <a:fld id="{4C4AD4EB-88D0-C141-9474-CCD86A78CB94}" type="datetimeFigureOut">
               <a:rPr lang="en-US" smtClean="0"/>
               <a:pPr/>
-              <a:t>9/14/10</a:t>
+              <a:t>11/2/10</a:t>
             </a:fld>
             <a:endParaRPr lang="en-US"/>
           </a:p>
@@ -5896,7 +5811,7 @@
             <a:fld id="{ADB8239A-D789-5443-937F-338E3AE3D41C}" type="datetime1">
               <a:rPr lang="en-US" smtClean="0"/>
               <a:pPr/>
-              <a:t>9/15/10</a:t>
+              <a:t>11/2/10</a:t>
             </a:fld>
             <a:endParaRPr lang="en-US"/>
           </a:p>
@@ -5969,7 +5884,7 @@
             <a:fld id="{4C4AD4EB-88D0-C141-9474-CCD86A78CB94}" type="datetimeFigureOut">
               <a:rPr lang="en-US" smtClean="0"/>
               <a:pPr/>
-              <a:t>9/14/10</a:t>
+              <a:t>11/2/10</a:t>
             </a:fld>
             <a:endParaRPr lang="en-US"/>
           </a:p>
@@ -6222,7 +6137,7 @@
             <a:fld id="{BC26097E-015C-3B4D-86C1-CD2AD30F0B81}" type="datetime1">
               <a:rPr lang="en-US" smtClean="0"/>
               <a:pPr/>
-              <a:t>9/15/10</a:t>
+              <a:t>11/2/10</a:t>
             </a:fld>
             <a:endParaRPr lang="en-US"/>
           </a:p>
@@ -6498,7 +6413,7 @@
             <a:fld id="{ED6649F4-2545-3040-B7BD-803CA59D50C7}" type="datetime1">
               <a:rPr lang="en-US" smtClean="0"/>
               <a:pPr/>
-              <a:t>9/15/10</a:t>
+              <a:t>11/2/10</a:t>
             </a:fld>
             <a:endParaRPr lang="en-US"/>
           </a:p>
@@ -6806,7 +6721,7 @@
             <a:fld id="{833A9088-CEDD-2F48-A9A0-611A3CC03FE9}" type="datetime1">
               <a:rPr lang="en-US" smtClean="0"/>
               <a:pPr/>
-              <a:t>9/15/10</a:t>
+              <a:t>11/2/10</a:t>
             </a:fld>
             <a:endParaRPr lang="en-US"/>
           </a:p>
@@ -7100,7 +7015,7 @@
             <a:fld id="{AED87ACF-EB3C-EA42-8610-542FB50388EB}" type="datetime1">
               <a:rPr lang="en-US" smtClean="0"/>
               <a:pPr/>
-              <a:t>9/15/10</a:t>
+              <a:t>11/2/10</a:t>
             </a:fld>
             <a:endParaRPr lang="en-US"/>
           </a:p>
@@ -7532,7 +7447,7 @@
             <a:fld id="{0E0DC31B-692F-774E-A937-DA560DE61DA8}" type="datetime1">
               <a:rPr lang="en-US" smtClean="0"/>
               <a:pPr/>
-              <a:t>9/15/10</a:t>
+              <a:t>11/2/10</a:t>
             </a:fld>
             <a:endParaRPr lang="en-US"/>
           </a:p>
@@ -7880,7 +7795,7 @@
             <a:fld id="{95DEFDAE-5BDC-1B4F-BC4C-23C867CEBC21}" type="datetime1">
               <a:rPr lang="en-US" smtClean="0"/>
               <a:pPr/>
-              <a:t>9/15/10</a:t>
+              <a:t>11/2/10</a:t>
             </a:fld>
             <a:endParaRPr lang="en-US"/>
           </a:p>
@@ -7972,7 +7887,7 @@
             <a:fld id="{9F53C516-787B-9A45-AFCF-5D75DD78DEBE}" type="datetime1">
               <a:rPr lang="en-US" smtClean="0"/>
               <a:pPr/>
-              <a:t>9/15/10</a:t>
+              <a:t>11/2/10</a:t>
             </a:fld>
             <a:endParaRPr lang="en-US"/>
           </a:p>
@@ -8186,7 +8101,7 @@
             <a:fld id="{A3476A5E-2ED6-7749-A8C1-D0B1EEEB97E0}" type="datetime1">
               <a:rPr lang="en-US" smtClean="0"/>
               <a:pPr/>
-              <a:t>9/15/10</a:t>
+              <a:t>11/2/10</a:t>
             </a:fld>
             <a:endParaRPr lang="en-US"/>
           </a:p>
@@ -8837,7 +8752,7 @@
             <a:fld id="{4C4AD4EB-88D0-C141-9474-CCD86A78CB94}" type="datetimeFigureOut">
               <a:rPr lang="en-US" smtClean="0"/>
               <a:pPr/>
-              <a:t>9/14/10</a:t>
+              <a:t>11/2/10</a:t>
             </a:fld>
             <a:endParaRPr lang="en-US"/>
           </a:p>
@@ -9919,8 +9834,8 @@
           </p:cNvPicPr>
           <p:nvPr/>
         </p:nvPicPr>
-        <mc:AlternateContent xmlns:ma="http://schemas.microsoft.com/office/mac/drawingml/2008/main">
-          <mc:Choice Requires="ma">
+        <mc:AlternateContent>
+          <mc:Choice xmlns:ma="http://schemas.microsoft.com/office/mac/drawingml/2008/main" Requires="ma">
             <p:blipFill>
               <a:blip r:embed="rId2"/>
               <a:stretch>
@@ -9928,7 +9843,7 @@
               </a:stretch>
             </p:blipFill>
           </mc:Choice>
-          <mc:Fallback xmlns:p="http://schemas.openxmlformats.org/presentationml/2006/main" xmlns:mv="urn:schemas-microsoft-com:mac:vml" xmlns:mc="http://schemas.openxmlformats.org/markup-compatibility/2006" xmlns:r="http://schemas.openxmlformats.org/officeDocument/2006/relationships" xmlns:a="http://schemas.openxmlformats.org/drawingml/2006/main" xmlns="">
+          <mc:Fallback>
             <p:blipFill>
               <a:blip r:embed="rId3"/>
               <a:stretch>
@@ -10184,7 +10099,7 @@
         <p:spPr/>
         <p:txBody>
           <a:bodyPr>
-            <a:normAutofit fontScale="92500" lnSpcReduction="10000"/>
+            <a:normAutofit fontScale="92500" lnSpcReduction="20000"/>
           </a:bodyPr>
           <a:lstStyle/>
           <a:p>
@@ -10194,7 +10109,47 @@
                   <a:srgbClr val="595959"/>
                 </a:solidFill>
               </a:rPr>
-              <a:t>We configured the traditional and asynchronous RE (both centralized and decentralized) to run a parallel NAMD simulation with 4, 8, 16, 32 and 64 replicas sampling a temperature between 300 K and 1000 K on </a:t>
+              <a:t>We configured the traditional and asynchronous RE (both centralized and decentralized) to run a parallel NAMD simulation with 4, 8, 16, </a:t>
+            </a:r>
+            <a:r>
+              <a:rPr lang="en-US" dirty="0" smtClean="0">
+                <a:solidFill>
+                  <a:srgbClr val="595959"/>
+                </a:solidFill>
+              </a:rPr>
+              <a:t>32</a:t>
+            </a:r>
+            <a:r>
+              <a:rPr lang="en-US" dirty="0" smtClean="0">
+                <a:solidFill>
+                  <a:srgbClr val="595959"/>
+                </a:solidFill>
+              </a:rPr>
+              <a:t>,</a:t>
+            </a:r>
+            <a:r>
+              <a:rPr lang="en-US" dirty="0" smtClean="0">
+                <a:solidFill>
+                  <a:srgbClr val="595959"/>
+                </a:solidFill>
+              </a:rPr>
+              <a:t> 64, 128 and 256 </a:t>
+            </a:r>
+            <a:r>
+              <a:rPr lang="en-US" dirty="0" smtClean="0">
+                <a:solidFill>
+                  <a:srgbClr val="595959"/>
+                </a:solidFill>
+              </a:rPr>
+              <a:t>replicas sampling a temperature between 300 K and 1000 </a:t>
+            </a:r>
+            <a:r>
+              <a:rPr lang="en-US" dirty="0" smtClean="0">
+                <a:solidFill>
+                  <a:srgbClr val="595959"/>
+                </a:solidFill>
+              </a:rPr>
+              <a:t>K on </a:t>
             </a:r>
             <a:r>
               <a:rPr lang="en-US" dirty="0" err="1" smtClean="0">
@@ -10210,7 +10165,15 @@
                   <a:srgbClr val="595959"/>
                 </a:solidFill>
               </a:rPr>
-              <a:t>, a LONI/Teragrid machine.</a:t>
+              <a:t>, a LONI/Teragrid </a:t>
+            </a:r>
+            <a:r>
+              <a:rPr lang="en-US" dirty="0" smtClean="0">
+                <a:solidFill>
+                  <a:srgbClr val="595959"/>
+                </a:solidFill>
+              </a:rPr>
+              <a:t>machine. Note: The simulations involving 128 and 256 replicas have been done on Ranger, but the results have been normalized for comparison with simulations on QB. </a:t>
             </a:r>
           </a:p>
           <a:p>
@@ -10248,7 +10211,15 @@
                   <a:srgbClr val="595959"/>
                 </a:solidFill>
               </a:rPr>
-              <a:t>The ratio between the number of replicas and the number of exchanges is kept constant, for the purpose of comparison.</a:t>
+              <a:t>The </a:t>
+            </a:r>
+            <a:r>
+              <a:rPr lang="en-US" dirty="0" smtClean="0">
+                <a:solidFill>
+                  <a:srgbClr val="595959"/>
+                </a:solidFill>
+              </a:rPr>
+              <a:t>ratio between the number of replicas and the number of exchanges is kept constant, for the purpose of comparison.</a:t>
             </a:r>
           </a:p>
           <a:p>
@@ -10302,13 +10273,13 @@
       </p:grpSpPr>
       <p:graphicFrame>
         <p:nvGraphicFramePr>
-          <p:cNvPr id="4" name="Diagramm 2"/>
+          <p:cNvPr id="3" name="Diagramm 2"/>
           <p:cNvGraphicFramePr/>
           <p:nvPr/>
         </p:nvGraphicFramePr>
         <p:xfrm>
-          <a:off x="0" y="982870"/>
-          <a:ext cx="9143999" cy="5875130"/>
+          <a:off x="0" y="0"/>
+          <a:ext cx="9144000" cy="6858000"/>
         </p:xfrm>
         <a:graphic>
           <a:graphicData uri="http://schemas.openxmlformats.org/drawingml/2006/chart">
@@ -10477,7 +10448,15 @@
           <a:p>
             <a:r>
               <a:rPr lang="en-US" dirty="0" smtClean="0"/>
-              <a:t>Comparison – when running on 2 machines</a:t>
+              <a:t>Comparison – when running on </a:t>
+            </a:r>
+            <a:r>
+              <a:rPr lang="en-US" dirty="0" smtClean="0"/>
+              <a:t>2 and 4 </a:t>
+            </a:r>
+            <a:r>
+              <a:rPr lang="en-US" dirty="0" smtClean="0"/>
+              <a:t>machines</a:t>
             </a:r>
             <a:endParaRPr lang="en-US" dirty="0"/>
           </a:p>
@@ -10500,21 +10479,29 @@
           <a:p>
             <a:r>
               <a:rPr lang="en-US" dirty="0" smtClean="0"/>
-              <a:t>In the next few slides, we will see the results when run the experiments over 2 machines.</a:t>
-            </a:r>
-          </a:p>
-          <a:p>
+              <a:t>In the next few slides, we will see the results when run the experiments over </a:t>
+            </a:r>
             <a:r>
               <a:rPr lang="en-US" dirty="0" smtClean="0"/>
-              <a:t>We used Ranger and </a:t>
-            </a:r>
-            <a:r>
-              <a:rPr lang="en-US" dirty="0" err="1" smtClean="0"/>
-              <a:t>Queenbee</a:t>
+              <a:t>2 and 4 </a:t>
             </a:r>
             <a:r>
               <a:rPr lang="en-US" dirty="0" smtClean="0"/>
-              <a:t> (Teragrid Machines) for this purpose.</a:t>
+              <a:t>machines.</a:t>
+            </a:r>
+          </a:p>
+          <a:p>
+            <a:r>
+              <a:rPr lang="en-US" dirty="0" smtClean="0"/>
+              <a:t>We used</a:t>
+            </a:r>
+            <a:r>
+              <a:rPr lang="en-US" dirty="0" smtClean="0"/>
+              <a:t> LONI machines for </a:t>
+            </a:r>
+            <a:r>
+              <a:rPr lang="en-US" dirty="0" smtClean="0"/>
+              <a:t>this purpose.</a:t>
             </a:r>
           </a:p>
           <a:p>
@@ -10564,13 +10551,21 @@
         <p:spPr/>
         <p:txBody>
           <a:bodyPr>
-            <a:normAutofit/>
+            <a:normAutofit fontScale="90000"/>
           </a:bodyPr>
           <a:lstStyle/>
           <a:p>
             <a:r>
               <a:rPr lang="en-US" dirty="0" smtClean="0"/>
-              <a:t>Configuration – Two Machines</a:t>
+              <a:t>Configuration – </a:t>
+            </a:r>
+            <a:r>
+              <a:rPr lang="en-US" dirty="0" smtClean="0"/>
+              <a:t>Two/Four </a:t>
+            </a:r>
+            <a:r>
+              <a:rPr lang="en-US" dirty="0" smtClean="0"/>
+              <a:t>Machines</a:t>
             </a:r>
             <a:endParaRPr lang="en-US" dirty="0"/>
           </a:p>
@@ -10589,7 +10584,7 @@
         <p:spPr/>
         <p:txBody>
           <a:bodyPr>
-            <a:normAutofit fontScale="92500"/>
+            <a:normAutofit fontScale="85000" lnSpcReduction="10000"/>
           </a:bodyPr>
           <a:lstStyle/>
           <a:p>
@@ -10599,7 +10594,26 @@
                   <a:srgbClr val="595959"/>
                 </a:solidFill>
               </a:rPr>
-              <a:t>We configured the traditional and asynchronous RE (both centralized and decentralized) to run a parallel NAMD simulation with 8 replicas sampling a temperature between 300 K and 450 K on </a:t>
+              <a:t>We configured the traditional and asynchronous RE (both centralized and decentralized) to run a parallel NAMD </a:t>
+            </a:r>
+            <a:r>
+              <a:rPr lang="en-US" dirty="0" smtClean="0">
+                <a:solidFill>
+                  <a:srgbClr val="595959"/>
+                </a:solidFill>
+              </a:rPr>
+              <a:t>simulation:</a:t>
+            </a:r>
+          </a:p>
+          <a:p>
+            <a:pPr lvl="1"/>
+            <a:r>
+              <a:rPr lang="en-US" dirty="0" smtClean="0">
+                <a:solidFill>
+                  <a:srgbClr val="595959"/>
+                </a:solidFill>
+              </a:rPr>
+              <a:t>(</a:t>
             </a:r>
             <a:r>
               <a:rPr lang="en-US" dirty="0" err="1" smtClean="0">
@@ -10607,7 +10621,7 @@
                   <a:srgbClr val="595959"/>
                 </a:solidFill>
               </a:rPr>
-              <a:t>QueenBee</a:t>
+              <a:t>i</a:t>
             </a:r>
             <a:r>
               <a:rPr lang="en-US" dirty="0" smtClean="0">
@@ -10615,17 +10629,113 @@
                   <a:srgbClr val="595959"/>
                 </a:solidFill>
               </a:rPr>
-              <a:t> and Ranger. </a:t>
-            </a:r>
-          </a:p>
-          <a:p>
+              <a:t>) with </a:t>
+            </a:r>
             <a:r>
               <a:rPr lang="en-US" dirty="0" smtClean="0">
                 <a:solidFill>
                   <a:srgbClr val="595959"/>
                 </a:solidFill>
               </a:rPr>
-              <a:t>Each replica uses 16 MPI processes and runs 500 time steps between exchange attempts. In each case a two </a:t>
+              <a:t>8 replicas sampling a temperature between 300 K and 450 K on</a:t>
+            </a:r>
+            <a:r>
+              <a:rPr lang="en-US" dirty="0" smtClean="0">
+                <a:solidFill>
+                  <a:srgbClr val="595959"/>
+                </a:solidFill>
+              </a:rPr>
+              <a:t> two LONI machines and </a:t>
+            </a:r>
+          </a:p>
+          <a:p>
+            <a:pPr lvl="1"/>
+            <a:r>
+              <a:rPr lang="en-US" dirty="0" smtClean="0">
+                <a:solidFill>
+                  <a:srgbClr val="595959"/>
+                </a:solidFill>
+              </a:rPr>
+              <a:t>(ii) with 16 </a:t>
+            </a:r>
+            <a:r>
+              <a:rPr lang="en-US" dirty="0" smtClean="0">
+                <a:solidFill>
+                  <a:srgbClr val="595959"/>
+                </a:solidFill>
+              </a:rPr>
+              <a:t>replicas sampling a temperature between 300 K and 450 </a:t>
+            </a:r>
+            <a:r>
+              <a:rPr lang="en-US" dirty="0" smtClean="0">
+                <a:solidFill>
+                  <a:srgbClr val="595959"/>
+                </a:solidFill>
+              </a:rPr>
+              <a:t>K </a:t>
+            </a:r>
+            <a:r>
+              <a:rPr lang="en-US" dirty="0" smtClean="0">
+                <a:solidFill>
+                  <a:srgbClr val="595959"/>
+                </a:solidFill>
+              </a:rPr>
+              <a:t>on four LONI machines. </a:t>
+            </a:r>
+            <a:endParaRPr lang="en-US" dirty="0" smtClean="0">
+              <a:solidFill>
+                <a:srgbClr val="595959"/>
+              </a:solidFill>
+            </a:endParaRPr>
+          </a:p>
+          <a:p>
+            <a:r>
+              <a:rPr lang="en-US" dirty="0" smtClean="0">
+                <a:solidFill>
+                  <a:srgbClr val="595959"/>
+                </a:solidFill>
+              </a:rPr>
+              <a:t>Each replica uses 16 MPI processes and runs 500 time steps between exchange attempts. </a:t>
+            </a:r>
+            <a:r>
+              <a:rPr lang="en-US" dirty="0" smtClean="0">
+                <a:solidFill>
+                  <a:srgbClr val="595959"/>
+                </a:solidFill>
+              </a:rPr>
+              <a:t>In</a:t>
+            </a:r>
+            <a:r>
+              <a:rPr lang="en-US" dirty="0" smtClean="0">
+                <a:solidFill>
+                  <a:srgbClr val="595959"/>
+                </a:solidFill>
+              </a:rPr>
+              <a:t> (</a:t>
+            </a:r>
+            <a:r>
+              <a:rPr lang="en-US" dirty="0" err="1" smtClean="0">
+                <a:solidFill>
+                  <a:srgbClr val="595959"/>
+                </a:solidFill>
+              </a:rPr>
+              <a:t>i</a:t>
+            </a:r>
+            <a:r>
+              <a:rPr lang="en-US" dirty="0" smtClean="0">
+                <a:solidFill>
+                  <a:srgbClr val="595959"/>
+                </a:solidFill>
+              </a:rPr>
+              <a:t>) </a:t>
+            </a:r>
+            <a:r>
+              <a:rPr lang="en-US" dirty="0" smtClean="0">
+                <a:solidFill>
+                  <a:srgbClr val="595959"/>
+                </a:solidFill>
+              </a:rPr>
+              <a:t>two </a:t>
             </a:r>
             <a:r>
               <a:rPr lang="en-US" dirty="0" err="1" smtClean="0">
@@ -10641,7 +10751,47 @@
                   <a:srgbClr val="595959"/>
                 </a:solidFill>
               </a:rPr>
-              <a:t> are launched with each requesting 64 cores. The metric used is the time to complete a particular number of exchanges.</a:t>
+              <a:t> are launched with each requesting 64 </a:t>
+            </a:r>
+            <a:r>
+              <a:rPr lang="en-US" dirty="0" smtClean="0">
+                <a:solidFill>
+                  <a:srgbClr val="595959"/>
+                </a:solidFill>
+              </a:rPr>
+              <a:t>cores and in (ii) </a:t>
+            </a:r>
+            <a:r>
+              <a:rPr lang="en-US" dirty="0" smtClean="0">
+                <a:solidFill>
+                  <a:srgbClr val="595959"/>
+                </a:solidFill>
+              </a:rPr>
+              <a:t>four </a:t>
+            </a:r>
+            <a:r>
+              <a:rPr lang="en-US" dirty="0" err="1" smtClean="0">
+                <a:solidFill>
+                  <a:srgbClr val="595959"/>
+                </a:solidFill>
+              </a:rPr>
+              <a:t>BigJobs</a:t>
+            </a:r>
+            <a:r>
+              <a:rPr lang="en-US" dirty="0" smtClean="0">
+                <a:solidFill>
+                  <a:srgbClr val="595959"/>
+                </a:solidFill>
+              </a:rPr>
+              <a:t> are launched with each requesting 64 cores. </a:t>
+            </a:r>
+            <a:r>
+              <a:rPr lang="en-US" dirty="0" smtClean="0">
+                <a:solidFill>
+                  <a:srgbClr val="595959"/>
+                </a:solidFill>
+              </a:rPr>
+              <a:t>The metric used is the time to complete a particular number of exchanges.</a:t>
             </a:r>
           </a:p>
           <a:p>
@@ -10653,6 +10803,11 @@
               </a:rPr>
               <a:t>In the graph, the distributed runs and local runs are compared.</a:t>
             </a:r>
+            <a:endParaRPr lang="en-US" dirty="0" smtClean="0">
+              <a:solidFill>
+                <a:srgbClr val="595959"/>
+              </a:solidFill>
+            </a:endParaRPr>
           </a:p>
           <a:p>
             <a:r>
@@ -10661,8 +10816,37 @@
                   <a:srgbClr val="595959"/>
                 </a:solidFill>
               </a:rPr>
-              <a:t>In the distributed runs, the run time starts when any one job on a machine becomes active. The job on the second machine may or may not become active.</a:t>
-            </a:r>
+              <a:t>Note: In the distributed runs, the </a:t>
+            </a:r>
+            <a:r>
+              <a:rPr lang="en-US" dirty="0" smtClean="0">
+                <a:solidFill>
+                  <a:srgbClr val="595959"/>
+                </a:solidFill>
+              </a:rPr>
+              <a:t>start time is measured only after the </a:t>
+            </a:r>
+            <a:r>
+              <a:rPr lang="en-US" dirty="0" err="1" smtClean="0">
+                <a:solidFill>
+                  <a:srgbClr val="595959"/>
+                </a:solidFill>
+              </a:rPr>
+              <a:t>BigJobs</a:t>
+            </a:r>
+            <a:r>
+              <a:rPr lang="en-US" dirty="0" smtClean="0">
+                <a:solidFill>
+                  <a:srgbClr val="595959"/>
+                </a:solidFill>
+              </a:rPr>
+              <a:t> on all machines have become active. And then the simulation is allowed to make the required number of exchanges.</a:t>
+            </a:r>
+            <a:endParaRPr lang="en-US" dirty="0" smtClean="0">
+              <a:solidFill>
+                <a:srgbClr val="595959"/>
+              </a:solidFill>
+            </a:endParaRPr>
           </a:p>
         </p:txBody>
       </p:sp>
@@ -10809,13 +10993,13 @@
       </p:grpSpPr>
       <p:graphicFrame>
         <p:nvGraphicFramePr>
-          <p:cNvPr id="5" name="Chart 4"/>
+          <p:cNvPr id="3" name="Diagramm 2"/>
           <p:cNvGraphicFramePr/>
           <p:nvPr/>
         </p:nvGraphicFramePr>
         <p:xfrm>
-          <a:off x="-58394" y="938696"/>
-          <a:ext cx="9328303" cy="5879156"/>
+          <a:off x="0" y="190500"/>
+          <a:ext cx="9144000" cy="6477000"/>
         </p:xfrm>
         <a:graphic>
           <a:graphicData uri="http://schemas.openxmlformats.org/drawingml/2006/chart">
@@ -10873,7 +11057,7 @@
           <a:p>
             <a:r>
               <a:rPr lang="en-US" dirty="0" smtClean="0"/>
-              <a:t>Analysis – More resources, faster time to completion</a:t>
+              <a:t>Analysis – Asynchronous RE scales better with distributed resources</a:t>
             </a:r>
             <a:endParaRPr lang="en-US" dirty="0"/>
           </a:p>
@@ -10897,40 +11081,152 @@
         </p:spPr>
         <p:txBody>
           <a:bodyPr>
-            <a:normAutofit/>
+            <a:normAutofit fontScale="85000" lnSpcReduction="10000"/>
           </a:bodyPr>
           <a:lstStyle/>
           <a:p>
             <a:r>
+              <a:rPr lang="en-US" dirty="0" smtClean="0">
+                <a:solidFill>
+                  <a:srgbClr val="595959"/>
+                </a:solidFill>
+              </a:rPr>
+              <a:t>In </a:t>
+            </a:r>
+            <a:r>
+              <a:rPr lang="en-US" dirty="0" smtClean="0">
+                <a:solidFill>
+                  <a:srgbClr val="595959"/>
+                </a:solidFill>
+              </a:rPr>
+              <a:t>the distributed runs, the start time is measured only after the </a:t>
+            </a:r>
+            <a:r>
+              <a:rPr lang="en-US" dirty="0" err="1" smtClean="0">
+                <a:solidFill>
+                  <a:srgbClr val="595959"/>
+                </a:solidFill>
+              </a:rPr>
+              <a:t>BigJobs</a:t>
+            </a:r>
+            <a:r>
+              <a:rPr lang="en-US" dirty="0" smtClean="0">
+                <a:solidFill>
+                  <a:srgbClr val="595959"/>
+                </a:solidFill>
+              </a:rPr>
+              <a:t> on all machines have become active. And then the simulation is allowed to make the required number of exchanges</a:t>
+            </a:r>
+            <a:r>
+              <a:rPr lang="en-US" dirty="0" smtClean="0">
+                <a:solidFill>
+                  <a:srgbClr val="595959"/>
+                </a:solidFill>
+              </a:rPr>
+              <a:t>.</a:t>
+            </a:r>
+            <a:endParaRPr lang="en-US" dirty="0" smtClean="0"/>
+          </a:p>
+          <a:p>
+            <a:r>
               <a:rPr lang="en-US" dirty="0" smtClean="0"/>
-              <a:t>From the graph, it can be seen that the distributed runs take longer than the local run. There are two reasons:</a:t>
+              <a:t>A</a:t>
+            </a:r>
+            <a:r>
+              <a:rPr lang="en-US" dirty="0" smtClean="0"/>
+              <a:t>synchronous</a:t>
+            </a:r>
+            <a:r>
+              <a:rPr lang="en-US" dirty="0" smtClean="0"/>
+              <a:t>-centralized and asynchronous-</a:t>
+            </a:r>
+            <a:r>
+              <a:rPr lang="en-US" dirty="0" smtClean="0"/>
+              <a:t>decentralized almost </a:t>
+            </a:r>
+            <a:r>
+              <a:rPr lang="en-US" dirty="0" smtClean="0"/>
+              <a:t>equal their respective performances on a single machine</a:t>
+            </a:r>
+            <a:r>
+              <a:rPr lang="en-US" dirty="0" smtClean="0"/>
+              <a:t>.</a:t>
+            </a:r>
+            <a:r>
+              <a:rPr lang="en-US" dirty="0" smtClean="0"/>
+              <a:t> </a:t>
+            </a:r>
+          </a:p>
+          <a:p>
+            <a:r>
+              <a:rPr lang="en-US" dirty="0" smtClean="0"/>
+              <a:t>W</a:t>
+            </a:r>
+            <a:r>
+              <a:rPr lang="en-US" dirty="0" smtClean="0"/>
+              <a:t>ith larger number of replicas and (distributed) exchanges, </a:t>
+            </a:r>
+            <a:r>
+              <a:rPr lang="en-US" dirty="0" smtClean="0"/>
+              <a:t>asynchronous-decentralized</a:t>
+            </a:r>
+            <a:r>
+              <a:rPr lang="en-US" dirty="0" smtClean="0"/>
+              <a:t> will continue to perform the way it does on a single machine, but </a:t>
+            </a:r>
+            <a:r>
+              <a:rPr lang="en-US" dirty="0" smtClean="0"/>
+              <a:t>asynchronous</a:t>
+            </a:r>
+            <a:r>
+              <a:rPr lang="en-US" dirty="0" smtClean="0"/>
+              <a:t>-centralized will not. </a:t>
+            </a:r>
+          </a:p>
+          <a:p>
+            <a:r>
+              <a:rPr lang="en-US" dirty="0" smtClean="0"/>
+              <a:t>T</a:t>
+            </a:r>
+            <a:r>
+              <a:rPr lang="en-US" dirty="0" smtClean="0"/>
+              <a:t>he </a:t>
+            </a:r>
+            <a:r>
+              <a:rPr lang="en-US" dirty="0" smtClean="0"/>
+              <a:t>synchronous RE underperforms when compared to its performance on a single machine.  </a:t>
+            </a:r>
+          </a:p>
+          <a:p>
+            <a:r>
+              <a:rPr lang="en-US" dirty="0" smtClean="0"/>
+              <a:t>The reasons are:</a:t>
             </a:r>
           </a:p>
           <a:p>
             <a:pPr lvl="1"/>
             <a:r>
               <a:rPr lang="en-US" dirty="0" smtClean="0"/>
-              <a:t>The co-ordination and communication across two machines takes longer</a:t>
+              <a:t>Heterogeneous infrastructure (Ranger and </a:t>
+            </a:r>
+            <a:r>
+              <a:rPr lang="en-US" dirty="0" err="1" smtClean="0"/>
+              <a:t>QueenBee</a:t>
+            </a:r>
+            <a:r>
+              <a:rPr lang="en-US" dirty="0" smtClean="0"/>
+              <a:t>)</a:t>
             </a:r>
           </a:p>
           <a:p>
             <a:pPr lvl="1"/>
             <a:r>
               <a:rPr lang="en-US" dirty="0" smtClean="0"/>
-              <a:t>The waiting time of the second machine.</a:t>
-            </a:r>
-          </a:p>
-          <a:p>
-            <a:r>
-              <a:rPr lang="en-US" dirty="0" smtClean="0"/>
-              <a:t>The runtime is calculated as the time it takes to complete the required number of exchanges once a job request on one of the machines becomes active.</a:t>
-            </a:r>
-          </a:p>
-          <a:p>
-            <a:r>
-              <a:rPr lang="en-US" dirty="0" smtClean="0"/>
-              <a:t>Comparing 1B and 2 in the graph, we can see that, more often than not, it is beneficial to request more cores for more machines and use more replicas to make more exchanges.</a:t>
-            </a:r>
+              <a:t>Coordinating the exchange step across two machines takes longer, hence adding to the overhead at each exchange step</a:t>
+            </a:r>
+          </a:p>
+          <a:p>
+            <a:endParaRPr lang="en-US" dirty="0" smtClean="0"/>
           </a:p>
         </p:txBody>
       </p:sp>
@@ -10951,135 +11247,6 @@
 </file>
 
 <file path=ppt/slides/slide22.xml><?xml version="1.0" encoding="utf-8"?>
-<p:sld xmlns:a="http://schemas.openxmlformats.org/drawingml/2006/main" xmlns:r="http://schemas.openxmlformats.org/officeDocument/2006/relationships" xmlns:mc="http://schemas.openxmlformats.org/markup-compatibility/2006" xmlns:mv="urn:schemas-microsoft-com:mac:vml" xmlns:p="http://schemas.openxmlformats.org/presentationml/2006/main" mc:Ignorable="mv" mc:PreserveAttributes="mv:*">
-  <p:cSld>
-    <p:spTree>
-      <p:nvGrpSpPr>
-        <p:cNvPr id="1" name=""/>
-        <p:cNvGrpSpPr/>
-        <p:nvPr/>
-      </p:nvGrpSpPr>
-      <p:grpSpPr>
-        <a:xfrm>
-          <a:off x="0" y="0"/>
-          <a:ext cx="0" cy="0"/>
-          <a:chOff x="0" y="0"/>
-          <a:chExt cx="0" cy="0"/>
-        </a:xfrm>
-      </p:grpSpPr>
-      <p:sp>
-        <p:nvSpPr>
-          <p:cNvPr id="2" name="Title 1"/>
-          <p:cNvSpPr>
-            <a:spLocks noGrp="1"/>
-          </p:cNvSpPr>
-          <p:nvPr>
-            <p:ph type="title" idx="4294967295"/>
-          </p:nvPr>
-        </p:nvSpPr>
-        <p:spPr>
-          <a:xfrm>
-            <a:off x="1114425" y="263525"/>
-            <a:ext cx="8029575" cy="914400"/>
-          </a:xfrm>
-        </p:spPr>
-        <p:txBody>
-          <a:bodyPr>
-            <a:normAutofit fontScale="90000"/>
-          </a:bodyPr>
-          <a:lstStyle/>
-          <a:p>
-            <a:r>
-              <a:rPr lang="en-US" dirty="0" smtClean="0"/>
-              <a:t>Analysis – Asynchronous RE scales better with distributed resources</a:t>
-            </a:r>
-            <a:endParaRPr lang="en-US" dirty="0"/>
-          </a:p>
-        </p:txBody>
-      </p:sp>
-      <p:sp>
-        <p:nvSpPr>
-          <p:cNvPr id="3" name="Content Placeholder 2"/>
-          <p:cNvSpPr>
-            <a:spLocks noGrp="1"/>
-          </p:cNvSpPr>
-          <p:nvPr>
-            <p:ph idx="4294967295"/>
-          </p:nvPr>
-        </p:nvSpPr>
-        <p:spPr>
-          <a:xfrm>
-            <a:off x="1176338" y="1530350"/>
-            <a:ext cx="7967662" cy="4608513"/>
-          </a:xfrm>
-        </p:spPr>
-        <p:txBody>
-          <a:bodyPr>
-            <a:normAutofit/>
-          </a:bodyPr>
-          <a:lstStyle/>
-          <a:p>
-            <a:r>
-              <a:rPr lang="en-US" dirty="0" smtClean="0"/>
-              <a:t>In the best case scenario, where both job requests on both machines become available instantaneously, asynchronous-centralized and asynchronous-decentralized equal their respective performances on a single machine.</a:t>
-            </a:r>
-          </a:p>
-          <a:p>
-            <a:r>
-              <a:rPr lang="en-US" dirty="0" smtClean="0"/>
-              <a:t>Even in the best case scenario, the synchronous RE underperforms when compared to its performance on a single machine.  </a:t>
-            </a:r>
-          </a:p>
-          <a:p>
-            <a:r>
-              <a:rPr lang="en-US" dirty="0" smtClean="0"/>
-              <a:t>The reasons are:</a:t>
-            </a:r>
-          </a:p>
-          <a:p>
-            <a:pPr lvl="1"/>
-            <a:r>
-              <a:rPr lang="en-US" dirty="0" smtClean="0"/>
-              <a:t>Heterogeneous infrastructure (Ranger and </a:t>
-            </a:r>
-            <a:r>
-              <a:rPr lang="en-US" dirty="0" err="1" smtClean="0"/>
-              <a:t>QueenBee</a:t>
-            </a:r>
-            <a:r>
-              <a:rPr lang="en-US" dirty="0" smtClean="0"/>
-              <a:t>)</a:t>
-            </a:r>
-          </a:p>
-          <a:p>
-            <a:pPr lvl="1"/>
-            <a:r>
-              <a:rPr lang="en-US" dirty="0" smtClean="0"/>
-              <a:t>Coordinating the exchange step across two machines takes longer, hence adding to the overhead at each exchange step</a:t>
-            </a:r>
-          </a:p>
-          <a:p>
-            <a:endParaRPr lang="en-US" dirty="0" smtClean="0"/>
-          </a:p>
-        </p:txBody>
-      </p:sp>
-    </p:spTree>
-  </p:cSld>
-  <p:clrMapOvr>
-    <a:masterClrMapping/>
-  </p:clrMapOvr>
-  <p:transition spd="med"/>
-  <p:timing>
-    <p:tnLst>
-      <p:par>
-        <p:cTn id="1" dur="indefinite" restart="never" nodeType="tmRoot"/>
-      </p:par>
-    </p:tnLst>
-  </p:timing>
-</p:sld>
-</file>
-
-<file path=ppt/slides/slide23.xml><?xml version="1.0" encoding="utf-8"?>
 <p:sld xmlns:a="http://schemas.openxmlformats.org/drawingml/2006/main" xmlns:r="http://schemas.openxmlformats.org/officeDocument/2006/relationships" xmlns:mc="http://schemas.openxmlformats.org/markup-compatibility/2006" xmlns:mv="urn:schemas-microsoft-com:mac:vml" xmlns:p="http://schemas.openxmlformats.org/presentationml/2006/main" mc:Ignorable="mv" mc:PreserveAttributes="mv:*">
   <p:cSld>
     <p:spTree>

</xml_diff>